<commit_message>
adds stack vs heap graphic
</commit_message>
<xml_diff>
--- a/resources/MarksDrawrings.pptx
+++ b/resources/MarksDrawrings.pptx
@@ -7,6 +7,7 @@
   <p:sldIdLst>
     <p:sldId id="256" r:id="rId2"/>
     <p:sldId id="257" r:id="rId3"/>
+    <p:sldId id="258" r:id="rId4"/>
   </p:sldIdLst>
   <p:sldSz cx="12192000" cy="6858000"/>
   <p:notesSz cx="6858000" cy="9144000"/>
@@ -105,6 +106,11 @@
       </a:defRPr>
     </a:lvl9pPr>
   </p:defaultTextStyle>
+  <p:extLst>
+    <p:ext uri="{EFAFB233-063F-42B5-8137-9DF3F51BA10A}">
+      <p15:sldGuideLst xmlns:p15="http://schemas.microsoft.com/office/powerpoint/2012/main"/>
+    </p:ext>
+  </p:extLst>
 </p:presentation>
 </file>
 
@@ -1621,7 +1627,7 @@
           <a:p>
             <a:fld id="{EFED3043-6CE1-4075-A706-4B000AA47C6A}" type="datetimeFigureOut">
               <a:rPr lang="en-US" smtClean="0"/>
-              <a:t>11/15/2022</a:t>
+              <a:t>11/16/2022</a:t>
             </a:fld>
             <a:endParaRPr lang="en-US"/>
           </a:p>
@@ -1819,7 +1825,7 @@
           <a:p>
             <a:fld id="{EFED3043-6CE1-4075-A706-4B000AA47C6A}" type="datetimeFigureOut">
               <a:rPr lang="en-US" smtClean="0"/>
-              <a:t>11/15/2022</a:t>
+              <a:t>11/16/2022</a:t>
             </a:fld>
             <a:endParaRPr lang="en-US"/>
           </a:p>
@@ -2027,7 +2033,7 @@
           <a:p>
             <a:fld id="{EFED3043-6CE1-4075-A706-4B000AA47C6A}" type="datetimeFigureOut">
               <a:rPr lang="en-US" smtClean="0"/>
-              <a:t>11/15/2022</a:t>
+              <a:t>11/16/2022</a:t>
             </a:fld>
             <a:endParaRPr lang="en-US"/>
           </a:p>
@@ -2225,7 +2231,7 @@
           <a:p>
             <a:fld id="{EFED3043-6CE1-4075-A706-4B000AA47C6A}" type="datetimeFigureOut">
               <a:rPr lang="en-US" smtClean="0"/>
-              <a:t>11/15/2022</a:t>
+              <a:t>11/16/2022</a:t>
             </a:fld>
             <a:endParaRPr lang="en-US"/>
           </a:p>
@@ -2500,7 +2506,7 @@
           <a:p>
             <a:fld id="{EFED3043-6CE1-4075-A706-4B000AA47C6A}" type="datetimeFigureOut">
               <a:rPr lang="en-US" smtClean="0"/>
-              <a:t>11/15/2022</a:t>
+              <a:t>11/16/2022</a:t>
             </a:fld>
             <a:endParaRPr lang="en-US"/>
           </a:p>
@@ -2765,7 +2771,7 @@
           <a:p>
             <a:fld id="{EFED3043-6CE1-4075-A706-4B000AA47C6A}" type="datetimeFigureOut">
               <a:rPr lang="en-US" smtClean="0"/>
-              <a:t>11/15/2022</a:t>
+              <a:t>11/16/2022</a:t>
             </a:fld>
             <a:endParaRPr lang="en-US"/>
           </a:p>
@@ -3177,7 +3183,7 @@
           <a:p>
             <a:fld id="{EFED3043-6CE1-4075-A706-4B000AA47C6A}" type="datetimeFigureOut">
               <a:rPr lang="en-US" smtClean="0"/>
-              <a:t>11/15/2022</a:t>
+              <a:t>11/16/2022</a:t>
             </a:fld>
             <a:endParaRPr lang="en-US"/>
           </a:p>
@@ -3318,7 +3324,7 @@
           <a:p>
             <a:fld id="{EFED3043-6CE1-4075-A706-4B000AA47C6A}" type="datetimeFigureOut">
               <a:rPr lang="en-US" smtClean="0"/>
-              <a:t>11/15/2022</a:t>
+              <a:t>11/16/2022</a:t>
             </a:fld>
             <a:endParaRPr lang="en-US"/>
           </a:p>
@@ -3431,7 +3437,7 @@
           <a:p>
             <a:fld id="{EFED3043-6CE1-4075-A706-4B000AA47C6A}" type="datetimeFigureOut">
               <a:rPr lang="en-US" smtClean="0"/>
-              <a:t>11/15/2022</a:t>
+              <a:t>11/16/2022</a:t>
             </a:fld>
             <a:endParaRPr lang="en-US"/>
           </a:p>
@@ -3742,7 +3748,7 @@
           <a:p>
             <a:fld id="{EFED3043-6CE1-4075-A706-4B000AA47C6A}" type="datetimeFigureOut">
               <a:rPr lang="en-US" smtClean="0"/>
-              <a:t>11/15/2022</a:t>
+              <a:t>11/16/2022</a:t>
             </a:fld>
             <a:endParaRPr lang="en-US"/>
           </a:p>
@@ -4030,7 +4036,7 @@
           <a:p>
             <a:fld id="{EFED3043-6CE1-4075-A706-4B000AA47C6A}" type="datetimeFigureOut">
               <a:rPr lang="en-US" smtClean="0"/>
-              <a:t>11/15/2022</a:t>
+              <a:t>11/16/2022</a:t>
             </a:fld>
             <a:endParaRPr lang="en-US"/>
           </a:p>
@@ -4271,7 +4277,7 @@
           <a:p>
             <a:fld id="{EFED3043-6CE1-4075-A706-4B000AA47C6A}" type="datetimeFigureOut">
               <a:rPr lang="en-US" smtClean="0"/>
-              <a:t>11/15/2022</a:t>
+              <a:t>11/16/2022</a:t>
             </a:fld>
             <a:endParaRPr lang="en-US"/>
           </a:p>
@@ -5310,8 +5316,8 @@
             <a:chExt cx="2708280" cy="1002600"/>
           </a:xfrm>
         </p:grpSpPr>
-        <mc:AlternateContent xmlns:mc="http://schemas.openxmlformats.org/markup-compatibility/2006">
-          <mc:Choice xmlns:p14="http://schemas.microsoft.com/office/powerpoint/2010/main" Requires="p14">
+        <mc:AlternateContent xmlns:mc="http://schemas.openxmlformats.org/markup-compatibility/2006" xmlns:p14="http://schemas.microsoft.com/office/powerpoint/2010/main">
+          <mc:Choice Requires="p14">
             <p:contentPart p14:bwMode="auto" r:id="rId2">
               <p14:nvContentPartPr>
                 <p14:cNvPr id="20" name="Ink 19">
@@ -5330,7 +5336,7 @@
               </p14:xfrm>
             </p:contentPart>
           </mc:Choice>
-          <mc:Fallback>
+          <mc:Fallback xmlns="">
             <p:pic>
               <p:nvPicPr>
                 <p:cNvPr id="20" name="Ink 19">
@@ -5361,8 +5367,8 @@
             </p:pic>
           </mc:Fallback>
         </mc:AlternateContent>
-        <mc:AlternateContent xmlns:mc="http://schemas.openxmlformats.org/markup-compatibility/2006">
-          <mc:Choice xmlns:p14="http://schemas.microsoft.com/office/powerpoint/2010/main" Requires="p14">
+        <mc:AlternateContent xmlns:mc="http://schemas.openxmlformats.org/markup-compatibility/2006" xmlns:p14="http://schemas.microsoft.com/office/powerpoint/2010/main">
+          <mc:Choice Requires="p14">
             <p:contentPart p14:bwMode="auto" r:id="rId4">
               <p14:nvContentPartPr>
                 <p14:cNvPr id="21" name="Ink 20">
@@ -5381,7 +5387,7 @@
               </p14:xfrm>
             </p:contentPart>
           </mc:Choice>
-          <mc:Fallback>
+          <mc:Fallback xmlns="">
             <p:pic>
               <p:nvPicPr>
                 <p:cNvPr id="21" name="Ink 20">
@@ -5412,8 +5418,8 @@
             </p:pic>
           </mc:Fallback>
         </mc:AlternateContent>
-        <mc:AlternateContent xmlns:mc="http://schemas.openxmlformats.org/markup-compatibility/2006">
-          <mc:Choice xmlns:p14="http://schemas.microsoft.com/office/powerpoint/2010/main" Requires="p14">
+        <mc:AlternateContent xmlns:mc="http://schemas.openxmlformats.org/markup-compatibility/2006" xmlns:p14="http://schemas.microsoft.com/office/powerpoint/2010/main">
+          <mc:Choice Requires="p14">
             <p:contentPart p14:bwMode="auto" r:id="rId6">
               <p14:nvContentPartPr>
                 <p14:cNvPr id="22" name="Ink 21">
@@ -5432,7 +5438,7 @@
               </p14:xfrm>
             </p:contentPart>
           </mc:Choice>
-          <mc:Fallback>
+          <mc:Fallback xmlns="">
             <p:pic>
               <p:nvPicPr>
                 <p:cNvPr id="22" name="Ink 21">
@@ -5463,8 +5469,8 @@
             </p:pic>
           </mc:Fallback>
         </mc:AlternateContent>
-        <mc:AlternateContent xmlns:mc="http://schemas.openxmlformats.org/markup-compatibility/2006">
-          <mc:Choice xmlns:p14="http://schemas.microsoft.com/office/powerpoint/2010/main" Requires="p14">
+        <mc:AlternateContent xmlns:mc="http://schemas.openxmlformats.org/markup-compatibility/2006" xmlns:p14="http://schemas.microsoft.com/office/powerpoint/2010/main">
+          <mc:Choice Requires="p14">
             <p:contentPart p14:bwMode="auto" r:id="rId8">
               <p14:nvContentPartPr>
                 <p14:cNvPr id="23" name="Ink 22">
@@ -5483,7 +5489,7 @@
               </p14:xfrm>
             </p:contentPart>
           </mc:Choice>
-          <mc:Fallback>
+          <mc:Fallback xmlns="">
             <p:pic>
               <p:nvPicPr>
                 <p:cNvPr id="23" name="Ink 22">
@@ -5514,8 +5520,8 @@
             </p:pic>
           </mc:Fallback>
         </mc:AlternateContent>
-        <mc:AlternateContent xmlns:mc="http://schemas.openxmlformats.org/markup-compatibility/2006">
-          <mc:Choice xmlns:p14="http://schemas.microsoft.com/office/powerpoint/2010/main" Requires="p14">
+        <mc:AlternateContent xmlns:mc="http://schemas.openxmlformats.org/markup-compatibility/2006" xmlns:p14="http://schemas.microsoft.com/office/powerpoint/2010/main">
+          <mc:Choice Requires="p14">
             <p:contentPart p14:bwMode="auto" r:id="rId10">
               <p14:nvContentPartPr>
                 <p14:cNvPr id="24" name="Ink 23">
@@ -5534,7 +5540,7 @@
               </p14:xfrm>
             </p:contentPart>
           </mc:Choice>
-          <mc:Fallback>
+          <mc:Fallback xmlns="">
             <p:pic>
               <p:nvPicPr>
                 <p:cNvPr id="24" name="Ink 23">
@@ -5565,8 +5571,8 @@
             </p:pic>
           </mc:Fallback>
         </mc:AlternateContent>
-        <mc:AlternateContent xmlns:mc="http://schemas.openxmlformats.org/markup-compatibility/2006">
-          <mc:Choice xmlns:p14="http://schemas.microsoft.com/office/powerpoint/2010/main" Requires="p14">
+        <mc:AlternateContent xmlns:mc="http://schemas.openxmlformats.org/markup-compatibility/2006" xmlns:p14="http://schemas.microsoft.com/office/powerpoint/2010/main">
+          <mc:Choice Requires="p14">
             <p:contentPart p14:bwMode="auto" r:id="rId12">
               <p14:nvContentPartPr>
                 <p14:cNvPr id="25" name="Ink 24">
@@ -5585,7 +5591,7 @@
               </p14:xfrm>
             </p:contentPart>
           </mc:Choice>
-          <mc:Fallback>
+          <mc:Fallback xmlns="">
             <p:pic>
               <p:nvPicPr>
                 <p:cNvPr id="25" name="Ink 24">
@@ -5616,8 +5622,8 @@
             </p:pic>
           </mc:Fallback>
         </mc:AlternateContent>
-        <mc:AlternateContent xmlns:mc="http://schemas.openxmlformats.org/markup-compatibility/2006">
-          <mc:Choice xmlns:p14="http://schemas.microsoft.com/office/powerpoint/2010/main" Requires="p14">
+        <mc:AlternateContent xmlns:mc="http://schemas.openxmlformats.org/markup-compatibility/2006" xmlns:p14="http://schemas.microsoft.com/office/powerpoint/2010/main">
+          <mc:Choice Requires="p14">
             <p:contentPart p14:bwMode="auto" r:id="rId14">
               <p14:nvContentPartPr>
                 <p14:cNvPr id="27" name="Ink 26">
@@ -5636,7 +5642,7 @@
               </p14:xfrm>
             </p:contentPart>
           </mc:Choice>
-          <mc:Fallback>
+          <mc:Fallback xmlns="">
             <p:pic>
               <p:nvPicPr>
                 <p:cNvPr id="27" name="Ink 26">
@@ -5668,8 +5674,8 @@
           </mc:Fallback>
         </mc:AlternateContent>
       </p:grpSp>
-      <mc:AlternateContent xmlns:mc="http://schemas.openxmlformats.org/markup-compatibility/2006">
-        <mc:Choice xmlns:p14="http://schemas.microsoft.com/office/powerpoint/2010/main" Requires="p14">
+      <mc:AlternateContent xmlns:mc="http://schemas.openxmlformats.org/markup-compatibility/2006" xmlns:p14="http://schemas.microsoft.com/office/powerpoint/2010/main">
+        <mc:Choice Requires="p14">
           <p:contentPart p14:bwMode="auto" r:id="rId16">
             <p14:nvContentPartPr>
               <p14:cNvPr id="29" name="Ink 28">
@@ -5688,7 +5694,7 @@
             </p14:xfrm>
           </p:contentPart>
         </mc:Choice>
-        <mc:Fallback>
+        <mc:Fallback xmlns="">
           <p:pic>
             <p:nvPicPr>
               <p:cNvPr id="29" name="Ink 28">
@@ -5719,8 +5725,8 @@
           </p:pic>
         </mc:Fallback>
       </mc:AlternateContent>
-      <mc:AlternateContent xmlns:mc="http://schemas.openxmlformats.org/markup-compatibility/2006">
-        <mc:Choice xmlns:p14="http://schemas.microsoft.com/office/powerpoint/2010/main" Requires="p14">
+      <mc:AlternateContent xmlns:mc="http://schemas.openxmlformats.org/markup-compatibility/2006" xmlns:p14="http://schemas.microsoft.com/office/powerpoint/2010/main">
+        <mc:Choice Requires="p14">
           <p:contentPart p14:bwMode="auto" r:id="rId18">
             <p14:nvContentPartPr>
               <p14:cNvPr id="44" name="Ink 43">
@@ -5739,7 +5745,7 @@
             </p14:xfrm>
           </p:contentPart>
         </mc:Choice>
-        <mc:Fallback>
+        <mc:Fallback xmlns="">
           <p:pic>
             <p:nvPicPr>
               <p:cNvPr id="44" name="Ink 43">
@@ -5770,8 +5776,8 @@
           </p:pic>
         </mc:Fallback>
       </mc:AlternateContent>
-      <mc:AlternateContent xmlns:mc="http://schemas.openxmlformats.org/markup-compatibility/2006">
-        <mc:Choice xmlns:p14="http://schemas.microsoft.com/office/powerpoint/2010/main" Requires="p14">
+      <mc:AlternateContent xmlns:mc="http://schemas.openxmlformats.org/markup-compatibility/2006" xmlns:p14="http://schemas.microsoft.com/office/powerpoint/2010/main">
+        <mc:Choice Requires="p14">
           <p:contentPart p14:bwMode="auto" r:id="rId20">
             <p14:nvContentPartPr>
               <p14:cNvPr id="54" name="Ink 53">
@@ -5790,7 +5796,7 @@
             </p14:xfrm>
           </p:contentPart>
         </mc:Choice>
-        <mc:Fallback>
+        <mc:Fallback xmlns="">
           <p:pic>
             <p:nvPicPr>
               <p:cNvPr id="54" name="Ink 53">
@@ -5841,8 +5847,8 @@
             <a:chExt cx="1664280" cy="807840"/>
           </a:xfrm>
         </p:grpSpPr>
-        <mc:AlternateContent xmlns:mc="http://schemas.openxmlformats.org/markup-compatibility/2006">
-          <mc:Choice xmlns:p14="http://schemas.microsoft.com/office/powerpoint/2010/main" Requires="p14">
+        <mc:AlternateContent xmlns:mc="http://schemas.openxmlformats.org/markup-compatibility/2006" xmlns:p14="http://schemas.microsoft.com/office/powerpoint/2010/main">
+          <mc:Choice Requires="p14">
             <p:contentPart p14:bwMode="auto" r:id="rId22">
               <p14:nvContentPartPr>
                 <p14:cNvPr id="45" name="Ink 44">
@@ -5861,7 +5867,7 @@
               </p14:xfrm>
             </p:contentPart>
           </mc:Choice>
-          <mc:Fallback>
+          <mc:Fallback xmlns="">
             <p:pic>
               <p:nvPicPr>
                 <p:cNvPr id="45" name="Ink 44">
@@ -5892,8 +5898,8 @@
             </p:pic>
           </mc:Fallback>
         </mc:AlternateContent>
-        <mc:AlternateContent xmlns:mc="http://schemas.openxmlformats.org/markup-compatibility/2006">
-          <mc:Choice xmlns:p14="http://schemas.microsoft.com/office/powerpoint/2010/main" Requires="p14">
+        <mc:AlternateContent xmlns:mc="http://schemas.openxmlformats.org/markup-compatibility/2006" xmlns:p14="http://schemas.microsoft.com/office/powerpoint/2010/main">
+          <mc:Choice Requires="p14">
             <p:contentPart p14:bwMode="auto" r:id="rId24">
               <p14:nvContentPartPr>
                 <p14:cNvPr id="46" name="Ink 45">
@@ -5912,7 +5918,7 @@
               </p14:xfrm>
             </p:contentPart>
           </mc:Choice>
-          <mc:Fallback>
+          <mc:Fallback xmlns="">
             <p:pic>
               <p:nvPicPr>
                 <p:cNvPr id="46" name="Ink 45">
@@ -5943,8 +5949,8 @@
             </p:pic>
           </mc:Fallback>
         </mc:AlternateContent>
-        <mc:AlternateContent xmlns:mc="http://schemas.openxmlformats.org/markup-compatibility/2006">
-          <mc:Choice xmlns:p14="http://schemas.microsoft.com/office/powerpoint/2010/main" Requires="p14">
+        <mc:AlternateContent xmlns:mc="http://schemas.openxmlformats.org/markup-compatibility/2006" xmlns:p14="http://schemas.microsoft.com/office/powerpoint/2010/main">
+          <mc:Choice Requires="p14">
             <p:contentPart p14:bwMode="auto" r:id="rId26">
               <p14:nvContentPartPr>
                 <p14:cNvPr id="47" name="Ink 46">
@@ -5963,7 +5969,7 @@
               </p14:xfrm>
             </p:contentPart>
           </mc:Choice>
-          <mc:Fallback>
+          <mc:Fallback xmlns="">
             <p:pic>
               <p:nvPicPr>
                 <p:cNvPr id="47" name="Ink 46">
@@ -5994,8 +6000,8 @@
             </p:pic>
           </mc:Fallback>
         </mc:AlternateContent>
-        <mc:AlternateContent xmlns:mc="http://schemas.openxmlformats.org/markup-compatibility/2006">
-          <mc:Choice xmlns:p14="http://schemas.microsoft.com/office/powerpoint/2010/main" Requires="p14">
+        <mc:AlternateContent xmlns:mc="http://schemas.openxmlformats.org/markup-compatibility/2006" xmlns:p14="http://schemas.microsoft.com/office/powerpoint/2010/main">
+          <mc:Choice Requires="p14">
             <p:contentPart p14:bwMode="auto" r:id="rId28">
               <p14:nvContentPartPr>
                 <p14:cNvPr id="48" name="Ink 47">
@@ -6014,7 +6020,7 @@
               </p14:xfrm>
             </p:contentPart>
           </mc:Choice>
-          <mc:Fallback>
+          <mc:Fallback xmlns="">
             <p:pic>
               <p:nvPicPr>
                 <p:cNvPr id="48" name="Ink 47">
@@ -6045,8 +6051,8 @@
             </p:pic>
           </mc:Fallback>
         </mc:AlternateContent>
-        <mc:AlternateContent xmlns:mc="http://schemas.openxmlformats.org/markup-compatibility/2006">
-          <mc:Choice xmlns:p14="http://schemas.microsoft.com/office/powerpoint/2010/main" Requires="p14">
+        <mc:AlternateContent xmlns:mc="http://schemas.openxmlformats.org/markup-compatibility/2006" xmlns:p14="http://schemas.microsoft.com/office/powerpoint/2010/main">
+          <mc:Choice Requires="p14">
             <p:contentPart p14:bwMode="auto" r:id="rId30">
               <p14:nvContentPartPr>
                 <p14:cNvPr id="50" name="Ink 49">
@@ -6065,7 +6071,7 @@
               </p14:xfrm>
             </p:contentPart>
           </mc:Choice>
-          <mc:Fallback>
+          <mc:Fallback xmlns="">
             <p:pic>
               <p:nvPicPr>
                 <p:cNvPr id="50" name="Ink 49">
@@ -6096,8 +6102,8 @@
             </p:pic>
           </mc:Fallback>
         </mc:AlternateContent>
-        <mc:AlternateContent xmlns:mc="http://schemas.openxmlformats.org/markup-compatibility/2006">
-          <mc:Choice xmlns:p14="http://schemas.microsoft.com/office/powerpoint/2010/main" Requires="p14">
+        <mc:AlternateContent xmlns:mc="http://schemas.openxmlformats.org/markup-compatibility/2006" xmlns:p14="http://schemas.microsoft.com/office/powerpoint/2010/main">
+          <mc:Choice Requires="p14">
             <p:contentPart p14:bwMode="auto" r:id="rId32">
               <p14:nvContentPartPr>
                 <p14:cNvPr id="51" name="Ink 50">
@@ -6116,7 +6122,7 @@
               </p14:xfrm>
             </p:contentPart>
           </mc:Choice>
-          <mc:Fallback>
+          <mc:Fallback xmlns="">
             <p:pic>
               <p:nvPicPr>
                 <p:cNvPr id="51" name="Ink 50">
@@ -6147,8 +6153,8 @@
             </p:pic>
           </mc:Fallback>
         </mc:AlternateContent>
-        <mc:AlternateContent xmlns:mc="http://schemas.openxmlformats.org/markup-compatibility/2006">
-          <mc:Choice xmlns:p14="http://schemas.microsoft.com/office/powerpoint/2010/main" Requires="p14">
+        <mc:AlternateContent xmlns:mc="http://schemas.openxmlformats.org/markup-compatibility/2006" xmlns:p14="http://schemas.microsoft.com/office/powerpoint/2010/main">
+          <mc:Choice Requires="p14">
             <p:contentPart p14:bwMode="auto" r:id="rId34">
               <p14:nvContentPartPr>
                 <p14:cNvPr id="52" name="Ink 51">
@@ -6167,7 +6173,7 @@
               </p14:xfrm>
             </p:contentPart>
           </mc:Choice>
-          <mc:Fallback>
+          <mc:Fallback xmlns="">
             <p:pic>
               <p:nvPicPr>
                 <p:cNvPr id="52" name="Ink 51">
@@ -6198,8 +6204,8 @@
             </p:pic>
           </mc:Fallback>
         </mc:AlternateContent>
-        <mc:AlternateContent xmlns:mc="http://schemas.openxmlformats.org/markup-compatibility/2006">
-          <mc:Choice xmlns:p14="http://schemas.microsoft.com/office/powerpoint/2010/main" Requires="p14">
+        <mc:AlternateContent xmlns:mc="http://schemas.openxmlformats.org/markup-compatibility/2006" xmlns:p14="http://schemas.microsoft.com/office/powerpoint/2010/main">
+          <mc:Choice Requires="p14">
             <p:contentPart p14:bwMode="auto" r:id="rId36">
               <p14:nvContentPartPr>
                 <p14:cNvPr id="55" name="Ink 54">
@@ -6218,7 +6224,7 @@
               </p14:xfrm>
             </p:contentPart>
           </mc:Choice>
-          <mc:Fallback>
+          <mc:Fallback xmlns="">
             <p:pic>
               <p:nvPicPr>
                 <p:cNvPr id="55" name="Ink 54">
@@ -6249,8 +6255,8 @@
             </p:pic>
           </mc:Fallback>
         </mc:AlternateContent>
-        <mc:AlternateContent xmlns:mc="http://schemas.openxmlformats.org/markup-compatibility/2006">
-          <mc:Choice xmlns:p14="http://schemas.microsoft.com/office/powerpoint/2010/main" Requires="p14">
+        <mc:AlternateContent xmlns:mc="http://schemas.openxmlformats.org/markup-compatibility/2006" xmlns:p14="http://schemas.microsoft.com/office/powerpoint/2010/main">
+          <mc:Choice Requires="p14">
             <p:contentPart p14:bwMode="auto" r:id="rId38">
               <p14:nvContentPartPr>
                 <p14:cNvPr id="57" name="Ink 56">
@@ -6269,7 +6275,7 @@
               </p14:xfrm>
             </p:contentPart>
           </mc:Choice>
-          <mc:Fallback>
+          <mc:Fallback xmlns="">
             <p:pic>
               <p:nvPicPr>
                 <p:cNvPr id="57" name="Ink 56">
@@ -6321,8 +6327,8 @@
             <a:chExt cx="1897920" cy="859320"/>
           </a:xfrm>
         </p:grpSpPr>
-        <mc:AlternateContent xmlns:mc="http://schemas.openxmlformats.org/markup-compatibility/2006">
-          <mc:Choice xmlns:p14="http://schemas.microsoft.com/office/powerpoint/2010/main" Requires="p14">
+        <mc:AlternateContent xmlns:mc="http://schemas.openxmlformats.org/markup-compatibility/2006" xmlns:p14="http://schemas.microsoft.com/office/powerpoint/2010/main">
+          <mc:Choice Requires="p14">
             <p:contentPart p14:bwMode="auto" r:id="rId40">
               <p14:nvContentPartPr>
                 <p14:cNvPr id="30" name="Ink 29">
@@ -6341,7 +6347,7 @@
               </p14:xfrm>
             </p:contentPart>
           </mc:Choice>
-          <mc:Fallback>
+          <mc:Fallback xmlns="">
             <p:pic>
               <p:nvPicPr>
                 <p:cNvPr id="30" name="Ink 29">
@@ -6372,8 +6378,8 @@
             </p:pic>
           </mc:Fallback>
         </mc:AlternateContent>
-        <mc:AlternateContent xmlns:mc="http://schemas.openxmlformats.org/markup-compatibility/2006">
-          <mc:Choice xmlns:p14="http://schemas.microsoft.com/office/powerpoint/2010/main" Requires="p14">
+        <mc:AlternateContent xmlns:mc="http://schemas.openxmlformats.org/markup-compatibility/2006" xmlns:p14="http://schemas.microsoft.com/office/powerpoint/2010/main">
+          <mc:Choice Requires="p14">
             <p:contentPart p14:bwMode="auto" r:id="rId42">
               <p14:nvContentPartPr>
                 <p14:cNvPr id="31" name="Ink 30">
@@ -6392,7 +6398,7 @@
               </p14:xfrm>
             </p:contentPart>
           </mc:Choice>
-          <mc:Fallback>
+          <mc:Fallback xmlns="">
             <p:pic>
               <p:nvPicPr>
                 <p:cNvPr id="31" name="Ink 30">
@@ -6423,8 +6429,8 @@
             </p:pic>
           </mc:Fallback>
         </mc:AlternateContent>
-        <mc:AlternateContent xmlns:mc="http://schemas.openxmlformats.org/markup-compatibility/2006">
-          <mc:Choice xmlns:p14="http://schemas.microsoft.com/office/powerpoint/2010/main" Requires="p14">
+        <mc:AlternateContent xmlns:mc="http://schemas.openxmlformats.org/markup-compatibility/2006" xmlns:p14="http://schemas.microsoft.com/office/powerpoint/2010/main">
+          <mc:Choice Requires="p14">
             <p:contentPart p14:bwMode="auto" r:id="rId44">
               <p14:nvContentPartPr>
                 <p14:cNvPr id="33" name="Ink 32">
@@ -6443,7 +6449,7 @@
               </p14:xfrm>
             </p:contentPart>
           </mc:Choice>
-          <mc:Fallback>
+          <mc:Fallback xmlns="">
             <p:pic>
               <p:nvPicPr>
                 <p:cNvPr id="33" name="Ink 32">
@@ -6474,8 +6480,8 @@
             </p:pic>
           </mc:Fallback>
         </mc:AlternateContent>
-        <mc:AlternateContent xmlns:mc="http://schemas.openxmlformats.org/markup-compatibility/2006">
-          <mc:Choice xmlns:p14="http://schemas.microsoft.com/office/powerpoint/2010/main" Requires="p14">
+        <mc:AlternateContent xmlns:mc="http://schemas.openxmlformats.org/markup-compatibility/2006" xmlns:p14="http://schemas.microsoft.com/office/powerpoint/2010/main">
+          <mc:Choice Requires="p14">
             <p:contentPart p14:bwMode="auto" r:id="rId46">
               <p14:nvContentPartPr>
                 <p14:cNvPr id="34" name="Ink 33">
@@ -6494,7 +6500,7 @@
               </p14:xfrm>
             </p:contentPart>
           </mc:Choice>
-          <mc:Fallback>
+          <mc:Fallback xmlns="">
             <p:pic>
               <p:nvPicPr>
                 <p:cNvPr id="34" name="Ink 33">
@@ -6525,8 +6531,8 @@
             </p:pic>
           </mc:Fallback>
         </mc:AlternateContent>
-        <mc:AlternateContent xmlns:mc="http://schemas.openxmlformats.org/markup-compatibility/2006">
-          <mc:Choice xmlns:p14="http://schemas.microsoft.com/office/powerpoint/2010/main" Requires="p14">
+        <mc:AlternateContent xmlns:mc="http://schemas.openxmlformats.org/markup-compatibility/2006" xmlns:p14="http://schemas.microsoft.com/office/powerpoint/2010/main">
+          <mc:Choice Requires="p14">
             <p:contentPart p14:bwMode="auto" r:id="rId48">
               <p14:nvContentPartPr>
                 <p14:cNvPr id="35" name="Ink 34">
@@ -6545,7 +6551,7 @@
               </p14:xfrm>
             </p:contentPart>
           </mc:Choice>
-          <mc:Fallback>
+          <mc:Fallback xmlns="">
             <p:pic>
               <p:nvPicPr>
                 <p:cNvPr id="35" name="Ink 34">
@@ -6576,8 +6582,8 @@
             </p:pic>
           </mc:Fallback>
         </mc:AlternateContent>
-        <mc:AlternateContent xmlns:mc="http://schemas.openxmlformats.org/markup-compatibility/2006">
-          <mc:Choice xmlns:p14="http://schemas.microsoft.com/office/powerpoint/2010/main" Requires="p14">
+        <mc:AlternateContent xmlns:mc="http://schemas.openxmlformats.org/markup-compatibility/2006" xmlns:p14="http://schemas.microsoft.com/office/powerpoint/2010/main">
+          <mc:Choice Requires="p14">
             <p:contentPart p14:bwMode="auto" r:id="rId50">
               <p14:nvContentPartPr>
                 <p14:cNvPr id="36" name="Ink 35">
@@ -6596,7 +6602,7 @@
               </p14:xfrm>
             </p:contentPart>
           </mc:Choice>
-          <mc:Fallback>
+          <mc:Fallback xmlns="">
             <p:pic>
               <p:nvPicPr>
                 <p:cNvPr id="36" name="Ink 35">
@@ -6627,8 +6633,8 @@
             </p:pic>
           </mc:Fallback>
         </mc:AlternateContent>
-        <mc:AlternateContent xmlns:mc="http://schemas.openxmlformats.org/markup-compatibility/2006">
-          <mc:Choice xmlns:p14="http://schemas.microsoft.com/office/powerpoint/2010/main" Requires="p14">
+        <mc:AlternateContent xmlns:mc="http://schemas.openxmlformats.org/markup-compatibility/2006" xmlns:p14="http://schemas.microsoft.com/office/powerpoint/2010/main">
+          <mc:Choice Requires="p14">
             <p:contentPart p14:bwMode="auto" r:id="rId52">
               <p14:nvContentPartPr>
                 <p14:cNvPr id="37" name="Ink 36">
@@ -6647,7 +6653,7 @@
               </p14:xfrm>
             </p:contentPart>
           </mc:Choice>
-          <mc:Fallback>
+          <mc:Fallback xmlns="">
             <p:pic>
               <p:nvPicPr>
                 <p:cNvPr id="37" name="Ink 36">
@@ -6678,8 +6684,8 @@
             </p:pic>
           </mc:Fallback>
         </mc:AlternateContent>
-        <mc:AlternateContent xmlns:mc="http://schemas.openxmlformats.org/markup-compatibility/2006">
-          <mc:Choice xmlns:p14="http://schemas.microsoft.com/office/powerpoint/2010/main" Requires="p14">
+        <mc:AlternateContent xmlns:mc="http://schemas.openxmlformats.org/markup-compatibility/2006" xmlns:p14="http://schemas.microsoft.com/office/powerpoint/2010/main">
+          <mc:Choice Requires="p14">
             <p:contentPart p14:bwMode="auto" r:id="rId54">
               <p14:nvContentPartPr>
                 <p14:cNvPr id="38" name="Ink 37">
@@ -6698,7 +6704,7 @@
               </p14:xfrm>
             </p:contentPart>
           </mc:Choice>
-          <mc:Fallback>
+          <mc:Fallback xmlns="">
             <p:pic>
               <p:nvPicPr>
                 <p:cNvPr id="38" name="Ink 37">
@@ -6729,8 +6735,8 @@
             </p:pic>
           </mc:Fallback>
         </mc:AlternateContent>
-        <mc:AlternateContent xmlns:mc="http://schemas.openxmlformats.org/markup-compatibility/2006">
-          <mc:Choice xmlns:p14="http://schemas.microsoft.com/office/powerpoint/2010/main" Requires="p14">
+        <mc:AlternateContent xmlns:mc="http://schemas.openxmlformats.org/markup-compatibility/2006" xmlns:p14="http://schemas.microsoft.com/office/powerpoint/2010/main">
+          <mc:Choice Requires="p14">
             <p:contentPart p14:bwMode="auto" r:id="rId56">
               <p14:nvContentPartPr>
                 <p14:cNvPr id="39" name="Ink 38">
@@ -6749,7 +6755,7 @@
               </p14:xfrm>
             </p:contentPart>
           </mc:Choice>
-          <mc:Fallback>
+          <mc:Fallback xmlns="">
             <p:pic>
               <p:nvPicPr>
                 <p:cNvPr id="39" name="Ink 38">
@@ -6780,8 +6786,8 @@
             </p:pic>
           </mc:Fallback>
         </mc:AlternateContent>
-        <mc:AlternateContent xmlns:mc="http://schemas.openxmlformats.org/markup-compatibility/2006">
-          <mc:Choice xmlns:p14="http://schemas.microsoft.com/office/powerpoint/2010/main" Requires="p14">
+        <mc:AlternateContent xmlns:mc="http://schemas.openxmlformats.org/markup-compatibility/2006" xmlns:p14="http://schemas.microsoft.com/office/powerpoint/2010/main">
+          <mc:Choice Requires="p14">
             <p:contentPart p14:bwMode="auto" r:id="rId58">
               <p14:nvContentPartPr>
                 <p14:cNvPr id="41" name="Ink 40">
@@ -6800,7 +6806,7 @@
               </p14:xfrm>
             </p:contentPart>
           </mc:Choice>
-          <mc:Fallback>
+          <mc:Fallback xmlns="">
             <p:pic>
               <p:nvPicPr>
                 <p:cNvPr id="41" name="Ink 40">
@@ -6831,8 +6837,8 @@
             </p:pic>
           </mc:Fallback>
         </mc:AlternateContent>
-        <mc:AlternateContent xmlns:mc="http://schemas.openxmlformats.org/markup-compatibility/2006">
-          <mc:Choice xmlns:p14="http://schemas.microsoft.com/office/powerpoint/2010/main" Requires="p14">
+        <mc:AlternateContent xmlns:mc="http://schemas.openxmlformats.org/markup-compatibility/2006" xmlns:p14="http://schemas.microsoft.com/office/powerpoint/2010/main">
+          <mc:Choice Requires="p14">
             <p:contentPart p14:bwMode="auto" r:id="rId60">
               <p14:nvContentPartPr>
                 <p14:cNvPr id="42" name="Ink 41">
@@ -6851,7 +6857,7 @@
               </p14:xfrm>
             </p:contentPart>
           </mc:Choice>
-          <mc:Fallback>
+          <mc:Fallback xmlns="">
             <p:pic>
               <p:nvPicPr>
                 <p:cNvPr id="42" name="Ink 41">
@@ -6882,8 +6888,8 @@
             </p:pic>
           </mc:Fallback>
         </mc:AlternateContent>
-        <mc:AlternateContent xmlns:mc="http://schemas.openxmlformats.org/markup-compatibility/2006">
-          <mc:Choice xmlns:p14="http://schemas.microsoft.com/office/powerpoint/2010/main" Requires="p14">
+        <mc:AlternateContent xmlns:mc="http://schemas.openxmlformats.org/markup-compatibility/2006" xmlns:p14="http://schemas.microsoft.com/office/powerpoint/2010/main">
+          <mc:Choice Requires="p14">
             <p:contentPart p14:bwMode="auto" r:id="rId62">
               <p14:nvContentPartPr>
                 <p14:cNvPr id="59" name="Ink 58">
@@ -6902,7 +6908,7 @@
               </p14:xfrm>
             </p:contentPart>
           </mc:Choice>
-          <mc:Fallback>
+          <mc:Fallback xmlns="">
             <p:pic>
               <p:nvPicPr>
                 <p:cNvPr id="59" name="Ink 58">
@@ -6933,8 +6939,8 @@
             </p:pic>
           </mc:Fallback>
         </mc:AlternateContent>
-        <mc:AlternateContent xmlns:mc="http://schemas.openxmlformats.org/markup-compatibility/2006">
-          <mc:Choice xmlns:p14="http://schemas.microsoft.com/office/powerpoint/2010/main" Requires="p14">
+        <mc:AlternateContent xmlns:mc="http://schemas.openxmlformats.org/markup-compatibility/2006" xmlns:p14="http://schemas.microsoft.com/office/powerpoint/2010/main">
+          <mc:Choice Requires="p14">
             <p:contentPart p14:bwMode="auto" r:id="rId64">
               <p14:nvContentPartPr>
                 <p14:cNvPr id="60" name="Ink 59">
@@ -6953,7 +6959,7 @@
               </p14:xfrm>
             </p:contentPart>
           </mc:Choice>
-          <mc:Fallback>
+          <mc:Fallback xmlns="">
             <p:pic>
               <p:nvPicPr>
                 <p:cNvPr id="60" name="Ink 59">
@@ -7005,8 +7011,8 @@
             <a:chExt cx="1029600" cy="1014120"/>
           </a:xfrm>
         </p:grpSpPr>
-        <mc:AlternateContent xmlns:mc="http://schemas.openxmlformats.org/markup-compatibility/2006">
-          <mc:Choice xmlns:p14="http://schemas.microsoft.com/office/powerpoint/2010/main" Requires="p14">
+        <mc:AlternateContent xmlns:mc="http://schemas.openxmlformats.org/markup-compatibility/2006" xmlns:p14="http://schemas.microsoft.com/office/powerpoint/2010/main">
+          <mc:Choice Requires="p14">
             <p:contentPart p14:bwMode="auto" r:id="rId66">
               <p14:nvContentPartPr>
                 <p14:cNvPr id="62" name="Ink 61">
@@ -7025,7 +7031,7 @@
               </p14:xfrm>
             </p:contentPart>
           </mc:Choice>
-          <mc:Fallback>
+          <mc:Fallback xmlns="">
             <p:pic>
               <p:nvPicPr>
                 <p:cNvPr id="62" name="Ink 61">
@@ -7056,8 +7062,8 @@
             </p:pic>
           </mc:Fallback>
         </mc:AlternateContent>
-        <mc:AlternateContent xmlns:mc="http://schemas.openxmlformats.org/markup-compatibility/2006">
-          <mc:Choice xmlns:p14="http://schemas.microsoft.com/office/powerpoint/2010/main" Requires="p14">
+        <mc:AlternateContent xmlns:mc="http://schemas.openxmlformats.org/markup-compatibility/2006" xmlns:p14="http://schemas.microsoft.com/office/powerpoint/2010/main">
+          <mc:Choice Requires="p14">
             <p:contentPart p14:bwMode="auto" r:id="rId68">
               <p14:nvContentPartPr>
                 <p14:cNvPr id="63" name="Ink 62">
@@ -7076,7 +7082,7 @@
               </p14:xfrm>
             </p:contentPart>
           </mc:Choice>
-          <mc:Fallback>
+          <mc:Fallback xmlns="">
             <p:pic>
               <p:nvPicPr>
                 <p:cNvPr id="63" name="Ink 62">
@@ -7107,8 +7113,8 @@
             </p:pic>
           </mc:Fallback>
         </mc:AlternateContent>
-        <mc:AlternateContent xmlns:mc="http://schemas.openxmlformats.org/markup-compatibility/2006">
-          <mc:Choice xmlns:p14="http://schemas.microsoft.com/office/powerpoint/2010/main" Requires="p14">
+        <mc:AlternateContent xmlns:mc="http://schemas.openxmlformats.org/markup-compatibility/2006" xmlns:p14="http://schemas.microsoft.com/office/powerpoint/2010/main">
+          <mc:Choice Requires="p14">
             <p:contentPart p14:bwMode="auto" r:id="rId70">
               <p14:nvContentPartPr>
                 <p14:cNvPr id="65" name="Ink 64">
@@ -7127,7 +7133,7 @@
               </p14:xfrm>
             </p:contentPart>
           </mc:Choice>
-          <mc:Fallback>
+          <mc:Fallback xmlns="">
             <p:pic>
               <p:nvPicPr>
                 <p:cNvPr id="65" name="Ink 64">
@@ -7179,8 +7185,8 @@
             <a:chExt cx="614160" cy="446040"/>
           </a:xfrm>
         </p:grpSpPr>
-        <mc:AlternateContent xmlns:mc="http://schemas.openxmlformats.org/markup-compatibility/2006">
-          <mc:Choice xmlns:p14="http://schemas.microsoft.com/office/powerpoint/2010/main" Requires="p14">
+        <mc:AlternateContent xmlns:mc="http://schemas.openxmlformats.org/markup-compatibility/2006" xmlns:p14="http://schemas.microsoft.com/office/powerpoint/2010/main">
+          <mc:Choice Requires="p14">
             <p:contentPart p14:bwMode="auto" r:id="rId72">
               <p14:nvContentPartPr>
                 <p14:cNvPr id="67" name="Ink 66">
@@ -7199,7 +7205,7 @@
               </p14:xfrm>
             </p:contentPart>
           </mc:Choice>
-          <mc:Fallback>
+          <mc:Fallback xmlns="">
             <p:pic>
               <p:nvPicPr>
                 <p:cNvPr id="67" name="Ink 66">
@@ -7230,8 +7236,8 @@
             </p:pic>
           </mc:Fallback>
         </mc:AlternateContent>
-        <mc:AlternateContent xmlns:mc="http://schemas.openxmlformats.org/markup-compatibility/2006">
-          <mc:Choice xmlns:p14="http://schemas.microsoft.com/office/powerpoint/2010/main" Requires="p14">
+        <mc:AlternateContent xmlns:mc="http://schemas.openxmlformats.org/markup-compatibility/2006" xmlns:p14="http://schemas.microsoft.com/office/powerpoint/2010/main">
+          <mc:Choice Requires="p14">
             <p:contentPart p14:bwMode="auto" r:id="rId74">
               <p14:nvContentPartPr>
                 <p14:cNvPr id="68" name="Ink 67">
@@ -7250,7 +7256,7 @@
               </p14:xfrm>
             </p:contentPart>
           </mc:Choice>
-          <mc:Fallback>
+          <mc:Fallback xmlns="">
             <p:pic>
               <p:nvPicPr>
                 <p:cNvPr id="68" name="Ink 67">
@@ -7302,8 +7308,8 @@
             <a:chExt cx="1544040" cy="1466280"/>
           </a:xfrm>
         </p:grpSpPr>
-        <mc:AlternateContent xmlns:mc="http://schemas.openxmlformats.org/markup-compatibility/2006">
-          <mc:Choice xmlns:p14="http://schemas.microsoft.com/office/powerpoint/2010/main" Requires="p14">
+        <mc:AlternateContent xmlns:mc="http://schemas.openxmlformats.org/markup-compatibility/2006" xmlns:p14="http://schemas.microsoft.com/office/powerpoint/2010/main">
+          <mc:Choice Requires="p14">
             <p:contentPart p14:bwMode="auto" r:id="rId76">
               <p14:nvContentPartPr>
                 <p14:cNvPr id="76" name="Ink 75">
@@ -7322,7 +7328,7 @@
               </p14:xfrm>
             </p:contentPart>
           </mc:Choice>
-          <mc:Fallback>
+          <mc:Fallback xmlns="">
             <p:pic>
               <p:nvPicPr>
                 <p:cNvPr id="76" name="Ink 75">
@@ -7353,8 +7359,8 @@
             </p:pic>
           </mc:Fallback>
         </mc:AlternateContent>
-        <mc:AlternateContent xmlns:mc="http://schemas.openxmlformats.org/markup-compatibility/2006">
-          <mc:Choice xmlns:p14="http://schemas.microsoft.com/office/powerpoint/2010/main" Requires="p14">
+        <mc:AlternateContent xmlns:mc="http://schemas.openxmlformats.org/markup-compatibility/2006" xmlns:p14="http://schemas.microsoft.com/office/powerpoint/2010/main">
+          <mc:Choice Requires="p14">
             <p:contentPart p14:bwMode="auto" r:id="rId78">
               <p14:nvContentPartPr>
                 <p14:cNvPr id="77" name="Ink 76">
@@ -7373,7 +7379,7 @@
               </p14:xfrm>
             </p:contentPart>
           </mc:Choice>
-          <mc:Fallback>
+          <mc:Fallback xmlns="">
             <p:pic>
               <p:nvPicPr>
                 <p:cNvPr id="77" name="Ink 76">
@@ -7404,8 +7410,8 @@
             </p:pic>
           </mc:Fallback>
         </mc:AlternateContent>
-        <mc:AlternateContent xmlns:mc="http://schemas.openxmlformats.org/markup-compatibility/2006">
-          <mc:Choice xmlns:p14="http://schemas.microsoft.com/office/powerpoint/2010/main" Requires="p14">
+        <mc:AlternateContent xmlns:mc="http://schemas.openxmlformats.org/markup-compatibility/2006" xmlns:p14="http://schemas.microsoft.com/office/powerpoint/2010/main">
+          <mc:Choice Requires="p14">
             <p:contentPart p14:bwMode="auto" r:id="rId80">
               <p14:nvContentPartPr>
                 <p14:cNvPr id="78" name="Ink 77">
@@ -7424,7 +7430,7 @@
               </p14:xfrm>
             </p:contentPart>
           </mc:Choice>
-          <mc:Fallback>
+          <mc:Fallback xmlns="">
             <p:pic>
               <p:nvPicPr>
                 <p:cNvPr id="78" name="Ink 77">
@@ -7476,8 +7482,8 @@
             <a:chExt cx="2418120" cy="2344320"/>
           </a:xfrm>
         </p:grpSpPr>
-        <mc:AlternateContent xmlns:mc="http://schemas.openxmlformats.org/markup-compatibility/2006">
-          <mc:Choice xmlns:p14="http://schemas.microsoft.com/office/powerpoint/2010/main" Requires="p14">
+        <mc:AlternateContent xmlns:mc="http://schemas.openxmlformats.org/markup-compatibility/2006" xmlns:p14="http://schemas.microsoft.com/office/powerpoint/2010/main">
+          <mc:Choice Requires="p14">
             <p:contentPart p14:bwMode="auto" r:id="rId82">
               <p14:nvContentPartPr>
                 <p14:cNvPr id="70" name="Ink 69">
@@ -7496,7 +7502,7 @@
               </p14:xfrm>
             </p:contentPart>
           </mc:Choice>
-          <mc:Fallback>
+          <mc:Fallback xmlns="">
             <p:pic>
               <p:nvPicPr>
                 <p:cNvPr id="70" name="Ink 69">
@@ -7527,8 +7533,8 @@
             </p:pic>
           </mc:Fallback>
         </mc:AlternateContent>
-        <mc:AlternateContent xmlns:mc="http://schemas.openxmlformats.org/markup-compatibility/2006">
-          <mc:Choice xmlns:p14="http://schemas.microsoft.com/office/powerpoint/2010/main" Requires="p14">
+        <mc:AlternateContent xmlns:mc="http://schemas.openxmlformats.org/markup-compatibility/2006" xmlns:p14="http://schemas.microsoft.com/office/powerpoint/2010/main">
+          <mc:Choice Requires="p14">
             <p:contentPart p14:bwMode="auto" r:id="rId84">
               <p14:nvContentPartPr>
                 <p14:cNvPr id="71" name="Ink 70">
@@ -7547,7 +7553,7 @@
               </p14:xfrm>
             </p:contentPart>
           </mc:Choice>
-          <mc:Fallback>
+          <mc:Fallback xmlns="">
             <p:pic>
               <p:nvPicPr>
                 <p:cNvPr id="71" name="Ink 70">
@@ -7578,8 +7584,8 @@
             </p:pic>
           </mc:Fallback>
         </mc:AlternateContent>
-        <mc:AlternateContent xmlns:mc="http://schemas.openxmlformats.org/markup-compatibility/2006">
-          <mc:Choice xmlns:p14="http://schemas.microsoft.com/office/powerpoint/2010/main" Requires="p14">
+        <mc:AlternateContent xmlns:mc="http://schemas.openxmlformats.org/markup-compatibility/2006" xmlns:p14="http://schemas.microsoft.com/office/powerpoint/2010/main">
+          <mc:Choice Requires="p14">
             <p:contentPart p14:bwMode="auto" r:id="rId86">
               <p14:nvContentPartPr>
                 <p14:cNvPr id="72" name="Ink 71">
@@ -7598,7 +7604,7 @@
               </p14:xfrm>
             </p:contentPart>
           </mc:Choice>
-          <mc:Fallback>
+          <mc:Fallback xmlns="">
             <p:pic>
               <p:nvPicPr>
                 <p:cNvPr id="72" name="Ink 71">
@@ -7629,8 +7635,8 @@
             </p:pic>
           </mc:Fallback>
         </mc:AlternateContent>
-        <mc:AlternateContent xmlns:mc="http://schemas.openxmlformats.org/markup-compatibility/2006">
-          <mc:Choice xmlns:p14="http://schemas.microsoft.com/office/powerpoint/2010/main" Requires="p14">
+        <mc:AlternateContent xmlns:mc="http://schemas.openxmlformats.org/markup-compatibility/2006" xmlns:p14="http://schemas.microsoft.com/office/powerpoint/2010/main">
+          <mc:Choice Requires="p14">
             <p:contentPart p14:bwMode="auto" r:id="rId88">
               <p14:nvContentPartPr>
                 <p14:cNvPr id="73" name="Ink 72">
@@ -7649,7 +7655,7 @@
               </p14:xfrm>
             </p:contentPart>
           </mc:Choice>
-          <mc:Fallback>
+          <mc:Fallback xmlns="">
             <p:pic>
               <p:nvPicPr>
                 <p:cNvPr id="73" name="Ink 72">
@@ -7680,8 +7686,8 @@
             </p:pic>
           </mc:Fallback>
         </mc:AlternateContent>
-        <mc:AlternateContent xmlns:mc="http://schemas.openxmlformats.org/markup-compatibility/2006">
-          <mc:Choice xmlns:p14="http://schemas.microsoft.com/office/powerpoint/2010/main" Requires="p14">
+        <mc:AlternateContent xmlns:mc="http://schemas.openxmlformats.org/markup-compatibility/2006" xmlns:p14="http://schemas.microsoft.com/office/powerpoint/2010/main">
+          <mc:Choice Requires="p14">
             <p:contentPart p14:bwMode="auto" r:id="rId90">
               <p14:nvContentPartPr>
                 <p14:cNvPr id="74" name="Ink 73">
@@ -7700,7 +7706,7 @@
               </p14:xfrm>
             </p:contentPart>
           </mc:Choice>
-          <mc:Fallback>
+          <mc:Fallback xmlns="">
             <p:pic>
               <p:nvPicPr>
                 <p:cNvPr id="74" name="Ink 73">
@@ -7731,8 +7737,8 @@
             </p:pic>
           </mc:Fallback>
         </mc:AlternateContent>
-        <mc:AlternateContent xmlns:mc="http://schemas.openxmlformats.org/markup-compatibility/2006">
-          <mc:Choice xmlns:p14="http://schemas.microsoft.com/office/powerpoint/2010/main" Requires="p14">
+        <mc:AlternateContent xmlns:mc="http://schemas.openxmlformats.org/markup-compatibility/2006" xmlns:p14="http://schemas.microsoft.com/office/powerpoint/2010/main">
+          <mc:Choice Requires="p14">
             <p:contentPart p14:bwMode="auto" r:id="rId92">
               <p14:nvContentPartPr>
                 <p14:cNvPr id="79" name="Ink 78">
@@ -7751,7 +7757,7 @@
               </p14:xfrm>
             </p:contentPart>
           </mc:Choice>
-          <mc:Fallback>
+          <mc:Fallback xmlns="">
             <p:pic>
               <p:nvPicPr>
                 <p:cNvPr id="79" name="Ink 78">
@@ -7782,8 +7788,8 @@
             </p:pic>
           </mc:Fallback>
         </mc:AlternateContent>
-        <mc:AlternateContent xmlns:mc="http://schemas.openxmlformats.org/markup-compatibility/2006">
-          <mc:Choice xmlns:p14="http://schemas.microsoft.com/office/powerpoint/2010/main" Requires="p14">
+        <mc:AlternateContent xmlns:mc="http://schemas.openxmlformats.org/markup-compatibility/2006" xmlns:p14="http://schemas.microsoft.com/office/powerpoint/2010/main">
+          <mc:Choice Requires="p14">
             <p:contentPart p14:bwMode="auto" r:id="rId94">
               <p14:nvContentPartPr>
                 <p14:cNvPr id="80" name="Ink 79">
@@ -7802,7 +7808,7 @@
               </p14:xfrm>
             </p:contentPart>
           </mc:Choice>
-          <mc:Fallback>
+          <mc:Fallback xmlns="">
             <p:pic>
               <p:nvPicPr>
                 <p:cNvPr id="80" name="Ink 79">
@@ -7833,8 +7839,8 @@
             </p:pic>
           </mc:Fallback>
         </mc:AlternateContent>
-        <mc:AlternateContent xmlns:mc="http://schemas.openxmlformats.org/markup-compatibility/2006">
-          <mc:Choice xmlns:p14="http://schemas.microsoft.com/office/powerpoint/2010/main" Requires="p14">
+        <mc:AlternateContent xmlns:mc="http://schemas.openxmlformats.org/markup-compatibility/2006" xmlns:p14="http://schemas.microsoft.com/office/powerpoint/2010/main">
+          <mc:Choice Requires="p14">
             <p:contentPart p14:bwMode="auto" r:id="rId96">
               <p14:nvContentPartPr>
                 <p14:cNvPr id="83" name="Ink 82">
@@ -7853,7 +7859,7 @@
               </p14:xfrm>
             </p:contentPart>
           </mc:Choice>
-          <mc:Fallback>
+          <mc:Fallback xmlns="">
             <p:pic>
               <p:nvPicPr>
                 <p:cNvPr id="83" name="Ink 82">
@@ -7884,8 +7890,8 @@
             </p:pic>
           </mc:Fallback>
         </mc:AlternateContent>
-        <mc:AlternateContent xmlns:mc="http://schemas.openxmlformats.org/markup-compatibility/2006">
-          <mc:Choice xmlns:p14="http://schemas.microsoft.com/office/powerpoint/2010/main" Requires="p14">
+        <mc:AlternateContent xmlns:mc="http://schemas.openxmlformats.org/markup-compatibility/2006" xmlns:p14="http://schemas.microsoft.com/office/powerpoint/2010/main">
+          <mc:Choice Requires="p14">
             <p:contentPart p14:bwMode="auto" r:id="rId98">
               <p14:nvContentPartPr>
                 <p14:cNvPr id="84" name="Ink 83">
@@ -7904,7 +7910,7 @@
               </p14:xfrm>
             </p:contentPart>
           </mc:Choice>
-          <mc:Fallback>
+          <mc:Fallback xmlns="">
             <p:pic>
               <p:nvPicPr>
                 <p:cNvPr id="84" name="Ink 83">
@@ -7935,8 +7941,8 @@
             </p:pic>
           </mc:Fallback>
         </mc:AlternateContent>
-        <mc:AlternateContent xmlns:mc="http://schemas.openxmlformats.org/markup-compatibility/2006">
-          <mc:Choice xmlns:p14="http://schemas.microsoft.com/office/powerpoint/2010/main" Requires="p14">
+        <mc:AlternateContent xmlns:mc="http://schemas.openxmlformats.org/markup-compatibility/2006" xmlns:p14="http://schemas.microsoft.com/office/powerpoint/2010/main">
+          <mc:Choice Requires="p14">
             <p:contentPart p14:bwMode="auto" r:id="rId100">
               <p14:nvContentPartPr>
                 <p14:cNvPr id="85" name="Ink 84">
@@ -7955,7 +7961,7 @@
               </p14:xfrm>
             </p:contentPart>
           </mc:Choice>
-          <mc:Fallback>
+          <mc:Fallback xmlns="">
             <p:pic>
               <p:nvPicPr>
                 <p:cNvPr id="85" name="Ink 84">
@@ -7991,6 +7997,1249 @@
     <p:extLst>
       <p:ext uri="{BB962C8B-B14F-4D97-AF65-F5344CB8AC3E}">
         <p14:creationId xmlns:p14="http://schemas.microsoft.com/office/powerpoint/2010/main" val="2542869434"/>
+      </p:ext>
+    </p:extLst>
+  </p:cSld>
+  <p:clrMapOvr>
+    <a:masterClrMapping/>
+  </p:clrMapOvr>
+</p:sld>
+</file>
+
+<file path=ppt/slides/slide3.xml><?xml version="1.0" encoding="utf-8"?>
+<p:sld xmlns:a="http://schemas.openxmlformats.org/drawingml/2006/main" xmlns:r="http://schemas.openxmlformats.org/officeDocument/2006/relationships" xmlns:p="http://schemas.openxmlformats.org/presentationml/2006/main">
+  <p:cSld>
+    <p:spTree>
+      <p:nvGrpSpPr>
+        <p:cNvPr id="1" name=""/>
+        <p:cNvGrpSpPr/>
+        <p:nvPr/>
+      </p:nvGrpSpPr>
+      <p:grpSpPr>
+        <a:xfrm>
+          <a:off x="0" y="0"/>
+          <a:ext cx="0" cy="0"/>
+          <a:chOff x="0" y="0"/>
+          <a:chExt cx="0" cy="0"/>
+        </a:xfrm>
+      </p:grpSpPr>
+      <p:sp>
+        <p:nvSpPr>
+          <p:cNvPr id="2" name="Title 1">
+            <a:extLst>
+              <a:ext uri="{FF2B5EF4-FFF2-40B4-BE49-F238E27FC236}">
+                <a16:creationId xmlns:a16="http://schemas.microsoft.com/office/drawing/2014/main" id="{7DDED4C6-3EBF-6EA9-9662-E050F71170F5}"/>
+              </a:ext>
+            </a:extLst>
+          </p:cNvPr>
+          <p:cNvSpPr>
+            <a:spLocks noGrp="1"/>
+          </p:cNvSpPr>
+          <p:nvPr>
+            <p:ph type="title"/>
+          </p:nvPr>
+        </p:nvSpPr>
+        <p:spPr/>
+        <p:txBody>
+          <a:bodyPr/>
+          <a:lstStyle/>
+          <a:p>
+            <a:r>
+              <a:rPr lang="en-US" dirty="0"/>
+              <a:t>Stack vs heap</a:t>
+            </a:r>
+          </a:p>
+        </p:txBody>
+      </p:sp>
+      <p:graphicFrame>
+        <p:nvGraphicFramePr>
+          <p:cNvPr id="4" name="Table 4">
+            <a:extLst>
+              <a:ext uri="{FF2B5EF4-FFF2-40B4-BE49-F238E27FC236}">
+                <a16:creationId xmlns:a16="http://schemas.microsoft.com/office/drawing/2014/main" id="{4F905B0C-F9F6-2DBC-0C23-9AB20329C414}"/>
+              </a:ext>
+            </a:extLst>
+          </p:cNvPr>
+          <p:cNvGraphicFramePr>
+            <a:graphicFrameLocks noGrp="1"/>
+          </p:cNvGraphicFramePr>
+          <p:nvPr>
+            <p:extLst>
+              <p:ext uri="{D42A27DB-BD31-4B8C-83A1-F6EECF244321}">
+                <p14:modId xmlns:p14="http://schemas.microsoft.com/office/powerpoint/2010/main" val="983866265"/>
+              </p:ext>
+            </p:extLst>
+          </p:nvPr>
+        </p:nvGraphicFramePr>
+        <p:xfrm>
+          <a:off x="666116" y="3165686"/>
+          <a:ext cx="2597149" cy="3094144"/>
+        </p:xfrm>
+        <a:graphic>
+          <a:graphicData uri="http://schemas.openxmlformats.org/drawingml/2006/table">
+            <a:tbl>
+              <a:tblPr firstRow="1" bandRow="1">
+                <a:tableStyleId>{5C22544A-7EE6-4342-B048-85BDC9FD1C3A}</a:tableStyleId>
+              </a:tblPr>
+              <a:tblGrid>
+                <a:gridCol w="2597149">
+                  <a:extLst>
+                    <a:ext uri="{9D8B030D-6E8A-4147-A177-3AD203B41FA5}">
+                      <a16:colId xmlns:a16="http://schemas.microsoft.com/office/drawing/2014/main" val="1869081983"/>
+                    </a:ext>
+                  </a:extLst>
+                </a:gridCol>
+              </a:tblGrid>
+              <a:tr h="370840">
+                <a:tc>
+                  <a:txBody>
+                    <a:bodyPr/>
+                    <a:lstStyle/>
+                    <a:p>
+                      <a:r>
+                        <a:rPr lang="en-US" dirty="0"/>
+                        <a:t>Stack – value types</a:t>
+                      </a:r>
+                    </a:p>
+                  </a:txBody>
+                  <a:tcPr/>
+                </a:tc>
+                <a:extLst>
+                  <a:ext uri="{0D108BD9-81ED-4DB2-BD59-A6C34878D82A}">
+                    <a16:rowId xmlns:a16="http://schemas.microsoft.com/office/drawing/2014/main" val="2255237968"/>
+                  </a:ext>
+                </a:extLst>
+              </a:tr>
+              <a:tr h="498264">
+                <a:tc>
+                  <a:txBody>
+                    <a:bodyPr/>
+                    <a:lstStyle/>
+                    <a:p>
+                      <a:r>
+                        <a:rPr lang="en-US" dirty="0"/>
+                        <a:t>D1</a:t>
+                      </a:r>
+                    </a:p>
+                  </a:txBody>
+                  <a:tcPr/>
+                </a:tc>
+                <a:extLst>
+                  <a:ext uri="{0D108BD9-81ED-4DB2-BD59-A6C34878D82A}">
+                    <a16:rowId xmlns:a16="http://schemas.microsoft.com/office/drawing/2014/main" val="293379562"/>
+                  </a:ext>
+                </a:extLst>
+              </a:tr>
+              <a:tr h="370840">
+                <a:tc>
+                  <a:txBody>
+                    <a:bodyPr/>
+                    <a:lstStyle/>
+                    <a:p>
+                      <a:r>
+                        <a:rPr lang="en-US" dirty="0"/>
+                        <a:t>d2</a:t>
+                      </a:r>
+                    </a:p>
+                  </a:txBody>
+                  <a:tcPr/>
+                </a:tc>
+                <a:extLst>
+                  <a:ext uri="{0D108BD9-81ED-4DB2-BD59-A6C34878D82A}">
+                    <a16:rowId xmlns:a16="http://schemas.microsoft.com/office/drawing/2014/main" val="1469738079"/>
+                  </a:ext>
+                </a:extLst>
+              </a:tr>
+              <a:tr h="370840">
+                <a:tc>
+                  <a:txBody>
+                    <a:bodyPr/>
+                    <a:lstStyle/>
+                    <a:p>
+                      <a:r>
+                        <a:rPr lang="en-US" dirty="0"/>
+                        <a:t>d3</a:t>
+                      </a:r>
+                    </a:p>
+                  </a:txBody>
+                  <a:tcPr/>
+                </a:tc>
+                <a:extLst>
+                  <a:ext uri="{0D108BD9-81ED-4DB2-BD59-A6C34878D82A}">
+                    <a16:rowId xmlns:a16="http://schemas.microsoft.com/office/drawing/2014/main" val="554893149"/>
+                  </a:ext>
+                </a:extLst>
+              </a:tr>
+              <a:tr h="370840">
+                <a:tc>
+                  <a:txBody>
+                    <a:bodyPr/>
+                    <a:lstStyle/>
+                    <a:p>
+                      <a:r>
+                        <a:rPr lang="en-US" dirty="0"/>
+                        <a:t>d4</a:t>
+                      </a:r>
+                    </a:p>
+                  </a:txBody>
+                  <a:tcPr/>
+                </a:tc>
+                <a:extLst>
+                  <a:ext uri="{0D108BD9-81ED-4DB2-BD59-A6C34878D82A}">
+                    <a16:rowId xmlns:a16="http://schemas.microsoft.com/office/drawing/2014/main" val="527915888"/>
+                  </a:ext>
+                </a:extLst>
+              </a:tr>
+              <a:tr h="370840">
+                <a:tc>
+                  <a:txBody>
+                    <a:bodyPr/>
+                    <a:lstStyle/>
+                    <a:p>
+                      <a:r>
+                        <a:rPr lang="en-US" dirty="0"/>
+                        <a:t>d2</a:t>
+                      </a:r>
+                    </a:p>
+                  </a:txBody>
+                  <a:tcPr/>
+                </a:tc>
+                <a:extLst>
+                  <a:ext uri="{0D108BD9-81ED-4DB2-BD59-A6C34878D82A}">
+                    <a16:rowId xmlns:a16="http://schemas.microsoft.com/office/drawing/2014/main" val="3788806623"/>
+                  </a:ext>
+                </a:extLst>
+              </a:tr>
+              <a:tr h="370840">
+                <a:tc>
+                  <a:txBody>
+                    <a:bodyPr/>
+                    <a:lstStyle/>
+                    <a:p>
+                      <a:endParaRPr lang="en-US" dirty="0"/>
+                    </a:p>
+                  </a:txBody>
+                  <a:tcPr/>
+                </a:tc>
+                <a:extLst>
+                  <a:ext uri="{0D108BD9-81ED-4DB2-BD59-A6C34878D82A}">
+                    <a16:rowId xmlns:a16="http://schemas.microsoft.com/office/drawing/2014/main" val="2293391430"/>
+                  </a:ext>
+                </a:extLst>
+              </a:tr>
+              <a:tr h="370840">
+                <a:tc>
+                  <a:txBody>
+                    <a:bodyPr/>
+                    <a:lstStyle/>
+                    <a:p>
+                      <a:endParaRPr lang="en-US" dirty="0"/>
+                    </a:p>
+                  </a:txBody>
+                  <a:tcPr/>
+                </a:tc>
+                <a:extLst>
+                  <a:ext uri="{0D108BD9-81ED-4DB2-BD59-A6C34878D82A}">
+                    <a16:rowId xmlns:a16="http://schemas.microsoft.com/office/drawing/2014/main" val="1652297180"/>
+                  </a:ext>
+                </a:extLst>
+              </a:tr>
+            </a:tbl>
+          </a:graphicData>
+        </a:graphic>
+      </p:graphicFrame>
+      <p:graphicFrame>
+        <p:nvGraphicFramePr>
+          <p:cNvPr id="5" name="Table 5">
+            <a:extLst>
+              <a:ext uri="{FF2B5EF4-FFF2-40B4-BE49-F238E27FC236}">
+                <a16:creationId xmlns:a16="http://schemas.microsoft.com/office/drawing/2014/main" id="{F97BBEF2-14BA-4125-C855-E8C408C8C712}"/>
+              </a:ext>
+            </a:extLst>
+          </p:cNvPr>
+          <p:cNvGraphicFramePr>
+            <a:graphicFrameLocks noGrp="1"/>
+          </p:cNvGraphicFramePr>
+          <p:nvPr>
+            <p:extLst>
+              <p:ext uri="{D42A27DB-BD31-4B8C-83A1-F6EECF244321}">
+                <p14:modId xmlns:p14="http://schemas.microsoft.com/office/powerpoint/2010/main" val="637553811"/>
+              </p:ext>
+            </p:extLst>
+          </p:nvPr>
+        </p:nvGraphicFramePr>
+        <p:xfrm>
+          <a:off x="4720590" y="3249718"/>
+          <a:ext cx="7193920" cy="2926080"/>
+        </p:xfrm>
+        <a:graphic>
+          <a:graphicData uri="http://schemas.openxmlformats.org/drawingml/2006/table">
+            <a:tbl>
+              <a:tblPr firstRow="1" bandRow="1">
+                <a:tableStyleId>{5C22544A-7EE6-4342-B048-85BDC9FD1C3A}</a:tableStyleId>
+              </a:tblPr>
+              <a:tblGrid>
+                <a:gridCol w="719392">
+                  <a:extLst>
+                    <a:ext uri="{9D8B030D-6E8A-4147-A177-3AD203B41FA5}">
+                      <a16:colId xmlns:a16="http://schemas.microsoft.com/office/drawing/2014/main" val="702831342"/>
+                    </a:ext>
+                  </a:extLst>
+                </a:gridCol>
+                <a:gridCol w="719392">
+                  <a:extLst>
+                    <a:ext uri="{9D8B030D-6E8A-4147-A177-3AD203B41FA5}">
+                      <a16:colId xmlns:a16="http://schemas.microsoft.com/office/drawing/2014/main" val="2764317713"/>
+                    </a:ext>
+                  </a:extLst>
+                </a:gridCol>
+                <a:gridCol w="719392">
+                  <a:extLst>
+                    <a:ext uri="{9D8B030D-6E8A-4147-A177-3AD203B41FA5}">
+                      <a16:colId xmlns:a16="http://schemas.microsoft.com/office/drawing/2014/main" val="1323907336"/>
+                    </a:ext>
+                  </a:extLst>
+                </a:gridCol>
+                <a:gridCol w="719392">
+                  <a:extLst>
+                    <a:ext uri="{9D8B030D-6E8A-4147-A177-3AD203B41FA5}">
+                      <a16:colId xmlns:a16="http://schemas.microsoft.com/office/drawing/2014/main" val="909434025"/>
+                    </a:ext>
+                  </a:extLst>
+                </a:gridCol>
+                <a:gridCol w="719392">
+                  <a:extLst>
+                    <a:ext uri="{9D8B030D-6E8A-4147-A177-3AD203B41FA5}">
+                      <a16:colId xmlns:a16="http://schemas.microsoft.com/office/drawing/2014/main" val="1285831145"/>
+                    </a:ext>
+                  </a:extLst>
+                </a:gridCol>
+                <a:gridCol w="719392">
+                  <a:extLst>
+                    <a:ext uri="{9D8B030D-6E8A-4147-A177-3AD203B41FA5}">
+                      <a16:colId xmlns:a16="http://schemas.microsoft.com/office/drawing/2014/main" val="2528270795"/>
+                    </a:ext>
+                  </a:extLst>
+                </a:gridCol>
+                <a:gridCol w="719392">
+                  <a:extLst>
+                    <a:ext uri="{9D8B030D-6E8A-4147-A177-3AD203B41FA5}">
+                      <a16:colId xmlns:a16="http://schemas.microsoft.com/office/drawing/2014/main" val="1500715360"/>
+                    </a:ext>
+                  </a:extLst>
+                </a:gridCol>
+                <a:gridCol w="719392">
+                  <a:extLst>
+                    <a:ext uri="{9D8B030D-6E8A-4147-A177-3AD203B41FA5}">
+                      <a16:colId xmlns:a16="http://schemas.microsoft.com/office/drawing/2014/main" val="2298241234"/>
+                    </a:ext>
+                  </a:extLst>
+                </a:gridCol>
+                <a:gridCol w="719392">
+                  <a:extLst>
+                    <a:ext uri="{9D8B030D-6E8A-4147-A177-3AD203B41FA5}">
+                      <a16:colId xmlns:a16="http://schemas.microsoft.com/office/drawing/2014/main" val="3791460395"/>
+                    </a:ext>
+                  </a:extLst>
+                </a:gridCol>
+                <a:gridCol w="719392">
+                  <a:extLst>
+                    <a:ext uri="{9D8B030D-6E8A-4147-A177-3AD203B41FA5}">
+                      <a16:colId xmlns:a16="http://schemas.microsoft.com/office/drawing/2014/main" val="2650078833"/>
+                    </a:ext>
+                  </a:extLst>
+                </a:gridCol>
+              </a:tblGrid>
+              <a:tr h="360786">
+                <a:tc>
+                  <a:txBody>
+                    <a:bodyPr/>
+                    <a:lstStyle/>
+                    <a:p>
+                      <a:r>
+                        <a:rPr lang="en-US" dirty="0"/>
+                        <a:t>heap</a:t>
+                      </a:r>
+                    </a:p>
+                  </a:txBody>
+                  <a:tcPr/>
+                </a:tc>
+                <a:tc>
+                  <a:txBody>
+                    <a:bodyPr/>
+                    <a:lstStyle/>
+                    <a:p>
+                      <a:r>
+                        <a:rPr lang="en-US" dirty="0"/>
+                        <a:t>Re</a:t>
+                      </a:r>
+                    </a:p>
+                  </a:txBody>
+                  <a:tcPr/>
+                </a:tc>
+                <a:tc>
+                  <a:txBody>
+                    <a:bodyPr/>
+                    <a:lstStyle/>
+                    <a:p>
+                      <a:r>
+                        <a:rPr lang="en-US" dirty="0"/>
+                        <a:t>Fe</a:t>
+                      </a:r>
+                    </a:p>
+                  </a:txBody>
+                  <a:tcPr/>
+                </a:tc>
+                <a:tc>
+                  <a:txBody>
+                    <a:bodyPr/>
+                    <a:lstStyle/>
+                    <a:p>
+                      <a:r>
+                        <a:rPr lang="en-US" dirty="0"/>
+                        <a:t>Re</a:t>
+                      </a:r>
+                    </a:p>
+                  </a:txBody>
+                  <a:tcPr/>
+                </a:tc>
+                <a:tc>
+                  <a:txBody>
+                    <a:bodyPr/>
+                    <a:lstStyle/>
+                    <a:p>
+                      <a:r>
+                        <a:rPr lang="en-US" dirty="0"/>
+                        <a:t>Nc</a:t>
+                      </a:r>
+                    </a:p>
+                  </a:txBody>
+                  <a:tcPr/>
+                </a:tc>
+                <a:tc>
+                  <a:txBody>
+                    <a:bodyPr/>
+                    <a:lstStyle/>
+                    <a:p>
+                      <a:r>
+                        <a:rPr lang="en-US" dirty="0" err="1"/>
+                        <a:t>eT</a:t>
+                      </a:r>
+                      <a:endParaRPr lang="en-US" dirty="0"/>
+                    </a:p>
+                  </a:txBody>
+                  <a:tcPr/>
+                </a:tc>
+                <a:tc>
+                  <a:txBody>
+                    <a:bodyPr/>
+                    <a:lstStyle/>
+                    <a:p>
+                      <a:r>
+                        <a:rPr lang="en-US" dirty="0" err="1"/>
+                        <a:t>Yp</a:t>
+                      </a:r>
+                      <a:endParaRPr lang="en-US" dirty="0"/>
+                    </a:p>
+                  </a:txBody>
+                  <a:tcPr/>
+                </a:tc>
+                <a:tc>
+                  <a:txBody>
+                    <a:bodyPr/>
+                    <a:lstStyle/>
+                    <a:p>
+                      <a:r>
+                        <a:rPr lang="en-US" dirty="0"/>
+                        <a:t>es</a:t>
+                      </a:r>
+                    </a:p>
+                  </a:txBody>
+                  <a:tcPr/>
+                </a:tc>
+                <a:tc>
+                  <a:txBody>
+                    <a:bodyPr/>
+                    <a:lstStyle/>
+                    <a:p>
+                      <a:endParaRPr lang="en-US" dirty="0"/>
+                    </a:p>
+                  </a:txBody>
+                  <a:tcPr/>
+                </a:tc>
+                <a:tc>
+                  <a:txBody>
+                    <a:bodyPr/>
+                    <a:lstStyle/>
+                    <a:p>
+                      <a:endParaRPr lang="en-US"/>
+                    </a:p>
+                  </a:txBody>
+                  <a:tcPr/>
+                </a:tc>
+                <a:extLst>
+                  <a:ext uri="{0D108BD9-81ED-4DB2-BD59-A6C34878D82A}">
+                    <a16:rowId xmlns:a16="http://schemas.microsoft.com/office/drawing/2014/main" val="393697151"/>
+                  </a:ext>
+                </a:extLst>
+              </a:tr>
+              <a:tr h="360786">
+                <a:tc>
+                  <a:txBody>
+                    <a:bodyPr/>
+                    <a:lstStyle/>
+                    <a:p>
+                      <a:endParaRPr lang="en-US"/>
+                    </a:p>
+                  </a:txBody>
+                  <a:tcPr/>
+                </a:tc>
+                <a:tc>
+                  <a:txBody>
+                    <a:bodyPr/>
+                    <a:lstStyle/>
+                    <a:p>
+                      <a:endParaRPr lang="en-US"/>
+                    </a:p>
+                  </a:txBody>
+                  <a:tcPr/>
+                </a:tc>
+                <a:tc>
+                  <a:txBody>
+                    <a:bodyPr/>
+                    <a:lstStyle/>
+                    <a:p>
+                      <a:endParaRPr lang="en-US"/>
+                    </a:p>
+                  </a:txBody>
+                  <a:tcPr/>
+                </a:tc>
+                <a:tc>
+                  <a:txBody>
+                    <a:bodyPr/>
+                    <a:lstStyle/>
+                    <a:p>
+                      <a:endParaRPr lang="en-US"/>
+                    </a:p>
+                  </a:txBody>
+                  <a:tcPr/>
+                </a:tc>
+                <a:tc>
+                  <a:txBody>
+                    <a:bodyPr/>
+                    <a:lstStyle/>
+                    <a:p>
+                      <a:endParaRPr lang="en-US"/>
+                    </a:p>
+                  </a:txBody>
+                  <a:tcPr/>
+                </a:tc>
+                <a:tc>
+                  <a:txBody>
+                    <a:bodyPr/>
+                    <a:lstStyle/>
+                    <a:p>
+                      <a:endParaRPr lang="en-US"/>
+                    </a:p>
+                  </a:txBody>
+                  <a:tcPr/>
+                </a:tc>
+                <a:tc>
+                  <a:txBody>
+                    <a:bodyPr/>
+                    <a:lstStyle/>
+                    <a:p>
+                      <a:endParaRPr lang="en-US"/>
+                    </a:p>
+                  </a:txBody>
+                  <a:tcPr/>
+                </a:tc>
+                <a:tc>
+                  <a:txBody>
+                    <a:bodyPr/>
+                    <a:lstStyle/>
+                    <a:p>
+                      <a:endParaRPr lang="en-US"/>
+                    </a:p>
+                  </a:txBody>
+                  <a:tcPr/>
+                </a:tc>
+                <a:tc>
+                  <a:txBody>
+                    <a:bodyPr/>
+                    <a:lstStyle/>
+                    <a:p>
+                      <a:endParaRPr lang="en-US"/>
+                    </a:p>
+                  </a:txBody>
+                  <a:tcPr/>
+                </a:tc>
+                <a:tc>
+                  <a:txBody>
+                    <a:bodyPr/>
+                    <a:lstStyle/>
+                    <a:p>
+                      <a:endParaRPr lang="en-US"/>
+                    </a:p>
+                  </a:txBody>
+                  <a:tcPr/>
+                </a:tc>
+                <a:extLst>
+                  <a:ext uri="{0D108BD9-81ED-4DB2-BD59-A6C34878D82A}">
+                    <a16:rowId xmlns:a16="http://schemas.microsoft.com/office/drawing/2014/main" val="1119003929"/>
+                  </a:ext>
+                </a:extLst>
+              </a:tr>
+              <a:tr h="360786">
+                <a:tc>
+                  <a:txBody>
+                    <a:bodyPr/>
+                    <a:lstStyle/>
+                    <a:p>
+                      <a:endParaRPr lang="en-US"/>
+                    </a:p>
+                  </a:txBody>
+                  <a:tcPr/>
+                </a:tc>
+                <a:tc>
+                  <a:txBody>
+                    <a:bodyPr/>
+                    <a:lstStyle/>
+                    <a:p>
+                      <a:endParaRPr lang="en-US"/>
+                    </a:p>
+                  </a:txBody>
+                  <a:tcPr/>
+                </a:tc>
+                <a:tc>
+                  <a:txBody>
+                    <a:bodyPr/>
+                    <a:lstStyle/>
+                    <a:p>
+                      <a:endParaRPr lang="en-US"/>
+                    </a:p>
+                  </a:txBody>
+                  <a:tcPr/>
+                </a:tc>
+                <a:tc>
+                  <a:txBody>
+                    <a:bodyPr/>
+                    <a:lstStyle/>
+                    <a:p>
+                      <a:endParaRPr lang="en-US"/>
+                    </a:p>
+                  </a:txBody>
+                  <a:tcPr/>
+                </a:tc>
+                <a:tc>
+                  <a:txBody>
+                    <a:bodyPr/>
+                    <a:lstStyle/>
+                    <a:p>
+                      <a:endParaRPr lang="en-US"/>
+                    </a:p>
+                  </a:txBody>
+                  <a:tcPr/>
+                </a:tc>
+                <a:tc>
+                  <a:txBody>
+                    <a:bodyPr/>
+                    <a:lstStyle/>
+                    <a:p>
+                      <a:endParaRPr lang="en-US"/>
+                    </a:p>
+                  </a:txBody>
+                  <a:tcPr/>
+                </a:tc>
+                <a:tc>
+                  <a:txBody>
+                    <a:bodyPr/>
+                    <a:lstStyle/>
+                    <a:p>
+                      <a:endParaRPr lang="en-US"/>
+                    </a:p>
+                  </a:txBody>
+                  <a:tcPr/>
+                </a:tc>
+                <a:tc>
+                  <a:txBody>
+                    <a:bodyPr/>
+                    <a:lstStyle/>
+                    <a:p>
+                      <a:endParaRPr lang="en-US"/>
+                    </a:p>
+                  </a:txBody>
+                  <a:tcPr/>
+                </a:tc>
+                <a:tc>
+                  <a:txBody>
+                    <a:bodyPr/>
+                    <a:lstStyle/>
+                    <a:p>
+                      <a:endParaRPr lang="en-US"/>
+                    </a:p>
+                  </a:txBody>
+                  <a:tcPr/>
+                </a:tc>
+                <a:tc>
+                  <a:txBody>
+                    <a:bodyPr/>
+                    <a:lstStyle/>
+                    <a:p>
+                      <a:endParaRPr lang="en-US"/>
+                    </a:p>
+                  </a:txBody>
+                  <a:tcPr/>
+                </a:tc>
+                <a:extLst>
+                  <a:ext uri="{0D108BD9-81ED-4DB2-BD59-A6C34878D82A}">
+                    <a16:rowId xmlns:a16="http://schemas.microsoft.com/office/drawing/2014/main" val="2120427581"/>
+                  </a:ext>
+                </a:extLst>
+              </a:tr>
+              <a:tr h="360786">
+                <a:tc>
+                  <a:txBody>
+                    <a:bodyPr/>
+                    <a:lstStyle/>
+                    <a:p>
+                      <a:endParaRPr lang="en-US"/>
+                    </a:p>
+                  </a:txBody>
+                  <a:tcPr/>
+                </a:tc>
+                <a:tc>
+                  <a:txBody>
+                    <a:bodyPr/>
+                    <a:lstStyle/>
+                    <a:p>
+                      <a:endParaRPr lang="en-US"/>
+                    </a:p>
+                  </a:txBody>
+                  <a:tcPr/>
+                </a:tc>
+                <a:tc>
+                  <a:txBody>
+                    <a:bodyPr/>
+                    <a:lstStyle/>
+                    <a:p>
+                      <a:endParaRPr lang="en-US"/>
+                    </a:p>
+                  </a:txBody>
+                  <a:tcPr/>
+                </a:tc>
+                <a:tc>
+                  <a:txBody>
+                    <a:bodyPr/>
+                    <a:lstStyle/>
+                    <a:p>
+                      <a:endParaRPr lang="en-US"/>
+                    </a:p>
+                  </a:txBody>
+                  <a:tcPr/>
+                </a:tc>
+                <a:tc>
+                  <a:txBody>
+                    <a:bodyPr/>
+                    <a:lstStyle/>
+                    <a:p>
+                      <a:endParaRPr lang="en-US"/>
+                    </a:p>
+                  </a:txBody>
+                  <a:tcPr/>
+                </a:tc>
+                <a:tc>
+                  <a:txBody>
+                    <a:bodyPr/>
+                    <a:lstStyle/>
+                    <a:p>
+                      <a:endParaRPr lang="en-US"/>
+                    </a:p>
+                  </a:txBody>
+                  <a:tcPr/>
+                </a:tc>
+                <a:tc>
+                  <a:txBody>
+                    <a:bodyPr/>
+                    <a:lstStyle/>
+                    <a:p>
+                      <a:endParaRPr lang="en-US"/>
+                    </a:p>
+                  </a:txBody>
+                  <a:tcPr/>
+                </a:tc>
+                <a:tc>
+                  <a:txBody>
+                    <a:bodyPr/>
+                    <a:lstStyle/>
+                    <a:p>
+                      <a:endParaRPr lang="en-US"/>
+                    </a:p>
+                  </a:txBody>
+                  <a:tcPr/>
+                </a:tc>
+                <a:tc>
+                  <a:txBody>
+                    <a:bodyPr/>
+                    <a:lstStyle/>
+                    <a:p>
+                      <a:endParaRPr lang="en-US"/>
+                    </a:p>
+                  </a:txBody>
+                  <a:tcPr/>
+                </a:tc>
+                <a:tc>
+                  <a:txBody>
+                    <a:bodyPr/>
+                    <a:lstStyle/>
+                    <a:p>
+                      <a:endParaRPr lang="en-US"/>
+                    </a:p>
+                  </a:txBody>
+                  <a:tcPr/>
+                </a:tc>
+                <a:extLst>
+                  <a:ext uri="{0D108BD9-81ED-4DB2-BD59-A6C34878D82A}">
+                    <a16:rowId xmlns:a16="http://schemas.microsoft.com/office/drawing/2014/main" val="1865382710"/>
+                  </a:ext>
+                </a:extLst>
+              </a:tr>
+              <a:tr h="360786">
+                <a:tc>
+                  <a:txBody>
+                    <a:bodyPr/>
+                    <a:lstStyle/>
+                    <a:p>
+                      <a:endParaRPr lang="en-US"/>
+                    </a:p>
+                  </a:txBody>
+                  <a:tcPr/>
+                </a:tc>
+                <a:tc>
+                  <a:txBody>
+                    <a:bodyPr/>
+                    <a:lstStyle/>
+                    <a:p>
+                      <a:endParaRPr lang="en-US"/>
+                    </a:p>
+                  </a:txBody>
+                  <a:tcPr/>
+                </a:tc>
+                <a:tc>
+                  <a:txBody>
+                    <a:bodyPr/>
+                    <a:lstStyle/>
+                    <a:p>
+                      <a:endParaRPr lang="en-US"/>
+                    </a:p>
+                  </a:txBody>
+                  <a:tcPr/>
+                </a:tc>
+                <a:tc>
+                  <a:txBody>
+                    <a:bodyPr/>
+                    <a:lstStyle/>
+                    <a:p>
+                      <a:endParaRPr lang="en-US"/>
+                    </a:p>
+                  </a:txBody>
+                  <a:tcPr/>
+                </a:tc>
+                <a:tc>
+                  <a:txBody>
+                    <a:bodyPr/>
+                    <a:lstStyle/>
+                    <a:p>
+                      <a:endParaRPr lang="en-US"/>
+                    </a:p>
+                  </a:txBody>
+                  <a:tcPr/>
+                </a:tc>
+                <a:tc>
+                  <a:txBody>
+                    <a:bodyPr/>
+                    <a:lstStyle/>
+                    <a:p>
+                      <a:endParaRPr lang="en-US"/>
+                    </a:p>
+                  </a:txBody>
+                  <a:tcPr/>
+                </a:tc>
+                <a:tc>
+                  <a:txBody>
+                    <a:bodyPr/>
+                    <a:lstStyle/>
+                    <a:p>
+                      <a:endParaRPr lang="en-US"/>
+                    </a:p>
+                  </a:txBody>
+                  <a:tcPr/>
+                </a:tc>
+                <a:tc>
+                  <a:txBody>
+                    <a:bodyPr/>
+                    <a:lstStyle/>
+                    <a:p>
+                      <a:endParaRPr lang="en-US"/>
+                    </a:p>
+                  </a:txBody>
+                  <a:tcPr/>
+                </a:tc>
+                <a:tc>
+                  <a:txBody>
+                    <a:bodyPr/>
+                    <a:lstStyle/>
+                    <a:p>
+                      <a:endParaRPr lang="en-US"/>
+                    </a:p>
+                  </a:txBody>
+                  <a:tcPr/>
+                </a:tc>
+                <a:tc>
+                  <a:txBody>
+                    <a:bodyPr/>
+                    <a:lstStyle/>
+                    <a:p>
+                      <a:endParaRPr lang="en-US"/>
+                    </a:p>
+                  </a:txBody>
+                  <a:tcPr/>
+                </a:tc>
+                <a:extLst>
+                  <a:ext uri="{0D108BD9-81ED-4DB2-BD59-A6C34878D82A}">
+                    <a16:rowId xmlns:a16="http://schemas.microsoft.com/office/drawing/2014/main" val="1736711837"/>
+                  </a:ext>
+                </a:extLst>
+              </a:tr>
+              <a:tr h="360786">
+                <a:tc>
+                  <a:txBody>
+                    <a:bodyPr/>
+                    <a:lstStyle/>
+                    <a:p>
+                      <a:endParaRPr lang="en-US"/>
+                    </a:p>
+                  </a:txBody>
+                  <a:tcPr/>
+                </a:tc>
+                <a:tc>
+                  <a:txBody>
+                    <a:bodyPr/>
+                    <a:lstStyle/>
+                    <a:p>
+                      <a:endParaRPr lang="en-US"/>
+                    </a:p>
+                  </a:txBody>
+                  <a:tcPr/>
+                </a:tc>
+                <a:tc>
+                  <a:txBody>
+                    <a:bodyPr/>
+                    <a:lstStyle/>
+                    <a:p>
+                      <a:endParaRPr lang="en-US"/>
+                    </a:p>
+                  </a:txBody>
+                  <a:tcPr/>
+                </a:tc>
+                <a:tc>
+                  <a:txBody>
+                    <a:bodyPr/>
+                    <a:lstStyle/>
+                    <a:p>
+                      <a:endParaRPr lang="en-US"/>
+                    </a:p>
+                  </a:txBody>
+                  <a:tcPr/>
+                </a:tc>
+                <a:tc>
+                  <a:txBody>
+                    <a:bodyPr/>
+                    <a:lstStyle/>
+                    <a:p>
+                      <a:endParaRPr lang="en-US"/>
+                    </a:p>
+                  </a:txBody>
+                  <a:tcPr/>
+                </a:tc>
+                <a:tc>
+                  <a:txBody>
+                    <a:bodyPr/>
+                    <a:lstStyle/>
+                    <a:p>
+                      <a:endParaRPr lang="en-US"/>
+                    </a:p>
+                  </a:txBody>
+                  <a:tcPr/>
+                </a:tc>
+                <a:tc>
+                  <a:txBody>
+                    <a:bodyPr/>
+                    <a:lstStyle/>
+                    <a:p>
+                      <a:endParaRPr lang="en-US"/>
+                    </a:p>
+                  </a:txBody>
+                  <a:tcPr/>
+                </a:tc>
+                <a:tc>
+                  <a:txBody>
+                    <a:bodyPr/>
+                    <a:lstStyle/>
+                    <a:p>
+                      <a:endParaRPr lang="en-US"/>
+                    </a:p>
+                  </a:txBody>
+                  <a:tcPr/>
+                </a:tc>
+                <a:tc>
+                  <a:txBody>
+                    <a:bodyPr/>
+                    <a:lstStyle/>
+                    <a:p>
+                      <a:endParaRPr lang="en-US"/>
+                    </a:p>
+                  </a:txBody>
+                  <a:tcPr/>
+                </a:tc>
+                <a:tc>
+                  <a:txBody>
+                    <a:bodyPr/>
+                    <a:lstStyle/>
+                    <a:p>
+                      <a:endParaRPr lang="en-US"/>
+                    </a:p>
+                  </a:txBody>
+                  <a:tcPr/>
+                </a:tc>
+                <a:extLst>
+                  <a:ext uri="{0D108BD9-81ED-4DB2-BD59-A6C34878D82A}">
+                    <a16:rowId xmlns:a16="http://schemas.microsoft.com/office/drawing/2014/main" val="632593720"/>
+                  </a:ext>
+                </a:extLst>
+              </a:tr>
+              <a:tr h="360786">
+                <a:tc>
+                  <a:txBody>
+                    <a:bodyPr/>
+                    <a:lstStyle/>
+                    <a:p>
+                      <a:endParaRPr lang="en-US"/>
+                    </a:p>
+                  </a:txBody>
+                  <a:tcPr/>
+                </a:tc>
+                <a:tc>
+                  <a:txBody>
+                    <a:bodyPr/>
+                    <a:lstStyle/>
+                    <a:p>
+                      <a:endParaRPr lang="en-US"/>
+                    </a:p>
+                  </a:txBody>
+                  <a:tcPr/>
+                </a:tc>
+                <a:tc>
+                  <a:txBody>
+                    <a:bodyPr/>
+                    <a:lstStyle/>
+                    <a:p>
+                      <a:endParaRPr lang="en-US"/>
+                    </a:p>
+                  </a:txBody>
+                  <a:tcPr/>
+                </a:tc>
+                <a:tc>
+                  <a:txBody>
+                    <a:bodyPr/>
+                    <a:lstStyle/>
+                    <a:p>
+                      <a:endParaRPr lang="en-US"/>
+                    </a:p>
+                  </a:txBody>
+                  <a:tcPr/>
+                </a:tc>
+                <a:tc>
+                  <a:txBody>
+                    <a:bodyPr/>
+                    <a:lstStyle/>
+                    <a:p>
+                      <a:endParaRPr lang="en-US"/>
+                    </a:p>
+                  </a:txBody>
+                  <a:tcPr/>
+                </a:tc>
+                <a:tc>
+                  <a:txBody>
+                    <a:bodyPr/>
+                    <a:lstStyle/>
+                    <a:p>
+                      <a:endParaRPr lang="en-US"/>
+                    </a:p>
+                  </a:txBody>
+                  <a:tcPr/>
+                </a:tc>
+                <a:tc>
+                  <a:txBody>
+                    <a:bodyPr/>
+                    <a:lstStyle/>
+                    <a:p>
+                      <a:endParaRPr lang="en-US"/>
+                    </a:p>
+                  </a:txBody>
+                  <a:tcPr/>
+                </a:tc>
+                <a:tc>
+                  <a:txBody>
+                    <a:bodyPr/>
+                    <a:lstStyle/>
+                    <a:p>
+                      <a:endParaRPr lang="en-US"/>
+                    </a:p>
+                  </a:txBody>
+                  <a:tcPr/>
+                </a:tc>
+                <a:tc>
+                  <a:txBody>
+                    <a:bodyPr/>
+                    <a:lstStyle/>
+                    <a:p>
+                      <a:endParaRPr lang="en-US"/>
+                    </a:p>
+                  </a:txBody>
+                  <a:tcPr/>
+                </a:tc>
+                <a:tc>
+                  <a:txBody>
+                    <a:bodyPr/>
+                    <a:lstStyle/>
+                    <a:p>
+                      <a:endParaRPr lang="en-US"/>
+                    </a:p>
+                  </a:txBody>
+                  <a:tcPr/>
+                </a:tc>
+                <a:extLst>
+                  <a:ext uri="{0D108BD9-81ED-4DB2-BD59-A6C34878D82A}">
+                    <a16:rowId xmlns:a16="http://schemas.microsoft.com/office/drawing/2014/main" val="326405471"/>
+                  </a:ext>
+                </a:extLst>
+              </a:tr>
+              <a:tr h="360786">
+                <a:tc>
+                  <a:txBody>
+                    <a:bodyPr/>
+                    <a:lstStyle/>
+                    <a:p>
+                      <a:endParaRPr lang="en-US"/>
+                    </a:p>
+                  </a:txBody>
+                  <a:tcPr/>
+                </a:tc>
+                <a:tc>
+                  <a:txBody>
+                    <a:bodyPr/>
+                    <a:lstStyle/>
+                    <a:p>
+                      <a:endParaRPr lang="en-US"/>
+                    </a:p>
+                  </a:txBody>
+                  <a:tcPr/>
+                </a:tc>
+                <a:tc>
+                  <a:txBody>
+                    <a:bodyPr/>
+                    <a:lstStyle/>
+                    <a:p>
+                      <a:endParaRPr lang="en-US"/>
+                    </a:p>
+                  </a:txBody>
+                  <a:tcPr/>
+                </a:tc>
+                <a:tc>
+                  <a:txBody>
+                    <a:bodyPr/>
+                    <a:lstStyle/>
+                    <a:p>
+                      <a:endParaRPr lang="en-US"/>
+                    </a:p>
+                  </a:txBody>
+                  <a:tcPr/>
+                </a:tc>
+                <a:tc>
+                  <a:txBody>
+                    <a:bodyPr/>
+                    <a:lstStyle/>
+                    <a:p>
+                      <a:endParaRPr lang="en-US"/>
+                    </a:p>
+                  </a:txBody>
+                  <a:tcPr/>
+                </a:tc>
+                <a:tc>
+                  <a:txBody>
+                    <a:bodyPr/>
+                    <a:lstStyle/>
+                    <a:p>
+                      <a:endParaRPr lang="en-US"/>
+                    </a:p>
+                  </a:txBody>
+                  <a:tcPr/>
+                </a:tc>
+                <a:tc>
+                  <a:txBody>
+                    <a:bodyPr/>
+                    <a:lstStyle/>
+                    <a:p>
+                      <a:endParaRPr lang="en-US"/>
+                    </a:p>
+                  </a:txBody>
+                  <a:tcPr/>
+                </a:tc>
+                <a:tc>
+                  <a:txBody>
+                    <a:bodyPr/>
+                    <a:lstStyle/>
+                    <a:p>
+                      <a:endParaRPr lang="en-US"/>
+                    </a:p>
+                  </a:txBody>
+                  <a:tcPr/>
+                </a:tc>
+                <a:tc>
+                  <a:txBody>
+                    <a:bodyPr/>
+                    <a:lstStyle/>
+                    <a:p>
+                      <a:endParaRPr lang="en-US"/>
+                    </a:p>
+                  </a:txBody>
+                  <a:tcPr/>
+                </a:tc>
+                <a:tc>
+                  <a:txBody>
+                    <a:bodyPr/>
+                    <a:lstStyle/>
+                    <a:p>
+                      <a:endParaRPr lang="en-US" dirty="0"/>
+                    </a:p>
+                  </a:txBody>
+                  <a:tcPr/>
+                </a:tc>
+                <a:extLst>
+                  <a:ext uri="{0D108BD9-81ED-4DB2-BD59-A6C34878D82A}">
+                    <a16:rowId xmlns:a16="http://schemas.microsoft.com/office/drawing/2014/main" val="244164335"/>
+                  </a:ext>
+                </a:extLst>
+              </a:tr>
+            </a:tbl>
+          </a:graphicData>
+        </a:graphic>
+      </p:graphicFrame>
+    </p:spTree>
+    <p:extLst>
+      <p:ext uri="{BB962C8B-B14F-4D97-AF65-F5344CB8AC3E}">
+        <p14:creationId xmlns:p14="http://schemas.microsoft.com/office/powerpoint/2010/main" val="3098651009"/>
       </p:ext>
     </p:extLst>
   </p:cSld>

</xml_diff>

<commit_message>
adds data structure explanation to marksdrawrings
</commit_message>
<xml_diff>
--- a/resources/MarksDrawrings.pptx
+++ b/resources/MarksDrawrings.pptx
@@ -8,6 +8,9 @@
     <p:sldId id="256" r:id="rId2"/>
     <p:sldId id="257" r:id="rId3"/>
     <p:sldId id="258" r:id="rId4"/>
+    <p:sldId id="259" r:id="rId5"/>
+    <p:sldId id="260" r:id="rId6"/>
+    <p:sldId id="261" r:id="rId7"/>
   </p:sldIdLst>
   <p:sldSz cx="12192000" cy="6858000"/>
   <p:notesSz cx="6858000" cy="9144000"/>
@@ -1627,7 +1630,7 @@
           <a:p>
             <a:fld id="{EFED3043-6CE1-4075-A706-4B000AA47C6A}" type="datetimeFigureOut">
               <a:rPr lang="en-US" smtClean="0"/>
-              <a:t>11/16/2022</a:t>
+              <a:t>11/22/2022</a:t>
             </a:fld>
             <a:endParaRPr lang="en-US"/>
           </a:p>
@@ -1825,7 +1828,7 @@
           <a:p>
             <a:fld id="{EFED3043-6CE1-4075-A706-4B000AA47C6A}" type="datetimeFigureOut">
               <a:rPr lang="en-US" smtClean="0"/>
-              <a:t>11/16/2022</a:t>
+              <a:t>11/22/2022</a:t>
             </a:fld>
             <a:endParaRPr lang="en-US"/>
           </a:p>
@@ -2033,7 +2036,7 @@
           <a:p>
             <a:fld id="{EFED3043-6CE1-4075-A706-4B000AA47C6A}" type="datetimeFigureOut">
               <a:rPr lang="en-US" smtClean="0"/>
-              <a:t>11/16/2022</a:t>
+              <a:t>11/22/2022</a:t>
             </a:fld>
             <a:endParaRPr lang="en-US"/>
           </a:p>
@@ -2231,7 +2234,7 @@
           <a:p>
             <a:fld id="{EFED3043-6CE1-4075-A706-4B000AA47C6A}" type="datetimeFigureOut">
               <a:rPr lang="en-US" smtClean="0"/>
-              <a:t>11/16/2022</a:t>
+              <a:t>11/22/2022</a:t>
             </a:fld>
             <a:endParaRPr lang="en-US"/>
           </a:p>
@@ -2506,7 +2509,7 @@
           <a:p>
             <a:fld id="{EFED3043-6CE1-4075-A706-4B000AA47C6A}" type="datetimeFigureOut">
               <a:rPr lang="en-US" smtClean="0"/>
-              <a:t>11/16/2022</a:t>
+              <a:t>11/22/2022</a:t>
             </a:fld>
             <a:endParaRPr lang="en-US"/>
           </a:p>
@@ -2771,7 +2774,7 @@
           <a:p>
             <a:fld id="{EFED3043-6CE1-4075-A706-4B000AA47C6A}" type="datetimeFigureOut">
               <a:rPr lang="en-US" smtClean="0"/>
-              <a:t>11/16/2022</a:t>
+              <a:t>11/22/2022</a:t>
             </a:fld>
             <a:endParaRPr lang="en-US"/>
           </a:p>
@@ -3183,7 +3186,7 @@
           <a:p>
             <a:fld id="{EFED3043-6CE1-4075-A706-4B000AA47C6A}" type="datetimeFigureOut">
               <a:rPr lang="en-US" smtClean="0"/>
-              <a:t>11/16/2022</a:t>
+              <a:t>11/22/2022</a:t>
             </a:fld>
             <a:endParaRPr lang="en-US"/>
           </a:p>
@@ -3324,7 +3327,7 @@
           <a:p>
             <a:fld id="{EFED3043-6CE1-4075-A706-4B000AA47C6A}" type="datetimeFigureOut">
               <a:rPr lang="en-US" smtClean="0"/>
-              <a:t>11/16/2022</a:t>
+              <a:t>11/22/2022</a:t>
             </a:fld>
             <a:endParaRPr lang="en-US"/>
           </a:p>
@@ -3437,7 +3440,7 @@
           <a:p>
             <a:fld id="{EFED3043-6CE1-4075-A706-4B000AA47C6A}" type="datetimeFigureOut">
               <a:rPr lang="en-US" smtClean="0"/>
-              <a:t>11/16/2022</a:t>
+              <a:t>11/22/2022</a:t>
             </a:fld>
             <a:endParaRPr lang="en-US"/>
           </a:p>
@@ -3748,7 +3751,7 @@
           <a:p>
             <a:fld id="{EFED3043-6CE1-4075-A706-4B000AA47C6A}" type="datetimeFigureOut">
               <a:rPr lang="en-US" smtClean="0"/>
-              <a:t>11/16/2022</a:t>
+              <a:t>11/22/2022</a:t>
             </a:fld>
             <a:endParaRPr lang="en-US"/>
           </a:p>
@@ -4036,7 +4039,7 @@
           <a:p>
             <a:fld id="{EFED3043-6CE1-4075-A706-4B000AA47C6A}" type="datetimeFigureOut">
               <a:rPr lang="en-US" smtClean="0"/>
-              <a:t>11/16/2022</a:t>
+              <a:t>11/22/2022</a:t>
             </a:fld>
             <a:endParaRPr lang="en-US"/>
           </a:p>
@@ -4277,7 +4280,7 @@
           <a:p>
             <a:fld id="{EFED3043-6CE1-4075-A706-4B000AA47C6A}" type="datetimeFigureOut">
               <a:rPr lang="en-US" smtClean="0"/>
-              <a:t>11/16/2022</a:t>
+              <a:t>11/22/2022</a:t>
             </a:fld>
             <a:endParaRPr lang="en-US"/>
           </a:p>
@@ -8039,7 +8042,12 @@
             <p:ph type="title"/>
           </p:nvPr>
         </p:nvSpPr>
-        <p:spPr/>
+        <p:spPr>
+          <a:xfrm>
+            <a:off x="838200" y="365125"/>
+            <a:ext cx="3613785" cy="1325563"/>
+          </a:xfrm>
+        </p:spPr>
         <p:txBody>
           <a:bodyPr/>
           <a:lstStyle/>
@@ -8263,7 +8271,7 @@
           <p:nvPr>
             <p:extLst>
               <p:ext uri="{D42A27DB-BD31-4B8C-83A1-F6EECF244321}">
-                <p14:modId xmlns:p14="http://schemas.microsoft.com/office/powerpoint/2010/main" val="637553811"/>
+                <p14:modId xmlns:p14="http://schemas.microsoft.com/office/powerpoint/2010/main" val="4122576369"/>
               </p:ext>
             </p:extLst>
           </p:nvPr>
@@ -8489,7 +8497,50 @@
                     <a:bodyPr/>
                     <a:lstStyle/>
                     <a:p>
-                      <a:endParaRPr lang="en-US"/>
+                      <a:r>
+                        <a:rPr lang="en-US" dirty="0"/>
+                        <a:t>1n</a:t>
+                      </a:r>
+                    </a:p>
+                  </a:txBody>
+                  <a:tcPr/>
+                </a:tc>
+                <a:tc>
+                  <a:txBody>
+                    <a:bodyPr/>
+                    <a:lstStyle/>
+                    <a:p>
+                      <a:endParaRPr lang="en-US" dirty="0"/>
+                    </a:p>
+                  </a:txBody>
+                  <a:tcPr/>
+                </a:tc>
+                <a:tc>
+                  <a:txBody>
+                    <a:bodyPr/>
+                    <a:lstStyle/>
+                    <a:p>
+                      <a:endParaRPr lang="en-US" dirty="0"/>
+                    </a:p>
+                  </a:txBody>
+                  <a:tcPr/>
+                </a:tc>
+                <a:tc>
+                  <a:txBody>
+                    <a:bodyPr/>
+                    <a:lstStyle/>
+                    <a:p>
+                      <a:endParaRPr lang="en-US" dirty="0"/>
+                    </a:p>
+                  </a:txBody>
+                  <a:tcPr/>
+                </a:tc>
+                <a:tc>
+                  <a:txBody>
+                    <a:bodyPr/>
+                    <a:lstStyle/>
+                    <a:p>
+                      <a:endParaRPr lang="en-US" dirty="0"/>
                     </a:p>
                   </a:txBody>
                   <a:tcPr/>
@@ -8509,47 +8560,10 @@
                     <a:bodyPr/>
                     <a:lstStyle/>
                     <a:p>
-                      <a:endParaRPr lang="en-US"/>
-                    </a:p>
-                  </a:txBody>
-                  <a:tcPr/>
-                </a:tc>
-                <a:tc>
-                  <a:txBody>
-                    <a:bodyPr/>
-                    <a:lstStyle/>
-                    <a:p>
-                      <a:endParaRPr lang="en-US"/>
-                    </a:p>
-                  </a:txBody>
-                  <a:tcPr/>
-                </a:tc>
-                <a:tc>
-                  <a:txBody>
-                    <a:bodyPr/>
-                    <a:lstStyle/>
-                    <a:p>
-                      <a:endParaRPr lang="en-US"/>
-                    </a:p>
-                  </a:txBody>
-                  <a:tcPr/>
-                </a:tc>
-                <a:tc>
-                  <a:txBody>
-                    <a:bodyPr/>
-                    <a:lstStyle/>
-                    <a:p>
-                      <a:endParaRPr lang="en-US"/>
-                    </a:p>
-                  </a:txBody>
-                  <a:tcPr/>
-                </a:tc>
-                <a:tc>
-                  <a:txBody>
-                    <a:bodyPr/>
-                    <a:lstStyle/>
-                    <a:p>
-                      <a:endParaRPr lang="en-US"/>
+                      <a:r>
+                        <a:rPr lang="en-US" dirty="0"/>
+                        <a:t>3n</a:t>
+                      </a:r>
                     </a:p>
                   </a:txBody>
                   <a:tcPr/>
@@ -8733,7 +8747,10 @@
                     <a:bodyPr/>
                     <a:lstStyle/>
                     <a:p>
-                      <a:endParaRPr lang="en-US"/>
+                      <a:r>
+                        <a:rPr lang="en-US" dirty="0"/>
+                        <a:t>2n</a:t>
+                      </a:r>
                     </a:p>
                   </a:txBody>
                   <a:tcPr/>
@@ -9104,7 +9121,7 @@
                     <a:bodyPr/>
                     <a:lstStyle/>
                     <a:p>
-                      <a:endParaRPr lang="en-US"/>
+                      <a:endParaRPr lang="en-US" dirty="0"/>
                     </a:p>
                   </a:txBody>
                   <a:tcPr/>
@@ -9131,7 +9148,10 @@
                     <a:bodyPr/>
                     <a:lstStyle/>
                     <a:p>
-                      <a:endParaRPr lang="en-US"/>
+                      <a:r>
+                        <a:rPr lang="en-US" dirty="0"/>
+                        <a:t>4n</a:t>
+                      </a:r>
                     </a:p>
                   </a:txBody>
                   <a:tcPr/>
@@ -9240,6 +9260,1527 @@
     <p:extLst>
       <p:ext uri="{BB962C8B-B14F-4D97-AF65-F5344CB8AC3E}">
         <p14:creationId xmlns:p14="http://schemas.microsoft.com/office/powerpoint/2010/main" val="3098651009"/>
+      </p:ext>
+    </p:extLst>
+  </p:cSld>
+  <p:clrMapOvr>
+    <a:masterClrMapping/>
+  </p:clrMapOvr>
+</p:sld>
+</file>
+
+<file path=ppt/slides/slide4.xml><?xml version="1.0" encoding="utf-8"?>
+<p:sld xmlns:a="http://schemas.openxmlformats.org/drawingml/2006/main" xmlns:r="http://schemas.openxmlformats.org/officeDocument/2006/relationships" xmlns:p="http://schemas.openxmlformats.org/presentationml/2006/main">
+  <p:cSld>
+    <p:spTree>
+      <p:nvGrpSpPr>
+        <p:cNvPr id="1" name=""/>
+        <p:cNvGrpSpPr/>
+        <p:nvPr/>
+      </p:nvGrpSpPr>
+      <p:grpSpPr>
+        <a:xfrm>
+          <a:off x="0" y="0"/>
+          <a:ext cx="0" cy="0"/>
+          <a:chOff x="0" y="0"/>
+          <a:chExt cx="0" cy="0"/>
+        </a:xfrm>
+      </p:grpSpPr>
+      <p:sp>
+        <p:nvSpPr>
+          <p:cNvPr id="2" name="Title 1">
+            <a:extLst>
+              <a:ext uri="{FF2B5EF4-FFF2-40B4-BE49-F238E27FC236}">
+                <a16:creationId xmlns:a16="http://schemas.microsoft.com/office/drawing/2014/main" id="{8D6191A1-D3D8-6CC7-9733-9139F31D6A97}"/>
+              </a:ext>
+            </a:extLst>
+          </p:cNvPr>
+          <p:cNvSpPr>
+            <a:spLocks noGrp="1"/>
+          </p:cNvSpPr>
+          <p:nvPr>
+            <p:ph type="title"/>
+          </p:nvPr>
+        </p:nvSpPr>
+        <p:spPr/>
+        <p:txBody>
+          <a:bodyPr/>
+          <a:lstStyle/>
+          <a:p>
+            <a:r>
+              <a:rPr lang="en-US" dirty="0" err="1"/>
+              <a:t>Singley</a:t>
+            </a:r>
+            <a:r>
+              <a:rPr lang="en-US" dirty="0"/>
+              <a:t>-Linked List</a:t>
+            </a:r>
+          </a:p>
+        </p:txBody>
+      </p:sp>
+      <p:sp>
+        <p:nvSpPr>
+          <p:cNvPr id="4" name="Oval 3">
+            <a:extLst>
+              <a:ext uri="{FF2B5EF4-FFF2-40B4-BE49-F238E27FC236}">
+                <a16:creationId xmlns:a16="http://schemas.microsoft.com/office/drawing/2014/main" id="{AE00402C-3D78-EE09-082C-A6AC0A6C3B61}"/>
+              </a:ext>
+            </a:extLst>
+          </p:cNvPr>
+          <p:cNvSpPr/>
+          <p:nvPr/>
+        </p:nvSpPr>
+        <p:spPr>
+          <a:xfrm>
+            <a:off x="571500" y="1485900"/>
+            <a:ext cx="2297430" cy="1943100"/>
+          </a:xfrm>
+          <a:prstGeom prst="ellipse">
+            <a:avLst/>
+          </a:prstGeom>
+        </p:spPr>
+        <p:style>
+          <a:lnRef idx="2">
+            <a:schemeClr val="accent1">
+              <a:shade val="50000"/>
+            </a:schemeClr>
+          </a:lnRef>
+          <a:fillRef idx="1">
+            <a:schemeClr val="accent1"/>
+          </a:fillRef>
+          <a:effectRef idx="0">
+            <a:schemeClr val="accent1"/>
+          </a:effectRef>
+          <a:fontRef idx="minor">
+            <a:schemeClr val="lt1"/>
+          </a:fontRef>
+        </p:style>
+        <p:txBody>
+          <a:bodyPr rtlCol="0" anchor="ctr"/>
+          <a:lstStyle/>
+          <a:p>
+            <a:pPr algn="ctr"/>
+            <a:r>
+              <a:rPr lang="en-US" dirty="0"/>
+              <a:t>1</a:t>
+            </a:r>
+            <a:r>
+              <a:rPr lang="en-US" baseline="30000" dirty="0"/>
+              <a:t>st</a:t>
+            </a:r>
+            <a:r>
+              <a:rPr lang="en-US" dirty="0"/>
+              <a:t> Node</a:t>
+            </a:r>
+          </a:p>
+          <a:p>
+            <a:pPr algn="ctr"/>
+            <a:r>
+              <a:rPr lang="en-US" dirty="0"/>
+              <a:t>It’s an object</a:t>
+            </a:r>
+          </a:p>
+        </p:txBody>
+      </p:sp>
+      <p:cxnSp>
+        <p:nvCxnSpPr>
+          <p:cNvPr id="6" name="Straight Arrow Connector 5">
+            <a:extLst>
+              <a:ext uri="{FF2B5EF4-FFF2-40B4-BE49-F238E27FC236}">
+                <a16:creationId xmlns:a16="http://schemas.microsoft.com/office/drawing/2014/main" id="{5BC68F31-22A3-B4BA-4842-968FA0448ADC}"/>
+              </a:ext>
+            </a:extLst>
+          </p:cNvPr>
+          <p:cNvCxnSpPr>
+            <a:cxnSpLocks/>
+            <a:stCxn id="4" idx="6"/>
+            <a:endCxn id="7" idx="2"/>
+          </p:cNvCxnSpPr>
+          <p:nvPr/>
+        </p:nvCxnSpPr>
+        <p:spPr>
+          <a:xfrm>
+            <a:off x="2868930" y="2457450"/>
+            <a:ext cx="1419225" cy="62389"/>
+          </a:xfrm>
+          <a:prstGeom prst="straightConnector1">
+            <a:avLst/>
+          </a:prstGeom>
+          <a:ln w="38100">
+            <a:tailEnd type="triangle"/>
+          </a:ln>
+        </p:spPr>
+        <p:style>
+          <a:lnRef idx="1">
+            <a:schemeClr val="accent1"/>
+          </a:lnRef>
+          <a:fillRef idx="0">
+            <a:schemeClr val="accent1"/>
+          </a:fillRef>
+          <a:effectRef idx="0">
+            <a:schemeClr val="accent1"/>
+          </a:effectRef>
+          <a:fontRef idx="minor">
+            <a:schemeClr val="tx1"/>
+          </a:fontRef>
+        </p:style>
+      </p:cxnSp>
+      <p:sp>
+        <p:nvSpPr>
+          <p:cNvPr id="7" name="Oval 6">
+            <a:extLst>
+              <a:ext uri="{FF2B5EF4-FFF2-40B4-BE49-F238E27FC236}">
+                <a16:creationId xmlns:a16="http://schemas.microsoft.com/office/drawing/2014/main" id="{4DBDC52E-F5AA-3EA4-D369-A5BC49048EEF}"/>
+              </a:ext>
+            </a:extLst>
+          </p:cNvPr>
+          <p:cNvSpPr/>
+          <p:nvPr/>
+        </p:nvSpPr>
+        <p:spPr>
+          <a:xfrm>
+            <a:off x="4288155" y="1548289"/>
+            <a:ext cx="2297430" cy="1943100"/>
+          </a:xfrm>
+          <a:prstGeom prst="ellipse">
+            <a:avLst/>
+          </a:prstGeom>
+        </p:spPr>
+        <p:style>
+          <a:lnRef idx="2">
+            <a:schemeClr val="accent1">
+              <a:shade val="50000"/>
+            </a:schemeClr>
+          </a:lnRef>
+          <a:fillRef idx="1">
+            <a:schemeClr val="accent1"/>
+          </a:fillRef>
+          <a:effectRef idx="0">
+            <a:schemeClr val="accent1"/>
+          </a:effectRef>
+          <a:fontRef idx="minor">
+            <a:schemeClr val="lt1"/>
+          </a:fontRef>
+        </p:style>
+        <p:txBody>
+          <a:bodyPr rtlCol="0" anchor="ctr"/>
+          <a:lstStyle/>
+          <a:p>
+            <a:pPr algn="ctr"/>
+            <a:r>
+              <a:rPr lang="en-US" dirty="0"/>
+              <a:t>2</a:t>
+            </a:r>
+            <a:r>
+              <a:rPr lang="en-US" baseline="30000" dirty="0"/>
+              <a:t>nd</a:t>
+            </a:r>
+            <a:r>
+              <a:rPr lang="en-US" dirty="0"/>
+              <a:t> Node</a:t>
+            </a:r>
+          </a:p>
+          <a:p>
+            <a:pPr algn="ctr"/>
+            <a:r>
+              <a:rPr lang="en-US" dirty="0"/>
+              <a:t>It’s an object</a:t>
+            </a:r>
+          </a:p>
+        </p:txBody>
+      </p:sp>
+      <p:sp>
+        <p:nvSpPr>
+          <p:cNvPr id="10" name="Oval 9">
+            <a:extLst>
+              <a:ext uri="{FF2B5EF4-FFF2-40B4-BE49-F238E27FC236}">
+                <a16:creationId xmlns:a16="http://schemas.microsoft.com/office/drawing/2014/main" id="{3444004E-49E2-8CB4-BCFB-6D5258EBC0F9}"/>
+              </a:ext>
+            </a:extLst>
+          </p:cNvPr>
+          <p:cNvSpPr/>
+          <p:nvPr/>
+        </p:nvSpPr>
+        <p:spPr>
+          <a:xfrm>
+            <a:off x="8477250" y="1405890"/>
+            <a:ext cx="2297430" cy="1943100"/>
+          </a:xfrm>
+          <a:prstGeom prst="ellipse">
+            <a:avLst/>
+          </a:prstGeom>
+        </p:spPr>
+        <p:style>
+          <a:lnRef idx="2">
+            <a:schemeClr val="accent1">
+              <a:shade val="50000"/>
+            </a:schemeClr>
+          </a:lnRef>
+          <a:fillRef idx="1">
+            <a:schemeClr val="accent1"/>
+          </a:fillRef>
+          <a:effectRef idx="0">
+            <a:schemeClr val="accent1"/>
+          </a:effectRef>
+          <a:fontRef idx="minor">
+            <a:schemeClr val="lt1"/>
+          </a:fontRef>
+        </p:style>
+        <p:txBody>
+          <a:bodyPr rtlCol="0" anchor="ctr"/>
+          <a:lstStyle/>
+          <a:p>
+            <a:pPr algn="ctr"/>
+            <a:r>
+              <a:rPr lang="en-US" dirty="0"/>
+              <a:t>3</a:t>
+            </a:r>
+            <a:r>
+              <a:rPr lang="en-US" baseline="30000" dirty="0"/>
+              <a:t>rd</a:t>
+            </a:r>
+            <a:r>
+              <a:rPr lang="en-US" dirty="0"/>
+              <a:t> Node</a:t>
+            </a:r>
+          </a:p>
+          <a:p>
+            <a:pPr algn="ctr"/>
+            <a:r>
+              <a:rPr lang="en-US" dirty="0"/>
+              <a:t>It’s an object</a:t>
+            </a:r>
+          </a:p>
+        </p:txBody>
+      </p:sp>
+      <p:cxnSp>
+        <p:nvCxnSpPr>
+          <p:cNvPr id="11" name="Straight Arrow Connector 10">
+            <a:extLst>
+              <a:ext uri="{FF2B5EF4-FFF2-40B4-BE49-F238E27FC236}">
+                <a16:creationId xmlns:a16="http://schemas.microsoft.com/office/drawing/2014/main" id="{7B42334C-3EFC-DF85-FF43-3689CB15B6CE}"/>
+              </a:ext>
+            </a:extLst>
+          </p:cNvPr>
+          <p:cNvCxnSpPr>
+            <a:cxnSpLocks/>
+            <a:stCxn id="7" idx="6"/>
+            <a:endCxn id="10" idx="2"/>
+          </p:cNvCxnSpPr>
+          <p:nvPr/>
+        </p:nvCxnSpPr>
+        <p:spPr>
+          <a:xfrm flipV="1">
+            <a:off x="6585585" y="2377440"/>
+            <a:ext cx="1891665" cy="142399"/>
+          </a:xfrm>
+          <a:prstGeom prst="straightConnector1">
+            <a:avLst/>
+          </a:prstGeom>
+          <a:ln w="38100">
+            <a:tailEnd type="triangle"/>
+          </a:ln>
+        </p:spPr>
+        <p:style>
+          <a:lnRef idx="1">
+            <a:schemeClr val="accent1"/>
+          </a:lnRef>
+          <a:fillRef idx="0">
+            <a:schemeClr val="accent1"/>
+          </a:fillRef>
+          <a:effectRef idx="0">
+            <a:schemeClr val="accent1"/>
+          </a:effectRef>
+          <a:fontRef idx="minor">
+            <a:schemeClr val="tx1"/>
+          </a:fontRef>
+        </p:style>
+      </p:cxnSp>
+    </p:spTree>
+    <p:extLst>
+      <p:ext uri="{BB962C8B-B14F-4D97-AF65-F5344CB8AC3E}">
+        <p14:creationId xmlns:p14="http://schemas.microsoft.com/office/powerpoint/2010/main" val="1051799996"/>
+      </p:ext>
+    </p:extLst>
+  </p:cSld>
+  <p:clrMapOvr>
+    <a:masterClrMapping/>
+  </p:clrMapOvr>
+</p:sld>
+</file>
+
+<file path=ppt/slides/slide5.xml><?xml version="1.0" encoding="utf-8"?>
+<p:sld xmlns:a="http://schemas.openxmlformats.org/drawingml/2006/main" xmlns:r="http://schemas.openxmlformats.org/officeDocument/2006/relationships" xmlns:p="http://schemas.openxmlformats.org/presentationml/2006/main">
+  <p:cSld>
+    <p:spTree>
+      <p:nvGrpSpPr>
+        <p:cNvPr id="1" name=""/>
+        <p:cNvGrpSpPr/>
+        <p:nvPr/>
+      </p:nvGrpSpPr>
+      <p:grpSpPr>
+        <a:xfrm>
+          <a:off x="0" y="0"/>
+          <a:ext cx="0" cy="0"/>
+          <a:chOff x="0" y="0"/>
+          <a:chExt cx="0" cy="0"/>
+        </a:xfrm>
+      </p:grpSpPr>
+      <p:sp>
+        <p:nvSpPr>
+          <p:cNvPr id="2" name="Title 1">
+            <a:extLst>
+              <a:ext uri="{FF2B5EF4-FFF2-40B4-BE49-F238E27FC236}">
+                <a16:creationId xmlns:a16="http://schemas.microsoft.com/office/drawing/2014/main" id="{8D6191A1-D3D8-6CC7-9733-9139F31D6A97}"/>
+              </a:ext>
+            </a:extLst>
+          </p:cNvPr>
+          <p:cNvSpPr>
+            <a:spLocks noGrp="1"/>
+          </p:cNvSpPr>
+          <p:nvPr>
+            <p:ph type="title"/>
+          </p:nvPr>
+        </p:nvSpPr>
+        <p:spPr/>
+        <p:txBody>
+          <a:bodyPr/>
+          <a:lstStyle/>
+          <a:p>
+            <a:r>
+              <a:rPr lang="en-US" dirty="0" err="1"/>
+              <a:t>Doubley</a:t>
+            </a:r>
+            <a:r>
+              <a:rPr lang="en-US" dirty="0"/>
+              <a:t>-Linked List</a:t>
+            </a:r>
+          </a:p>
+        </p:txBody>
+      </p:sp>
+      <p:sp>
+        <p:nvSpPr>
+          <p:cNvPr id="4" name="Oval 3">
+            <a:extLst>
+              <a:ext uri="{FF2B5EF4-FFF2-40B4-BE49-F238E27FC236}">
+                <a16:creationId xmlns:a16="http://schemas.microsoft.com/office/drawing/2014/main" id="{AE00402C-3D78-EE09-082C-A6AC0A6C3B61}"/>
+              </a:ext>
+            </a:extLst>
+          </p:cNvPr>
+          <p:cNvSpPr/>
+          <p:nvPr/>
+        </p:nvSpPr>
+        <p:spPr>
+          <a:xfrm>
+            <a:off x="571500" y="1485900"/>
+            <a:ext cx="2297430" cy="1943100"/>
+          </a:xfrm>
+          <a:prstGeom prst="ellipse">
+            <a:avLst/>
+          </a:prstGeom>
+        </p:spPr>
+        <p:style>
+          <a:lnRef idx="2">
+            <a:schemeClr val="accent1">
+              <a:shade val="50000"/>
+            </a:schemeClr>
+          </a:lnRef>
+          <a:fillRef idx="1">
+            <a:schemeClr val="accent1"/>
+          </a:fillRef>
+          <a:effectRef idx="0">
+            <a:schemeClr val="accent1"/>
+          </a:effectRef>
+          <a:fontRef idx="minor">
+            <a:schemeClr val="lt1"/>
+          </a:fontRef>
+        </p:style>
+        <p:txBody>
+          <a:bodyPr rtlCol="0" anchor="ctr"/>
+          <a:lstStyle/>
+          <a:p>
+            <a:pPr algn="ctr"/>
+            <a:r>
+              <a:rPr lang="en-US" dirty="0"/>
+              <a:t>1</a:t>
+            </a:r>
+            <a:r>
+              <a:rPr lang="en-US" baseline="30000" dirty="0"/>
+              <a:t>st</a:t>
+            </a:r>
+            <a:r>
+              <a:rPr lang="en-US" dirty="0"/>
+              <a:t> Node</a:t>
+            </a:r>
+          </a:p>
+          <a:p>
+            <a:pPr algn="ctr"/>
+            <a:r>
+              <a:rPr lang="en-US" dirty="0"/>
+              <a:t>It’s an object</a:t>
+            </a:r>
+          </a:p>
+          <a:p>
+            <a:pPr algn="ctr"/>
+            <a:r>
+              <a:rPr lang="en-US" dirty="0"/>
+              <a:t>-Next</a:t>
+            </a:r>
+          </a:p>
+          <a:p>
+            <a:pPr algn="ctr"/>
+            <a:r>
+              <a:rPr lang="en-US" dirty="0"/>
+              <a:t>- previous</a:t>
+            </a:r>
+          </a:p>
+        </p:txBody>
+      </p:sp>
+      <p:cxnSp>
+        <p:nvCxnSpPr>
+          <p:cNvPr id="6" name="Straight Arrow Connector 5">
+            <a:extLst>
+              <a:ext uri="{FF2B5EF4-FFF2-40B4-BE49-F238E27FC236}">
+                <a16:creationId xmlns:a16="http://schemas.microsoft.com/office/drawing/2014/main" id="{5BC68F31-22A3-B4BA-4842-968FA0448ADC}"/>
+              </a:ext>
+            </a:extLst>
+          </p:cNvPr>
+          <p:cNvCxnSpPr>
+            <a:cxnSpLocks/>
+            <a:stCxn id="4" idx="6"/>
+            <a:endCxn id="7" idx="2"/>
+          </p:cNvCxnSpPr>
+          <p:nvPr/>
+        </p:nvCxnSpPr>
+        <p:spPr>
+          <a:xfrm>
+            <a:off x="2868930" y="2457450"/>
+            <a:ext cx="1419225" cy="0"/>
+          </a:xfrm>
+          <a:prstGeom prst="straightConnector1">
+            <a:avLst/>
+          </a:prstGeom>
+          <a:ln w="38100">
+            <a:tailEnd type="triangle"/>
+          </a:ln>
+        </p:spPr>
+        <p:style>
+          <a:lnRef idx="1">
+            <a:schemeClr val="accent1"/>
+          </a:lnRef>
+          <a:fillRef idx="0">
+            <a:schemeClr val="accent1"/>
+          </a:fillRef>
+          <a:effectRef idx="0">
+            <a:schemeClr val="accent1"/>
+          </a:effectRef>
+          <a:fontRef idx="minor">
+            <a:schemeClr val="tx1"/>
+          </a:fontRef>
+        </p:style>
+      </p:cxnSp>
+      <p:sp>
+        <p:nvSpPr>
+          <p:cNvPr id="7" name="Oval 6">
+            <a:extLst>
+              <a:ext uri="{FF2B5EF4-FFF2-40B4-BE49-F238E27FC236}">
+                <a16:creationId xmlns:a16="http://schemas.microsoft.com/office/drawing/2014/main" id="{4DBDC52E-F5AA-3EA4-D369-A5BC49048EEF}"/>
+              </a:ext>
+            </a:extLst>
+          </p:cNvPr>
+          <p:cNvSpPr/>
+          <p:nvPr/>
+        </p:nvSpPr>
+        <p:spPr>
+          <a:xfrm>
+            <a:off x="4288155" y="1485900"/>
+            <a:ext cx="2297430" cy="1943100"/>
+          </a:xfrm>
+          <a:prstGeom prst="ellipse">
+            <a:avLst/>
+          </a:prstGeom>
+        </p:spPr>
+        <p:style>
+          <a:lnRef idx="2">
+            <a:schemeClr val="accent1">
+              <a:shade val="50000"/>
+            </a:schemeClr>
+          </a:lnRef>
+          <a:fillRef idx="1">
+            <a:schemeClr val="accent1"/>
+          </a:fillRef>
+          <a:effectRef idx="0">
+            <a:schemeClr val="accent1"/>
+          </a:effectRef>
+          <a:fontRef idx="minor">
+            <a:schemeClr val="lt1"/>
+          </a:fontRef>
+        </p:style>
+        <p:txBody>
+          <a:bodyPr rtlCol="0" anchor="ctr"/>
+          <a:lstStyle/>
+          <a:p>
+            <a:pPr algn="ctr"/>
+            <a:r>
+              <a:rPr lang="en-US" dirty="0"/>
+              <a:t>2</a:t>
+            </a:r>
+            <a:r>
+              <a:rPr lang="en-US" baseline="30000" dirty="0"/>
+              <a:t>nd</a:t>
+            </a:r>
+            <a:r>
+              <a:rPr lang="en-US" dirty="0"/>
+              <a:t> Node</a:t>
+            </a:r>
+          </a:p>
+          <a:p>
+            <a:pPr algn="ctr"/>
+            <a:r>
+              <a:rPr lang="en-US" dirty="0"/>
+              <a:t>It’s an object</a:t>
+            </a:r>
+          </a:p>
+        </p:txBody>
+      </p:sp>
+      <p:sp>
+        <p:nvSpPr>
+          <p:cNvPr id="10" name="Oval 9">
+            <a:extLst>
+              <a:ext uri="{FF2B5EF4-FFF2-40B4-BE49-F238E27FC236}">
+                <a16:creationId xmlns:a16="http://schemas.microsoft.com/office/drawing/2014/main" id="{3444004E-49E2-8CB4-BCFB-6D5258EBC0F9}"/>
+              </a:ext>
+            </a:extLst>
+          </p:cNvPr>
+          <p:cNvSpPr/>
+          <p:nvPr/>
+        </p:nvSpPr>
+        <p:spPr>
+          <a:xfrm>
+            <a:off x="8477250" y="1405890"/>
+            <a:ext cx="2297430" cy="1943100"/>
+          </a:xfrm>
+          <a:prstGeom prst="ellipse">
+            <a:avLst/>
+          </a:prstGeom>
+        </p:spPr>
+        <p:style>
+          <a:lnRef idx="2">
+            <a:schemeClr val="accent1">
+              <a:shade val="50000"/>
+            </a:schemeClr>
+          </a:lnRef>
+          <a:fillRef idx="1">
+            <a:schemeClr val="accent1"/>
+          </a:fillRef>
+          <a:effectRef idx="0">
+            <a:schemeClr val="accent1"/>
+          </a:effectRef>
+          <a:fontRef idx="minor">
+            <a:schemeClr val="lt1"/>
+          </a:fontRef>
+        </p:style>
+        <p:txBody>
+          <a:bodyPr rtlCol="0" anchor="ctr"/>
+          <a:lstStyle/>
+          <a:p>
+            <a:pPr algn="ctr"/>
+            <a:r>
+              <a:rPr lang="en-US" dirty="0"/>
+              <a:t>3</a:t>
+            </a:r>
+            <a:r>
+              <a:rPr lang="en-US" baseline="30000" dirty="0"/>
+              <a:t>rd</a:t>
+            </a:r>
+            <a:r>
+              <a:rPr lang="en-US" dirty="0"/>
+              <a:t> Node</a:t>
+            </a:r>
+          </a:p>
+          <a:p>
+            <a:pPr algn="ctr"/>
+            <a:r>
+              <a:rPr lang="en-US" dirty="0"/>
+              <a:t>It’s an object</a:t>
+            </a:r>
+          </a:p>
+        </p:txBody>
+      </p:sp>
+      <p:cxnSp>
+        <p:nvCxnSpPr>
+          <p:cNvPr id="11" name="Straight Arrow Connector 10">
+            <a:extLst>
+              <a:ext uri="{FF2B5EF4-FFF2-40B4-BE49-F238E27FC236}">
+                <a16:creationId xmlns:a16="http://schemas.microsoft.com/office/drawing/2014/main" id="{7B42334C-3EFC-DF85-FF43-3689CB15B6CE}"/>
+              </a:ext>
+            </a:extLst>
+          </p:cNvPr>
+          <p:cNvCxnSpPr>
+            <a:cxnSpLocks/>
+            <a:stCxn id="7" idx="6"/>
+            <a:endCxn id="3" idx="2"/>
+          </p:cNvCxnSpPr>
+          <p:nvPr/>
+        </p:nvCxnSpPr>
+        <p:spPr>
+          <a:xfrm>
+            <a:off x="6585585" y="2457450"/>
+            <a:ext cx="270510" cy="1658302"/>
+          </a:xfrm>
+          <a:prstGeom prst="straightConnector1">
+            <a:avLst/>
+          </a:prstGeom>
+          <a:ln w="38100">
+            <a:tailEnd type="triangle"/>
+          </a:ln>
+        </p:spPr>
+        <p:style>
+          <a:lnRef idx="1">
+            <a:schemeClr val="accent1"/>
+          </a:lnRef>
+          <a:fillRef idx="0">
+            <a:schemeClr val="accent1"/>
+          </a:fillRef>
+          <a:effectRef idx="0">
+            <a:schemeClr val="accent1"/>
+          </a:effectRef>
+          <a:fontRef idx="minor">
+            <a:schemeClr val="tx1"/>
+          </a:fontRef>
+        </p:style>
+      </p:cxnSp>
+      <p:cxnSp>
+        <p:nvCxnSpPr>
+          <p:cNvPr id="18" name="Straight Arrow Connector 17">
+            <a:extLst>
+              <a:ext uri="{FF2B5EF4-FFF2-40B4-BE49-F238E27FC236}">
+                <a16:creationId xmlns:a16="http://schemas.microsoft.com/office/drawing/2014/main" id="{4DF7AB6F-92F4-E6B4-2A49-78E19E3DD41A}"/>
+              </a:ext>
+            </a:extLst>
+          </p:cNvPr>
+          <p:cNvCxnSpPr>
+            <a:cxnSpLocks/>
+          </p:cNvCxnSpPr>
+          <p:nvPr/>
+        </p:nvCxnSpPr>
+        <p:spPr>
+          <a:xfrm flipH="1">
+            <a:off x="2888932" y="2668905"/>
+            <a:ext cx="1399223" cy="0"/>
+          </a:xfrm>
+          <a:prstGeom prst="straightConnector1">
+            <a:avLst/>
+          </a:prstGeom>
+          <a:ln w="38100">
+            <a:tailEnd type="triangle"/>
+          </a:ln>
+        </p:spPr>
+        <p:style>
+          <a:lnRef idx="1">
+            <a:schemeClr val="accent1"/>
+          </a:lnRef>
+          <a:fillRef idx="0">
+            <a:schemeClr val="accent1"/>
+          </a:fillRef>
+          <a:effectRef idx="0">
+            <a:schemeClr val="accent1"/>
+          </a:effectRef>
+          <a:fontRef idx="minor">
+            <a:schemeClr val="tx1"/>
+          </a:fontRef>
+        </p:style>
+      </p:cxnSp>
+      <p:cxnSp>
+        <p:nvCxnSpPr>
+          <p:cNvPr id="21" name="Straight Arrow Connector 20">
+            <a:extLst>
+              <a:ext uri="{FF2B5EF4-FFF2-40B4-BE49-F238E27FC236}">
+                <a16:creationId xmlns:a16="http://schemas.microsoft.com/office/drawing/2014/main" id="{994BAC4E-F444-DB70-7119-1AA58FF1D9C8}"/>
+              </a:ext>
+            </a:extLst>
+          </p:cNvPr>
+          <p:cNvCxnSpPr>
+            <a:cxnSpLocks/>
+            <a:stCxn id="10" idx="4"/>
+          </p:cNvCxnSpPr>
+          <p:nvPr/>
+        </p:nvCxnSpPr>
+        <p:spPr>
+          <a:xfrm flipH="1">
+            <a:off x="9153525" y="3348990"/>
+            <a:ext cx="472440" cy="634365"/>
+          </a:xfrm>
+          <a:prstGeom prst="straightConnector1">
+            <a:avLst/>
+          </a:prstGeom>
+          <a:ln w="38100">
+            <a:tailEnd type="triangle"/>
+          </a:ln>
+        </p:spPr>
+        <p:style>
+          <a:lnRef idx="1">
+            <a:schemeClr val="accent1"/>
+          </a:lnRef>
+          <a:fillRef idx="0">
+            <a:schemeClr val="accent1"/>
+          </a:fillRef>
+          <a:effectRef idx="0">
+            <a:schemeClr val="accent1"/>
+          </a:effectRef>
+          <a:fontRef idx="minor">
+            <a:schemeClr val="tx1"/>
+          </a:fontRef>
+        </p:style>
+      </p:cxnSp>
+      <p:sp>
+        <p:nvSpPr>
+          <p:cNvPr id="3" name="Oval 2">
+            <a:extLst>
+              <a:ext uri="{FF2B5EF4-FFF2-40B4-BE49-F238E27FC236}">
+                <a16:creationId xmlns:a16="http://schemas.microsoft.com/office/drawing/2014/main" id="{FA530C50-59BB-2446-7E46-4322A55B5046}"/>
+              </a:ext>
+            </a:extLst>
+          </p:cNvPr>
+          <p:cNvSpPr/>
+          <p:nvPr/>
+        </p:nvSpPr>
+        <p:spPr>
+          <a:xfrm>
+            <a:off x="6856095" y="3144202"/>
+            <a:ext cx="2297430" cy="1943100"/>
+          </a:xfrm>
+          <a:prstGeom prst="ellipse">
+            <a:avLst/>
+          </a:prstGeom>
+        </p:spPr>
+        <p:style>
+          <a:lnRef idx="2">
+            <a:schemeClr val="accent1">
+              <a:shade val="50000"/>
+            </a:schemeClr>
+          </a:lnRef>
+          <a:fillRef idx="1">
+            <a:schemeClr val="accent1"/>
+          </a:fillRef>
+          <a:effectRef idx="0">
+            <a:schemeClr val="accent1"/>
+          </a:effectRef>
+          <a:fontRef idx="minor">
+            <a:schemeClr val="lt1"/>
+          </a:fontRef>
+        </p:style>
+        <p:txBody>
+          <a:bodyPr rtlCol="0" anchor="ctr"/>
+          <a:lstStyle/>
+          <a:p>
+            <a:pPr algn="ctr"/>
+            <a:r>
+              <a:rPr lang="en-US" dirty="0"/>
+              <a:t>3</a:t>
+            </a:r>
+            <a:r>
+              <a:rPr lang="en-US" baseline="30000" dirty="0"/>
+              <a:t>rd</a:t>
+            </a:r>
+            <a:r>
+              <a:rPr lang="en-US" dirty="0"/>
+              <a:t> Node</a:t>
+            </a:r>
+          </a:p>
+          <a:p>
+            <a:pPr algn="ctr"/>
+            <a:r>
+              <a:rPr lang="en-US" dirty="0"/>
+              <a:t>It’s an object</a:t>
+            </a:r>
+          </a:p>
+        </p:txBody>
+      </p:sp>
+      <p:cxnSp>
+        <p:nvCxnSpPr>
+          <p:cNvPr id="12" name="Straight Arrow Connector 11">
+            <a:extLst>
+              <a:ext uri="{FF2B5EF4-FFF2-40B4-BE49-F238E27FC236}">
+                <a16:creationId xmlns:a16="http://schemas.microsoft.com/office/drawing/2014/main" id="{AE8DD5D0-D48E-00A0-F180-82244DB2356D}"/>
+              </a:ext>
+            </a:extLst>
+          </p:cNvPr>
+          <p:cNvCxnSpPr>
+            <a:cxnSpLocks/>
+            <a:stCxn id="3" idx="6"/>
+          </p:cNvCxnSpPr>
+          <p:nvPr/>
+        </p:nvCxnSpPr>
+        <p:spPr>
+          <a:xfrm flipV="1">
+            <a:off x="9153525" y="3469005"/>
+            <a:ext cx="664845" cy="646747"/>
+          </a:xfrm>
+          <a:prstGeom prst="straightConnector1">
+            <a:avLst/>
+          </a:prstGeom>
+          <a:ln w="38100">
+            <a:tailEnd type="triangle"/>
+          </a:ln>
+        </p:spPr>
+        <p:style>
+          <a:lnRef idx="1">
+            <a:schemeClr val="accent1"/>
+          </a:lnRef>
+          <a:fillRef idx="0">
+            <a:schemeClr val="accent1"/>
+          </a:fillRef>
+          <a:effectRef idx="0">
+            <a:schemeClr val="accent1"/>
+          </a:effectRef>
+          <a:fontRef idx="minor">
+            <a:schemeClr val="tx1"/>
+          </a:fontRef>
+        </p:style>
+      </p:cxnSp>
+      <p:cxnSp>
+        <p:nvCxnSpPr>
+          <p:cNvPr id="16" name="Straight Arrow Connector 15">
+            <a:extLst>
+              <a:ext uri="{FF2B5EF4-FFF2-40B4-BE49-F238E27FC236}">
+                <a16:creationId xmlns:a16="http://schemas.microsoft.com/office/drawing/2014/main" id="{644D67D4-631D-9D8D-3841-F39B28560B2D}"/>
+              </a:ext>
+            </a:extLst>
+          </p:cNvPr>
+          <p:cNvCxnSpPr>
+            <a:cxnSpLocks/>
+          </p:cNvCxnSpPr>
+          <p:nvPr/>
+        </p:nvCxnSpPr>
+        <p:spPr>
+          <a:xfrm flipH="1" flipV="1">
+            <a:off x="6393180" y="2971800"/>
+            <a:ext cx="327660" cy="1216343"/>
+          </a:xfrm>
+          <a:prstGeom prst="straightConnector1">
+            <a:avLst/>
+          </a:prstGeom>
+          <a:ln w="38100">
+            <a:tailEnd type="triangle"/>
+          </a:ln>
+        </p:spPr>
+        <p:style>
+          <a:lnRef idx="1">
+            <a:schemeClr val="accent1"/>
+          </a:lnRef>
+          <a:fillRef idx="0">
+            <a:schemeClr val="accent1"/>
+          </a:fillRef>
+          <a:effectRef idx="0">
+            <a:schemeClr val="accent1"/>
+          </a:effectRef>
+          <a:fontRef idx="minor">
+            <a:schemeClr val="tx1"/>
+          </a:fontRef>
+        </p:style>
+      </p:cxnSp>
+    </p:spTree>
+    <p:extLst>
+      <p:ext uri="{BB962C8B-B14F-4D97-AF65-F5344CB8AC3E}">
+        <p14:creationId xmlns:p14="http://schemas.microsoft.com/office/powerpoint/2010/main" val="3881207750"/>
+      </p:ext>
+    </p:extLst>
+  </p:cSld>
+  <p:clrMapOvr>
+    <a:masterClrMapping/>
+  </p:clrMapOvr>
+</p:sld>
+</file>
+
+<file path=ppt/slides/slide6.xml><?xml version="1.0" encoding="utf-8"?>
+<p:sld xmlns:a="http://schemas.openxmlformats.org/drawingml/2006/main" xmlns:r="http://schemas.openxmlformats.org/officeDocument/2006/relationships" xmlns:p="http://schemas.openxmlformats.org/presentationml/2006/main">
+  <p:cSld>
+    <p:spTree>
+      <p:nvGrpSpPr>
+        <p:cNvPr id="1" name=""/>
+        <p:cNvGrpSpPr/>
+        <p:nvPr/>
+      </p:nvGrpSpPr>
+      <p:grpSpPr>
+        <a:xfrm>
+          <a:off x="0" y="0"/>
+          <a:ext cx="0" cy="0"/>
+          <a:chOff x="0" y="0"/>
+          <a:chExt cx="0" cy="0"/>
+        </a:xfrm>
+      </p:grpSpPr>
+      <p:sp>
+        <p:nvSpPr>
+          <p:cNvPr id="2" name="Title 1">
+            <a:extLst>
+              <a:ext uri="{FF2B5EF4-FFF2-40B4-BE49-F238E27FC236}">
+                <a16:creationId xmlns:a16="http://schemas.microsoft.com/office/drawing/2014/main" id="{8D6191A1-D3D8-6CC7-9733-9139F31D6A97}"/>
+              </a:ext>
+            </a:extLst>
+          </p:cNvPr>
+          <p:cNvSpPr>
+            <a:spLocks noGrp="1"/>
+          </p:cNvSpPr>
+          <p:nvPr>
+            <p:ph type="title"/>
+          </p:nvPr>
+        </p:nvSpPr>
+        <p:spPr/>
+        <p:txBody>
+          <a:bodyPr/>
+          <a:lstStyle/>
+          <a:p>
+            <a:r>
+              <a:rPr lang="en-US" dirty="0"/>
+              <a:t>Circular-</a:t>
+            </a:r>
+            <a:r>
+              <a:rPr lang="en-US" dirty="0" err="1"/>
+              <a:t>Singley</a:t>
+            </a:r>
+            <a:r>
+              <a:rPr lang="en-US" dirty="0"/>
+              <a:t>-Linked List</a:t>
+            </a:r>
+          </a:p>
+        </p:txBody>
+      </p:sp>
+      <p:sp>
+        <p:nvSpPr>
+          <p:cNvPr id="4" name="Oval 3">
+            <a:extLst>
+              <a:ext uri="{FF2B5EF4-FFF2-40B4-BE49-F238E27FC236}">
+                <a16:creationId xmlns:a16="http://schemas.microsoft.com/office/drawing/2014/main" id="{AE00402C-3D78-EE09-082C-A6AC0A6C3B61}"/>
+              </a:ext>
+            </a:extLst>
+          </p:cNvPr>
+          <p:cNvSpPr/>
+          <p:nvPr/>
+        </p:nvSpPr>
+        <p:spPr>
+          <a:xfrm>
+            <a:off x="838200" y="2680335"/>
+            <a:ext cx="2297430" cy="1943100"/>
+          </a:xfrm>
+          <a:prstGeom prst="ellipse">
+            <a:avLst/>
+          </a:prstGeom>
+        </p:spPr>
+        <p:style>
+          <a:lnRef idx="2">
+            <a:schemeClr val="accent1">
+              <a:shade val="50000"/>
+            </a:schemeClr>
+          </a:lnRef>
+          <a:fillRef idx="1">
+            <a:schemeClr val="accent1"/>
+          </a:fillRef>
+          <a:effectRef idx="0">
+            <a:schemeClr val="accent1"/>
+          </a:effectRef>
+          <a:fontRef idx="minor">
+            <a:schemeClr val="lt1"/>
+          </a:fontRef>
+        </p:style>
+        <p:txBody>
+          <a:bodyPr rtlCol="0" anchor="ctr"/>
+          <a:lstStyle/>
+          <a:p>
+            <a:pPr algn="ctr"/>
+            <a:r>
+              <a:rPr lang="en-US" dirty="0"/>
+              <a:t>1</a:t>
+            </a:r>
+            <a:r>
+              <a:rPr lang="en-US" baseline="30000" dirty="0"/>
+              <a:t>st</a:t>
+            </a:r>
+            <a:r>
+              <a:rPr lang="en-US" dirty="0"/>
+              <a:t> Node</a:t>
+            </a:r>
+          </a:p>
+          <a:p>
+            <a:pPr algn="ctr"/>
+            <a:r>
+              <a:rPr lang="en-US" dirty="0"/>
+              <a:t>It’s an object</a:t>
+            </a:r>
+          </a:p>
+        </p:txBody>
+      </p:sp>
+      <p:cxnSp>
+        <p:nvCxnSpPr>
+          <p:cNvPr id="6" name="Straight Arrow Connector 5">
+            <a:extLst>
+              <a:ext uri="{FF2B5EF4-FFF2-40B4-BE49-F238E27FC236}">
+                <a16:creationId xmlns:a16="http://schemas.microsoft.com/office/drawing/2014/main" id="{5BC68F31-22A3-B4BA-4842-968FA0448ADC}"/>
+              </a:ext>
+            </a:extLst>
+          </p:cNvPr>
+          <p:cNvCxnSpPr>
+            <a:cxnSpLocks/>
+            <a:stCxn id="4" idx="6"/>
+            <a:endCxn id="7" idx="2"/>
+          </p:cNvCxnSpPr>
+          <p:nvPr/>
+        </p:nvCxnSpPr>
+        <p:spPr>
+          <a:xfrm flipV="1">
+            <a:off x="3135630" y="2457450"/>
+            <a:ext cx="1152525" cy="1194435"/>
+          </a:xfrm>
+          <a:prstGeom prst="straightConnector1">
+            <a:avLst/>
+          </a:prstGeom>
+          <a:ln w="38100">
+            <a:tailEnd type="triangle"/>
+          </a:ln>
+        </p:spPr>
+        <p:style>
+          <a:lnRef idx="1">
+            <a:schemeClr val="accent1"/>
+          </a:lnRef>
+          <a:fillRef idx="0">
+            <a:schemeClr val="accent1"/>
+          </a:fillRef>
+          <a:effectRef idx="0">
+            <a:schemeClr val="accent1"/>
+          </a:effectRef>
+          <a:fontRef idx="minor">
+            <a:schemeClr val="tx1"/>
+          </a:fontRef>
+        </p:style>
+      </p:cxnSp>
+      <p:sp>
+        <p:nvSpPr>
+          <p:cNvPr id="7" name="Oval 6">
+            <a:extLst>
+              <a:ext uri="{FF2B5EF4-FFF2-40B4-BE49-F238E27FC236}">
+                <a16:creationId xmlns:a16="http://schemas.microsoft.com/office/drawing/2014/main" id="{4DBDC52E-F5AA-3EA4-D369-A5BC49048EEF}"/>
+              </a:ext>
+            </a:extLst>
+          </p:cNvPr>
+          <p:cNvSpPr/>
+          <p:nvPr/>
+        </p:nvSpPr>
+        <p:spPr>
+          <a:xfrm>
+            <a:off x="4288155" y="1485900"/>
+            <a:ext cx="2297430" cy="1943100"/>
+          </a:xfrm>
+          <a:prstGeom prst="ellipse">
+            <a:avLst/>
+          </a:prstGeom>
+        </p:spPr>
+        <p:style>
+          <a:lnRef idx="2">
+            <a:schemeClr val="accent1">
+              <a:shade val="50000"/>
+            </a:schemeClr>
+          </a:lnRef>
+          <a:fillRef idx="1">
+            <a:schemeClr val="accent1"/>
+          </a:fillRef>
+          <a:effectRef idx="0">
+            <a:schemeClr val="accent1"/>
+          </a:effectRef>
+          <a:fontRef idx="minor">
+            <a:schemeClr val="lt1"/>
+          </a:fontRef>
+        </p:style>
+        <p:txBody>
+          <a:bodyPr rtlCol="0" anchor="ctr"/>
+          <a:lstStyle/>
+          <a:p>
+            <a:pPr algn="ctr"/>
+            <a:r>
+              <a:rPr lang="en-US" dirty="0"/>
+              <a:t>2</a:t>
+            </a:r>
+            <a:r>
+              <a:rPr lang="en-US" baseline="30000" dirty="0"/>
+              <a:t>nd</a:t>
+            </a:r>
+            <a:r>
+              <a:rPr lang="en-US" dirty="0"/>
+              <a:t> Node</a:t>
+            </a:r>
+          </a:p>
+          <a:p>
+            <a:pPr algn="ctr"/>
+            <a:r>
+              <a:rPr lang="en-US" dirty="0"/>
+              <a:t>It’s an object</a:t>
+            </a:r>
+          </a:p>
+        </p:txBody>
+      </p:sp>
+      <p:sp>
+        <p:nvSpPr>
+          <p:cNvPr id="10" name="Oval 9">
+            <a:extLst>
+              <a:ext uri="{FF2B5EF4-FFF2-40B4-BE49-F238E27FC236}">
+                <a16:creationId xmlns:a16="http://schemas.microsoft.com/office/drawing/2014/main" id="{3444004E-49E2-8CB4-BCFB-6D5258EBC0F9}"/>
+              </a:ext>
+            </a:extLst>
+          </p:cNvPr>
+          <p:cNvSpPr/>
+          <p:nvPr/>
+        </p:nvSpPr>
+        <p:spPr>
+          <a:xfrm>
+            <a:off x="8362950" y="2566035"/>
+            <a:ext cx="2297430" cy="1943100"/>
+          </a:xfrm>
+          <a:prstGeom prst="ellipse">
+            <a:avLst/>
+          </a:prstGeom>
+        </p:spPr>
+        <p:style>
+          <a:lnRef idx="2">
+            <a:schemeClr val="accent1">
+              <a:shade val="50000"/>
+            </a:schemeClr>
+          </a:lnRef>
+          <a:fillRef idx="1">
+            <a:schemeClr val="accent1"/>
+          </a:fillRef>
+          <a:effectRef idx="0">
+            <a:schemeClr val="accent1"/>
+          </a:effectRef>
+          <a:fontRef idx="minor">
+            <a:schemeClr val="lt1"/>
+          </a:fontRef>
+        </p:style>
+        <p:txBody>
+          <a:bodyPr rtlCol="0" anchor="ctr"/>
+          <a:lstStyle/>
+          <a:p>
+            <a:pPr algn="ctr"/>
+            <a:r>
+              <a:rPr lang="en-US" dirty="0"/>
+              <a:t>3</a:t>
+            </a:r>
+            <a:r>
+              <a:rPr lang="en-US" baseline="30000" dirty="0"/>
+              <a:t>rd</a:t>
+            </a:r>
+            <a:r>
+              <a:rPr lang="en-US" dirty="0"/>
+              <a:t> Node</a:t>
+            </a:r>
+          </a:p>
+          <a:p>
+            <a:pPr algn="ctr"/>
+            <a:r>
+              <a:rPr lang="en-US" dirty="0"/>
+              <a:t>It’s an object</a:t>
+            </a:r>
+          </a:p>
+        </p:txBody>
+      </p:sp>
+      <p:cxnSp>
+        <p:nvCxnSpPr>
+          <p:cNvPr id="11" name="Straight Arrow Connector 10">
+            <a:extLst>
+              <a:ext uri="{FF2B5EF4-FFF2-40B4-BE49-F238E27FC236}">
+                <a16:creationId xmlns:a16="http://schemas.microsoft.com/office/drawing/2014/main" id="{7B42334C-3EFC-DF85-FF43-3689CB15B6CE}"/>
+              </a:ext>
+            </a:extLst>
+          </p:cNvPr>
+          <p:cNvCxnSpPr>
+            <a:cxnSpLocks/>
+            <a:stCxn id="7" idx="6"/>
+            <a:endCxn id="10" idx="2"/>
+          </p:cNvCxnSpPr>
+          <p:nvPr/>
+        </p:nvCxnSpPr>
+        <p:spPr>
+          <a:xfrm>
+            <a:off x="6585585" y="2457450"/>
+            <a:ext cx="1777365" cy="1080135"/>
+          </a:xfrm>
+          <a:prstGeom prst="straightConnector1">
+            <a:avLst/>
+          </a:prstGeom>
+          <a:ln w="38100">
+            <a:tailEnd type="triangle"/>
+          </a:ln>
+        </p:spPr>
+        <p:style>
+          <a:lnRef idx="1">
+            <a:schemeClr val="accent1"/>
+          </a:lnRef>
+          <a:fillRef idx="0">
+            <a:schemeClr val="accent1"/>
+          </a:fillRef>
+          <a:effectRef idx="0">
+            <a:schemeClr val="accent1"/>
+          </a:effectRef>
+          <a:fontRef idx="minor">
+            <a:schemeClr val="tx1"/>
+          </a:fontRef>
+        </p:style>
+      </p:cxnSp>
+      <p:sp>
+        <p:nvSpPr>
+          <p:cNvPr id="9" name="Oval 8">
+            <a:extLst>
+              <a:ext uri="{FF2B5EF4-FFF2-40B4-BE49-F238E27FC236}">
+                <a16:creationId xmlns:a16="http://schemas.microsoft.com/office/drawing/2014/main" id="{B97DCA78-9FB0-74F3-58E3-55934263B8B3}"/>
+              </a:ext>
+            </a:extLst>
+          </p:cNvPr>
+          <p:cNvSpPr/>
+          <p:nvPr/>
+        </p:nvSpPr>
+        <p:spPr>
+          <a:xfrm>
+            <a:off x="6675120" y="4617720"/>
+            <a:ext cx="2297430" cy="1943100"/>
+          </a:xfrm>
+          <a:prstGeom prst="ellipse">
+            <a:avLst/>
+          </a:prstGeom>
+        </p:spPr>
+        <p:style>
+          <a:lnRef idx="2">
+            <a:schemeClr val="accent1">
+              <a:shade val="50000"/>
+            </a:schemeClr>
+          </a:lnRef>
+          <a:fillRef idx="1">
+            <a:schemeClr val="accent1"/>
+          </a:fillRef>
+          <a:effectRef idx="0">
+            <a:schemeClr val="accent1"/>
+          </a:effectRef>
+          <a:fontRef idx="minor">
+            <a:schemeClr val="lt1"/>
+          </a:fontRef>
+        </p:style>
+        <p:txBody>
+          <a:bodyPr rtlCol="0" anchor="ctr"/>
+          <a:lstStyle/>
+          <a:p>
+            <a:pPr algn="ctr"/>
+            <a:r>
+              <a:rPr lang="en-US" baseline="30000" dirty="0"/>
+              <a:t>4th</a:t>
+            </a:r>
+            <a:r>
+              <a:rPr lang="en-US" dirty="0"/>
+              <a:t> Node</a:t>
+            </a:r>
+          </a:p>
+          <a:p>
+            <a:pPr algn="ctr"/>
+            <a:r>
+              <a:rPr lang="en-US" dirty="0"/>
+              <a:t>It’s an object</a:t>
+            </a:r>
+          </a:p>
+        </p:txBody>
+      </p:sp>
+      <p:sp>
+        <p:nvSpPr>
+          <p:cNvPr id="12" name="Oval 11">
+            <a:extLst>
+              <a:ext uri="{FF2B5EF4-FFF2-40B4-BE49-F238E27FC236}">
+                <a16:creationId xmlns:a16="http://schemas.microsoft.com/office/drawing/2014/main" id="{B586B6E8-56E8-16E8-285C-593D8AFA25F4}"/>
+              </a:ext>
+            </a:extLst>
+          </p:cNvPr>
+          <p:cNvSpPr/>
+          <p:nvPr/>
+        </p:nvSpPr>
+        <p:spPr>
+          <a:xfrm>
+            <a:off x="3360420" y="4617720"/>
+            <a:ext cx="2297430" cy="1943100"/>
+          </a:xfrm>
+          <a:prstGeom prst="ellipse">
+            <a:avLst/>
+          </a:prstGeom>
+        </p:spPr>
+        <p:style>
+          <a:lnRef idx="2">
+            <a:schemeClr val="accent1">
+              <a:shade val="50000"/>
+            </a:schemeClr>
+          </a:lnRef>
+          <a:fillRef idx="1">
+            <a:schemeClr val="accent1"/>
+          </a:fillRef>
+          <a:effectRef idx="0">
+            <a:schemeClr val="accent1"/>
+          </a:effectRef>
+          <a:fontRef idx="minor">
+            <a:schemeClr val="lt1"/>
+          </a:fontRef>
+        </p:style>
+        <p:txBody>
+          <a:bodyPr rtlCol="0" anchor="ctr"/>
+          <a:lstStyle/>
+          <a:p>
+            <a:pPr algn="ctr"/>
+            <a:r>
+              <a:rPr lang="en-US" dirty="0"/>
+              <a:t>5</a:t>
+            </a:r>
+            <a:r>
+              <a:rPr lang="en-US" baseline="30000" dirty="0"/>
+              <a:t>th</a:t>
+            </a:r>
+            <a:r>
+              <a:rPr lang="en-US" dirty="0"/>
+              <a:t> Node</a:t>
+            </a:r>
+          </a:p>
+          <a:p>
+            <a:pPr algn="ctr"/>
+            <a:r>
+              <a:rPr lang="en-US" dirty="0"/>
+              <a:t>It’s an object</a:t>
+            </a:r>
+          </a:p>
+        </p:txBody>
+      </p:sp>
+      <p:cxnSp>
+        <p:nvCxnSpPr>
+          <p:cNvPr id="13" name="Straight Arrow Connector 12">
+            <a:extLst>
+              <a:ext uri="{FF2B5EF4-FFF2-40B4-BE49-F238E27FC236}">
+                <a16:creationId xmlns:a16="http://schemas.microsoft.com/office/drawing/2014/main" id="{A7EEFA50-118B-8723-A319-6A7E7EEC7A2F}"/>
+              </a:ext>
+            </a:extLst>
+          </p:cNvPr>
+          <p:cNvCxnSpPr>
+            <a:cxnSpLocks/>
+            <a:stCxn id="10" idx="4"/>
+            <a:endCxn id="9" idx="6"/>
+          </p:cNvCxnSpPr>
+          <p:nvPr/>
+        </p:nvCxnSpPr>
+        <p:spPr>
+          <a:xfrm flipH="1">
+            <a:off x="8972550" y="4509135"/>
+            <a:ext cx="539115" cy="1080135"/>
+          </a:xfrm>
+          <a:prstGeom prst="straightConnector1">
+            <a:avLst/>
+          </a:prstGeom>
+          <a:ln w="38100">
+            <a:tailEnd type="triangle"/>
+          </a:ln>
+        </p:spPr>
+        <p:style>
+          <a:lnRef idx="1">
+            <a:schemeClr val="accent1"/>
+          </a:lnRef>
+          <a:fillRef idx="0">
+            <a:schemeClr val="accent1"/>
+          </a:fillRef>
+          <a:effectRef idx="0">
+            <a:schemeClr val="accent1"/>
+          </a:effectRef>
+          <a:fontRef idx="minor">
+            <a:schemeClr val="tx1"/>
+          </a:fontRef>
+        </p:style>
+      </p:cxnSp>
+      <p:cxnSp>
+        <p:nvCxnSpPr>
+          <p:cNvPr id="16" name="Straight Arrow Connector 15">
+            <a:extLst>
+              <a:ext uri="{FF2B5EF4-FFF2-40B4-BE49-F238E27FC236}">
+                <a16:creationId xmlns:a16="http://schemas.microsoft.com/office/drawing/2014/main" id="{D13F08AA-D107-F565-E5C8-960D5D374C11}"/>
+              </a:ext>
+            </a:extLst>
+          </p:cNvPr>
+          <p:cNvCxnSpPr>
+            <a:cxnSpLocks/>
+            <a:stCxn id="9" idx="2"/>
+            <a:endCxn id="12" idx="6"/>
+          </p:cNvCxnSpPr>
+          <p:nvPr/>
+        </p:nvCxnSpPr>
+        <p:spPr>
+          <a:xfrm flipH="1">
+            <a:off x="5657850" y="5589270"/>
+            <a:ext cx="1017270" cy="0"/>
+          </a:xfrm>
+          <a:prstGeom prst="straightConnector1">
+            <a:avLst/>
+          </a:prstGeom>
+          <a:ln w="38100">
+            <a:tailEnd type="triangle"/>
+          </a:ln>
+        </p:spPr>
+        <p:style>
+          <a:lnRef idx="1">
+            <a:schemeClr val="accent1"/>
+          </a:lnRef>
+          <a:fillRef idx="0">
+            <a:schemeClr val="accent1"/>
+          </a:fillRef>
+          <a:effectRef idx="0">
+            <a:schemeClr val="accent1"/>
+          </a:effectRef>
+          <a:fontRef idx="minor">
+            <a:schemeClr val="tx1"/>
+          </a:fontRef>
+        </p:style>
+      </p:cxnSp>
+      <p:cxnSp>
+        <p:nvCxnSpPr>
+          <p:cNvPr id="20" name="Straight Arrow Connector 19">
+            <a:extLst>
+              <a:ext uri="{FF2B5EF4-FFF2-40B4-BE49-F238E27FC236}">
+                <a16:creationId xmlns:a16="http://schemas.microsoft.com/office/drawing/2014/main" id="{D3EE133E-CB6B-A9A5-4E33-F172DC45F8A8}"/>
+              </a:ext>
+            </a:extLst>
+          </p:cNvPr>
+          <p:cNvCxnSpPr>
+            <a:cxnSpLocks/>
+            <a:stCxn id="12" idx="2"/>
+            <a:endCxn id="4" idx="4"/>
+          </p:cNvCxnSpPr>
+          <p:nvPr/>
+        </p:nvCxnSpPr>
+        <p:spPr>
+          <a:xfrm flipH="1" flipV="1">
+            <a:off x="1986915" y="4623435"/>
+            <a:ext cx="1373505" cy="965835"/>
+          </a:xfrm>
+          <a:prstGeom prst="straightConnector1">
+            <a:avLst/>
+          </a:prstGeom>
+          <a:ln w="38100">
+            <a:tailEnd type="triangle"/>
+          </a:ln>
+        </p:spPr>
+        <p:style>
+          <a:lnRef idx="1">
+            <a:schemeClr val="accent1"/>
+          </a:lnRef>
+          <a:fillRef idx="0">
+            <a:schemeClr val="accent1"/>
+          </a:fillRef>
+          <a:effectRef idx="0">
+            <a:schemeClr val="accent1"/>
+          </a:effectRef>
+          <a:fontRef idx="minor">
+            <a:schemeClr val="tx1"/>
+          </a:fontRef>
+        </p:style>
+      </p:cxnSp>
+    </p:spTree>
+    <p:extLst>
+      <p:ext uri="{BB962C8B-B14F-4D97-AF65-F5344CB8AC3E}">
+        <p14:creationId xmlns:p14="http://schemas.microsoft.com/office/powerpoint/2010/main" val="2221330634"/>
       </p:ext>
     </p:extLst>
   </p:cSld>

</xml_diff>

<commit_message>
small change to MarksDrawrings
</commit_message>
<xml_diff>
--- a/resources/MarksDrawrings.pptx
+++ b/resources/MarksDrawrings.pptx
@@ -11,6 +11,7 @@
     <p:sldId id="259" r:id="rId5"/>
     <p:sldId id="260" r:id="rId6"/>
     <p:sldId id="261" r:id="rId7"/>
+    <p:sldId id="262" r:id="rId8"/>
   </p:sldIdLst>
   <p:sldSz cx="12192000" cy="6858000"/>
   <p:notesSz cx="6858000" cy="9144000"/>
@@ -10790,6 +10791,321 @@
 </p:sld>
 </file>
 
+<file path=ppt/slides/slide7.xml><?xml version="1.0" encoding="utf-8"?>
+<p:sld xmlns:a="http://schemas.openxmlformats.org/drawingml/2006/main" xmlns:r="http://schemas.openxmlformats.org/officeDocument/2006/relationships" xmlns:p="http://schemas.openxmlformats.org/presentationml/2006/main">
+  <p:cSld>
+    <p:spTree>
+      <p:nvGrpSpPr>
+        <p:cNvPr id="1" name=""/>
+        <p:cNvGrpSpPr/>
+        <p:nvPr/>
+      </p:nvGrpSpPr>
+      <p:grpSpPr>
+        <a:xfrm>
+          <a:off x="0" y="0"/>
+          <a:ext cx="0" cy="0"/>
+          <a:chOff x="0" y="0"/>
+          <a:chExt cx="0" cy="0"/>
+        </a:xfrm>
+      </p:grpSpPr>
+      <p:sp>
+        <p:nvSpPr>
+          <p:cNvPr id="2" name="Title 1">
+            <a:extLst>
+              <a:ext uri="{FF2B5EF4-FFF2-40B4-BE49-F238E27FC236}">
+                <a16:creationId xmlns:a16="http://schemas.microsoft.com/office/drawing/2014/main" id="{6CC59EFB-A97F-B9C7-C0DD-8C188966C5C8}"/>
+              </a:ext>
+            </a:extLst>
+          </p:cNvPr>
+          <p:cNvSpPr>
+            <a:spLocks noGrp="1"/>
+          </p:cNvSpPr>
+          <p:nvPr>
+            <p:ph type="title"/>
+          </p:nvPr>
+        </p:nvSpPr>
+        <p:spPr/>
+        <p:txBody>
+          <a:bodyPr/>
+          <a:lstStyle/>
+          <a:p>
+            <a:r>
+              <a:rPr lang="en-US" dirty="0"/>
+              <a:t>Stack explanation (</a:t>
+            </a:r>
+            <a:r>
+              <a:rPr lang="en-US" dirty="0" err="1"/>
+              <a:t>Stacko</a:t>
+            </a:r>
+            <a:r>
+              <a:rPr lang="en-US" dirty="0"/>
+              <a:t>)</a:t>
+            </a:r>
+          </a:p>
+        </p:txBody>
+      </p:sp>
+      <p:graphicFrame>
+        <p:nvGraphicFramePr>
+          <p:cNvPr id="4" name="Table 4">
+            <a:extLst>
+              <a:ext uri="{FF2B5EF4-FFF2-40B4-BE49-F238E27FC236}">
+                <a16:creationId xmlns:a16="http://schemas.microsoft.com/office/drawing/2014/main" id="{03AB51E9-FADC-96D6-212D-343EFEFF57C4}"/>
+              </a:ext>
+            </a:extLst>
+          </p:cNvPr>
+          <p:cNvGraphicFramePr>
+            <a:graphicFrameLocks noGrp="1"/>
+          </p:cNvGraphicFramePr>
+          <p:nvPr>
+            <p:ph idx="1"/>
+            <p:extLst>
+              <p:ext uri="{D42A27DB-BD31-4B8C-83A1-F6EECF244321}">
+                <p14:modId xmlns:p14="http://schemas.microsoft.com/office/powerpoint/2010/main" val="2002549048"/>
+              </p:ext>
+            </p:extLst>
+          </p:nvPr>
+        </p:nvGraphicFramePr>
+        <p:xfrm>
+          <a:off x="1038225" y="4185920"/>
+          <a:ext cx="3339465" cy="2225040"/>
+        </p:xfrm>
+        <a:graphic>
+          <a:graphicData uri="http://schemas.openxmlformats.org/drawingml/2006/table">
+            <a:tbl>
+              <a:tblPr firstRow="1" bandRow="1">
+                <a:tableStyleId>{5C22544A-7EE6-4342-B048-85BDC9FD1C3A}</a:tableStyleId>
+              </a:tblPr>
+              <a:tblGrid>
+                <a:gridCol w="3339465">
+                  <a:extLst>
+                    <a:ext uri="{9D8B030D-6E8A-4147-A177-3AD203B41FA5}">
+                      <a16:colId xmlns:a16="http://schemas.microsoft.com/office/drawing/2014/main" val="3954610707"/>
+                    </a:ext>
+                  </a:extLst>
+                </a:gridCol>
+              </a:tblGrid>
+              <a:tr h="370840">
+                <a:tc>
+                  <a:txBody>
+                    <a:bodyPr/>
+                    <a:lstStyle/>
+                    <a:p>
+                      <a:r>
+                        <a:rPr lang="en-US" dirty="0"/>
+                        <a:t>Stack Class</a:t>
+                      </a:r>
+                    </a:p>
+                  </a:txBody>
+                  <a:tcPr/>
+                </a:tc>
+                <a:extLst>
+                  <a:ext uri="{0D108BD9-81ED-4DB2-BD59-A6C34878D82A}">
+                    <a16:rowId xmlns:a16="http://schemas.microsoft.com/office/drawing/2014/main" val="1956584422"/>
+                  </a:ext>
+                </a:extLst>
+              </a:tr>
+              <a:tr h="370840">
+                <a:tc>
+                  <a:txBody>
+                    <a:bodyPr/>
+                    <a:lstStyle/>
+                    <a:p>
+                      <a:endParaRPr lang="en-US" dirty="0"/>
+                    </a:p>
+                  </a:txBody>
+                  <a:tcPr/>
+                </a:tc>
+                <a:extLst>
+                  <a:ext uri="{0D108BD9-81ED-4DB2-BD59-A6C34878D82A}">
+                    <a16:rowId xmlns:a16="http://schemas.microsoft.com/office/drawing/2014/main" val="1765192223"/>
+                  </a:ext>
+                </a:extLst>
+              </a:tr>
+              <a:tr h="370840">
+                <a:tc>
+                  <a:txBody>
+                    <a:bodyPr/>
+                    <a:lstStyle/>
+                    <a:p>
+                      <a:r>
+                        <a:rPr lang="en-US" dirty="0"/>
+                        <a:t>Person3</a:t>
+                      </a:r>
+                    </a:p>
+                  </a:txBody>
+                  <a:tcPr/>
+                </a:tc>
+                <a:extLst>
+                  <a:ext uri="{0D108BD9-81ED-4DB2-BD59-A6C34878D82A}">
+                    <a16:rowId xmlns:a16="http://schemas.microsoft.com/office/drawing/2014/main" val="783736487"/>
+                  </a:ext>
+                </a:extLst>
+              </a:tr>
+              <a:tr h="370840">
+                <a:tc>
+                  <a:txBody>
+                    <a:bodyPr/>
+                    <a:lstStyle/>
+                    <a:p>
+                      <a:r>
+                        <a:rPr lang="en-US" dirty="0"/>
+                        <a:t>Person4</a:t>
+                      </a:r>
+                    </a:p>
+                  </a:txBody>
+                  <a:tcPr/>
+                </a:tc>
+                <a:extLst>
+                  <a:ext uri="{0D108BD9-81ED-4DB2-BD59-A6C34878D82A}">
+                    <a16:rowId xmlns:a16="http://schemas.microsoft.com/office/drawing/2014/main" val="3347644438"/>
+                  </a:ext>
+                </a:extLst>
+              </a:tr>
+              <a:tr h="370840">
+                <a:tc>
+                  <a:txBody>
+                    <a:bodyPr/>
+                    <a:lstStyle/>
+                    <a:p>
+                      <a:r>
+                        <a:rPr lang="en-US" dirty="0"/>
+                        <a:t>Person2</a:t>
+                      </a:r>
+                    </a:p>
+                  </a:txBody>
+                  <a:tcPr/>
+                </a:tc>
+                <a:extLst>
+                  <a:ext uri="{0D108BD9-81ED-4DB2-BD59-A6C34878D82A}">
+                    <a16:rowId xmlns:a16="http://schemas.microsoft.com/office/drawing/2014/main" val="771043902"/>
+                  </a:ext>
+                </a:extLst>
+              </a:tr>
+              <a:tr h="370840">
+                <a:tc>
+                  <a:txBody>
+                    <a:bodyPr/>
+                    <a:lstStyle/>
+                    <a:p>
+                      <a:r>
+                        <a:rPr lang="en-US" dirty="0"/>
+                        <a:t>Person1</a:t>
+                      </a:r>
+                    </a:p>
+                  </a:txBody>
+                  <a:tcPr/>
+                </a:tc>
+                <a:extLst>
+                  <a:ext uri="{0D108BD9-81ED-4DB2-BD59-A6C34878D82A}">
+                    <a16:rowId xmlns:a16="http://schemas.microsoft.com/office/drawing/2014/main" val="3484692777"/>
+                  </a:ext>
+                </a:extLst>
+              </a:tr>
+            </a:tbl>
+          </a:graphicData>
+        </a:graphic>
+      </p:graphicFrame>
+      <p:sp>
+        <p:nvSpPr>
+          <p:cNvPr id="5" name="TextBox 4">
+            <a:extLst>
+              <a:ext uri="{FF2B5EF4-FFF2-40B4-BE49-F238E27FC236}">
+                <a16:creationId xmlns:a16="http://schemas.microsoft.com/office/drawing/2014/main" id="{F50E760A-FB4E-1675-0466-D8DA6E01F4D6}"/>
+              </a:ext>
+            </a:extLst>
+          </p:cNvPr>
+          <p:cNvSpPr txBox="1"/>
+          <p:nvPr/>
+        </p:nvSpPr>
+        <p:spPr>
+          <a:xfrm>
+            <a:off x="1072515" y="1517918"/>
+            <a:ext cx="7938135" cy="2308324"/>
+          </a:xfrm>
+          <a:prstGeom prst="rect">
+            <a:avLst/>
+          </a:prstGeom>
+          <a:noFill/>
+        </p:spPr>
+        <p:txBody>
+          <a:bodyPr wrap="square" rtlCol="0">
+            <a:spAutoFit/>
+          </a:bodyPr>
+          <a:lstStyle/>
+          <a:p>
+            <a:r>
+              <a:rPr lang="en-US" dirty="0"/>
+              <a:t>A stack is a LIFO construction. So the first thing that you pushed onto the stack is the last thing that you can take off of the stack.</a:t>
+            </a:r>
+          </a:p>
+          <a:p>
+            <a:r>
+              <a:rPr lang="en-US" dirty="0"/>
+              <a:t>Functionality of a stack:</a:t>
+            </a:r>
+          </a:p>
+          <a:p>
+            <a:pPr marL="285750" indent="-285750">
+              <a:buFontTx/>
+              <a:buChar char="-"/>
+            </a:pPr>
+            <a:r>
+              <a:rPr lang="en-US" dirty="0"/>
+              <a:t>push() – put a new obj on the stack</a:t>
+            </a:r>
+          </a:p>
+          <a:p>
+            <a:pPr marL="285750" indent="-285750">
+              <a:buFontTx/>
+              <a:buChar char="-"/>
+            </a:pPr>
+            <a:r>
+              <a:rPr lang="en-US" dirty="0"/>
+              <a:t>Pop() -  return and delete the top obj</a:t>
+            </a:r>
+          </a:p>
+          <a:p>
+            <a:pPr marL="285750" indent="-285750">
+              <a:buFontTx/>
+              <a:buChar char="-"/>
+            </a:pPr>
+            <a:r>
+              <a:rPr lang="en-US" dirty="0"/>
+              <a:t>Peek() – get the data from the top obj.</a:t>
+            </a:r>
+          </a:p>
+          <a:p>
+            <a:pPr marL="285750" indent="-285750">
+              <a:buFontTx/>
+              <a:buChar char="-"/>
+            </a:pPr>
+            <a:r>
+              <a:rPr lang="en-US" dirty="0"/>
+              <a:t>Size prop – returns the size of the stack currently</a:t>
+            </a:r>
+          </a:p>
+          <a:p>
+            <a:pPr marL="285750" indent="-285750">
+              <a:buFontTx/>
+              <a:buChar char="-"/>
+            </a:pPr>
+            <a:endParaRPr lang="en-US" dirty="0"/>
+          </a:p>
+        </p:txBody>
+      </p:sp>
+    </p:spTree>
+    <p:extLst>
+      <p:ext uri="{BB962C8B-B14F-4D97-AF65-F5344CB8AC3E}">
+        <p14:creationId xmlns:p14="http://schemas.microsoft.com/office/powerpoint/2010/main" val="2619765847"/>
+      </p:ext>
+    </p:extLst>
+  </p:cSld>
+  <p:clrMapOvr>
+    <a:masterClrMapping/>
+  </p:clrMapOvr>
+</p:sld>
+</file>
+
 <file path=ppt/theme/theme1.xml><?xml version="1.0" encoding="utf-8"?>
 <a:theme xmlns:a="http://schemas.openxmlformats.org/drawingml/2006/main" name="Office Theme">
   <a:themeElements>

</xml_diff>

<commit_message>
ads bujiltin logging4 and updates marksdrawings
</commit_message>
<xml_diff>
--- a/resources/MarksDrawrings.pptx
+++ b/resources/MarksDrawrings.pptx
@@ -12,6 +12,7 @@
     <p:sldId id="260" r:id="rId6"/>
     <p:sldId id="261" r:id="rId7"/>
     <p:sldId id="262" r:id="rId8"/>
+    <p:sldId id="263" r:id="rId9"/>
   </p:sldIdLst>
   <p:sldSz cx="12192000" cy="6858000"/>
   <p:notesSz cx="6858000" cy="9144000"/>
@@ -11106,6 +11107,881 @@
 </p:sld>
 </file>
 
+<file path=ppt/slides/slide8.xml><?xml version="1.0" encoding="utf-8"?>
+<p:sld xmlns:a="http://schemas.openxmlformats.org/drawingml/2006/main" xmlns:r="http://schemas.openxmlformats.org/officeDocument/2006/relationships" xmlns:p="http://schemas.openxmlformats.org/presentationml/2006/main">
+  <p:cSld>
+    <p:spTree>
+      <p:nvGrpSpPr>
+        <p:cNvPr id="1" name=""/>
+        <p:cNvGrpSpPr/>
+        <p:nvPr/>
+      </p:nvGrpSpPr>
+      <p:grpSpPr>
+        <a:xfrm>
+          <a:off x="0" y="0"/>
+          <a:ext cx="0" cy="0"/>
+          <a:chOff x="0" y="0"/>
+          <a:chExt cx="0" cy="0"/>
+        </a:xfrm>
+      </p:grpSpPr>
+      <p:sp>
+        <p:nvSpPr>
+          <p:cNvPr id="2" name="Title 1">
+            <a:extLst>
+              <a:ext uri="{FF2B5EF4-FFF2-40B4-BE49-F238E27FC236}">
+                <a16:creationId xmlns:a16="http://schemas.microsoft.com/office/drawing/2014/main" id="{A159CED2-E570-597E-B488-46A7CF43256E}"/>
+              </a:ext>
+            </a:extLst>
+          </p:cNvPr>
+          <p:cNvSpPr>
+            <a:spLocks noGrp="1"/>
+          </p:cNvSpPr>
+          <p:nvPr>
+            <p:ph type="title"/>
+          </p:nvPr>
+        </p:nvSpPr>
+        <p:spPr>
+          <a:xfrm>
+            <a:off x="1323975" y="22225"/>
+            <a:ext cx="10515600" cy="1325563"/>
+          </a:xfrm>
+        </p:spPr>
+        <p:txBody>
+          <a:bodyPr/>
+          <a:lstStyle/>
+          <a:p>
+            <a:r>
+              <a:rPr lang="en-US" dirty="0"/>
+              <a:t>P1 </a:t>
+            </a:r>
+            <a:r>
+              <a:rPr lang="en-US" dirty="0" err="1"/>
+              <a:t>api</a:t>
+            </a:r>
+            <a:r>
+              <a:rPr lang="en-US" dirty="0"/>
+              <a:t> application program structure</a:t>
+            </a:r>
+            <a:br>
+              <a:rPr lang="en-US" dirty="0"/>
+            </a:br>
+            <a:r>
+              <a:rPr lang="en-US" dirty="0"/>
+              <a:t>“Repository Pattern”</a:t>
+            </a:r>
+          </a:p>
+        </p:txBody>
+      </p:sp>
+      <p:sp>
+        <p:nvSpPr>
+          <p:cNvPr id="4" name="Rectangle 3">
+            <a:extLst>
+              <a:ext uri="{FF2B5EF4-FFF2-40B4-BE49-F238E27FC236}">
+                <a16:creationId xmlns:a16="http://schemas.microsoft.com/office/drawing/2014/main" id="{8681237B-F4FD-BB44-E736-79EBD6880E02}"/>
+              </a:ext>
+            </a:extLst>
+          </p:cNvPr>
+          <p:cNvSpPr/>
+          <p:nvPr/>
+        </p:nvSpPr>
+        <p:spPr>
+          <a:xfrm>
+            <a:off x="1000125" y="1690688"/>
+            <a:ext cx="3291840" cy="1325563"/>
+          </a:xfrm>
+          <a:prstGeom prst="rect">
+            <a:avLst/>
+          </a:prstGeom>
+        </p:spPr>
+        <p:style>
+          <a:lnRef idx="2">
+            <a:schemeClr val="accent1">
+              <a:shade val="50000"/>
+            </a:schemeClr>
+          </a:lnRef>
+          <a:fillRef idx="1">
+            <a:schemeClr val="accent1"/>
+          </a:fillRef>
+          <a:effectRef idx="0">
+            <a:schemeClr val="accent1"/>
+          </a:effectRef>
+          <a:fontRef idx="minor">
+            <a:schemeClr val="lt1"/>
+          </a:fontRef>
+        </p:style>
+        <p:txBody>
+          <a:bodyPr rtlCol="0" anchor="ctr"/>
+          <a:lstStyle/>
+          <a:p>
+            <a:pPr algn="ctr"/>
+            <a:r>
+              <a:rPr lang="en-US" dirty="0"/>
+              <a:t>API Project - </a:t>
+            </a:r>
+            <a:r>
+              <a:rPr lang="en-US" dirty="0" err="1"/>
+              <a:t>Entrypoint</a:t>
+            </a:r>
+            <a:endParaRPr lang="en-US" dirty="0"/>
+          </a:p>
+          <a:p>
+            <a:pPr algn="ctr"/>
+            <a:r>
+              <a:rPr lang="en-US" dirty="0"/>
+              <a:t>Has ‘controllers’ that contain ‘action methods’ that call methods on the business layer</a:t>
+            </a:r>
+          </a:p>
+        </p:txBody>
+      </p:sp>
+      <p:sp>
+        <p:nvSpPr>
+          <p:cNvPr id="5" name="Rectangle 4">
+            <a:extLst>
+              <a:ext uri="{FF2B5EF4-FFF2-40B4-BE49-F238E27FC236}">
+                <a16:creationId xmlns:a16="http://schemas.microsoft.com/office/drawing/2014/main" id="{11EF6ABB-3ADB-8956-FE0E-EA16C3CE8CC1}"/>
+              </a:ext>
+            </a:extLst>
+          </p:cNvPr>
+          <p:cNvSpPr/>
+          <p:nvPr/>
+        </p:nvSpPr>
+        <p:spPr>
+          <a:xfrm>
+            <a:off x="6953250" y="3016251"/>
+            <a:ext cx="3996690" cy="2087563"/>
+          </a:xfrm>
+          <a:prstGeom prst="rect">
+            <a:avLst/>
+          </a:prstGeom>
+        </p:spPr>
+        <p:style>
+          <a:lnRef idx="2">
+            <a:schemeClr val="accent1">
+              <a:shade val="50000"/>
+            </a:schemeClr>
+          </a:lnRef>
+          <a:fillRef idx="1">
+            <a:schemeClr val="accent1"/>
+          </a:fillRef>
+          <a:effectRef idx="0">
+            <a:schemeClr val="accent1"/>
+          </a:effectRef>
+          <a:fontRef idx="minor">
+            <a:schemeClr val="lt1"/>
+          </a:fontRef>
+        </p:style>
+        <p:txBody>
+          <a:bodyPr rtlCol="0" anchor="ctr"/>
+          <a:lstStyle/>
+          <a:p>
+            <a:pPr algn="ctr"/>
+            <a:r>
+              <a:rPr lang="en-US" dirty="0"/>
+              <a:t>Models</a:t>
+            </a:r>
+          </a:p>
+          <a:p>
+            <a:pPr algn="ctr"/>
+            <a:r>
+              <a:rPr lang="en-US" dirty="0"/>
+              <a:t>This holds all our various objects necessary in the app.</a:t>
+            </a:r>
+          </a:p>
+        </p:txBody>
+      </p:sp>
+      <p:sp>
+        <p:nvSpPr>
+          <p:cNvPr id="6" name="Rectangle 5">
+            <a:extLst>
+              <a:ext uri="{FF2B5EF4-FFF2-40B4-BE49-F238E27FC236}">
+                <a16:creationId xmlns:a16="http://schemas.microsoft.com/office/drawing/2014/main" id="{BCBE9C8A-A0B3-E23E-FA12-C75BC8FA90AB}"/>
+              </a:ext>
+            </a:extLst>
+          </p:cNvPr>
+          <p:cNvSpPr/>
+          <p:nvPr/>
+        </p:nvSpPr>
+        <p:spPr>
+          <a:xfrm>
+            <a:off x="1000125" y="3494246"/>
+            <a:ext cx="3291840" cy="1325563"/>
+          </a:xfrm>
+          <a:prstGeom prst="rect">
+            <a:avLst/>
+          </a:prstGeom>
+        </p:spPr>
+        <p:style>
+          <a:lnRef idx="2">
+            <a:schemeClr val="accent1">
+              <a:shade val="50000"/>
+            </a:schemeClr>
+          </a:lnRef>
+          <a:fillRef idx="1">
+            <a:schemeClr val="accent1"/>
+          </a:fillRef>
+          <a:effectRef idx="0">
+            <a:schemeClr val="accent1"/>
+          </a:effectRef>
+          <a:fontRef idx="minor">
+            <a:schemeClr val="lt1"/>
+          </a:fontRef>
+        </p:style>
+        <p:txBody>
+          <a:bodyPr rtlCol="0" anchor="ctr"/>
+          <a:lstStyle/>
+          <a:p>
+            <a:pPr algn="ctr"/>
+            <a:r>
+              <a:rPr lang="en-US" dirty="0"/>
+              <a:t>Business Layer Project</a:t>
+            </a:r>
+          </a:p>
+          <a:p>
+            <a:pPr algn="ctr"/>
+            <a:r>
+              <a:rPr lang="en-US" dirty="0"/>
+              <a:t>This is where business logic happens. Calls methods on the Repo layer to insert, </a:t>
+            </a:r>
+            <a:r>
+              <a:rPr lang="en-US" dirty="0" err="1"/>
+              <a:t>etc</a:t>
+            </a:r>
+            <a:r>
+              <a:rPr lang="en-US" dirty="0"/>
+              <a:t> data to the Db.</a:t>
+            </a:r>
+          </a:p>
+        </p:txBody>
+      </p:sp>
+      <p:sp>
+        <p:nvSpPr>
+          <p:cNvPr id="7" name="Rectangle 6">
+            <a:extLst>
+              <a:ext uri="{FF2B5EF4-FFF2-40B4-BE49-F238E27FC236}">
+                <a16:creationId xmlns:a16="http://schemas.microsoft.com/office/drawing/2014/main" id="{B32AC588-266A-06EA-28B0-C418CA19A548}"/>
+              </a:ext>
+            </a:extLst>
+          </p:cNvPr>
+          <p:cNvSpPr/>
+          <p:nvPr/>
+        </p:nvSpPr>
+        <p:spPr>
+          <a:xfrm>
+            <a:off x="1000125" y="5297805"/>
+            <a:ext cx="3291840" cy="1325563"/>
+          </a:xfrm>
+          <a:prstGeom prst="rect">
+            <a:avLst/>
+          </a:prstGeom>
+        </p:spPr>
+        <p:style>
+          <a:lnRef idx="2">
+            <a:schemeClr val="accent1">
+              <a:shade val="50000"/>
+            </a:schemeClr>
+          </a:lnRef>
+          <a:fillRef idx="1">
+            <a:schemeClr val="accent1"/>
+          </a:fillRef>
+          <a:effectRef idx="0">
+            <a:schemeClr val="accent1"/>
+          </a:effectRef>
+          <a:fontRef idx="minor">
+            <a:schemeClr val="lt1"/>
+          </a:fontRef>
+        </p:style>
+        <p:txBody>
+          <a:bodyPr rtlCol="0" anchor="ctr"/>
+          <a:lstStyle/>
+          <a:p>
+            <a:pPr algn="ctr"/>
+            <a:r>
+              <a:rPr lang="en-US" dirty="0"/>
+              <a:t>Repository Layer Project</a:t>
+            </a:r>
+          </a:p>
+          <a:p>
+            <a:pPr algn="ctr"/>
+            <a:r>
+              <a:rPr lang="en-US" dirty="0"/>
+              <a:t>Makes calls to the Db.</a:t>
+            </a:r>
+          </a:p>
+        </p:txBody>
+      </p:sp>
+      <p:cxnSp>
+        <p:nvCxnSpPr>
+          <p:cNvPr id="9" name="Straight Arrow Connector 8">
+            <a:extLst>
+              <a:ext uri="{FF2B5EF4-FFF2-40B4-BE49-F238E27FC236}">
+                <a16:creationId xmlns:a16="http://schemas.microsoft.com/office/drawing/2014/main" id="{72A7668A-6DA9-91B8-EA77-83DCC583814A}"/>
+              </a:ext>
+            </a:extLst>
+          </p:cNvPr>
+          <p:cNvCxnSpPr>
+            <a:stCxn id="4" idx="2"/>
+            <a:endCxn id="6" idx="0"/>
+          </p:cNvCxnSpPr>
+          <p:nvPr/>
+        </p:nvCxnSpPr>
+        <p:spPr>
+          <a:xfrm>
+            <a:off x="2646045" y="3016251"/>
+            <a:ext cx="0" cy="477995"/>
+          </a:xfrm>
+          <a:prstGeom prst="straightConnector1">
+            <a:avLst/>
+          </a:prstGeom>
+          <a:ln w="38100">
+            <a:tailEnd type="triangle"/>
+          </a:ln>
+        </p:spPr>
+        <p:style>
+          <a:lnRef idx="1">
+            <a:schemeClr val="accent1"/>
+          </a:lnRef>
+          <a:fillRef idx="0">
+            <a:schemeClr val="accent1"/>
+          </a:fillRef>
+          <a:effectRef idx="0">
+            <a:schemeClr val="accent1"/>
+          </a:effectRef>
+          <a:fontRef idx="minor">
+            <a:schemeClr val="tx1"/>
+          </a:fontRef>
+        </p:style>
+      </p:cxnSp>
+      <p:cxnSp>
+        <p:nvCxnSpPr>
+          <p:cNvPr id="10" name="Straight Arrow Connector 9">
+            <a:extLst>
+              <a:ext uri="{FF2B5EF4-FFF2-40B4-BE49-F238E27FC236}">
+                <a16:creationId xmlns:a16="http://schemas.microsoft.com/office/drawing/2014/main" id="{FD348247-2EA0-0306-9641-D3C48AD8D790}"/>
+              </a:ext>
+            </a:extLst>
+          </p:cNvPr>
+          <p:cNvCxnSpPr>
+            <a:cxnSpLocks/>
+            <a:stCxn id="6" idx="2"/>
+            <a:endCxn id="7" idx="0"/>
+          </p:cNvCxnSpPr>
+          <p:nvPr/>
+        </p:nvCxnSpPr>
+        <p:spPr>
+          <a:xfrm>
+            <a:off x="2646045" y="4819809"/>
+            <a:ext cx="0" cy="477996"/>
+          </a:xfrm>
+          <a:prstGeom prst="straightConnector1">
+            <a:avLst/>
+          </a:prstGeom>
+          <a:ln w="38100">
+            <a:tailEnd type="triangle"/>
+          </a:ln>
+        </p:spPr>
+        <p:style>
+          <a:lnRef idx="1">
+            <a:schemeClr val="accent1"/>
+          </a:lnRef>
+          <a:fillRef idx="0">
+            <a:schemeClr val="accent1"/>
+          </a:fillRef>
+          <a:effectRef idx="0">
+            <a:schemeClr val="accent1"/>
+          </a:effectRef>
+          <a:fontRef idx="minor">
+            <a:schemeClr val="tx1"/>
+          </a:fontRef>
+        </p:style>
+      </p:cxnSp>
+      <p:cxnSp>
+        <p:nvCxnSpPr>
+          <p:cNvPr id="13" name="Straight Arrow Connector 12">
+            <a:extLst>
+              <a:ext uri="{FF2B5EF4-FFF2-40B4-BE49-F238E27FC236}">
+                <a16:creationId xmlns:a16="http://schemas.microsoft.com/office/drawing/2014/main" id="{BA08597A-A341-6DE6-19ED-708CB4AE8FA4}"/>
+              </a:ext>
+            </a:extLst>
+          </p:cNvPr>
+          <p:cNvCxnSpPr>
+            <a:cxnSpLocks/>
+            <a:stCxn id="5" idx="1"/>
+            <a:endCxn id="4" idx="3"/>
+          </p:cNvCxnSpPr>
+          <p:nvPr/>
+        </p:nvCxnSpPr>
+        <p:spPr>
+          <a:xfrm flipH="1" flipV="1">
+            <a:off x="4291965" y="2353470"/>
+            <a:ext cx="2661285" cy="1706563"/>
+          </a:xfrm>
+          <a:prstGeom prst="straightConnector1">
+            <a:avLst/>
+          </a:prstGeom>
+          <a:ln w="38100">
+            <a:tailEnd type="triangle"/>
+          </a:ln>
+        </p:spPr>
+        <p:style>
+          <a:lnRef idx="1">
+            <a:schemeClr val="accent1"/>
+          </a:lnRef>
+          <a:fillRef idx="0">
+            <a:schemeClr val="accent1"/>
+          </a:fillRef>
+          <a:effectRef idx="0">
+            <a:schemeClr val="accent1"/>
+          </a:effectRef>
+          <a:fontRef idx="minor">
+            <a:schemeClr val="tx1"/>
+          </a:fontRef>
+        </p:style>
+      </p:cxnSp>
+      <p:cxnSp>
+        <p:nvCxnSpPr>
+          <p:cNvPr id="16" name="Straight Arrow Connector 15">
+            <a:extLst>
+              <a:ext uri="{FF2B5EF4-FFF2-40B4-BE49-F238E27FC236}">
+                <a16:creationId xmlns:a16="http://schemas.microsoft.com/office/drawing/2014/main" id="{C1845E68-CC07-0F5B-5AD3-8218E960D403}"/>
+              </a:ext>
+            </a:extLst>
+          </p:cNvPr>
+          <p:cNvCxnSpPr>
+            <a:cxnSpLocks/>
+            <a:stCxn id="5" idx="1"/>
+            <a:endCxn id="6" idx="3"/>
+          </p:cNvCxnSpPr>
+          <p:nvPr/>
+        </p:nvCxnSpPr>
+        <p:spPr>
+          <a:xfrm flipH="1">
+            <a:off x="4291965" y="4060033"/>
+            <a:ext cx="2661285" cy="96995"/>
+          </a:xfrm>
+          <a:prstGeom prst="straightConnector1">
+            <a:avLst/>
+          </a:prstGeom>
+          <a:ln w="38100">
+            <a:tailEnd type="triangle"/>
+          </a:ln>
+        </p:spPr>
+        <p:style>
+          <a:lnRef idx="1">
+            <a:schemeClr val="accent1"/>
+          </a:lnRef>
+          <a:fillRef idx="0">
+            <a:schemeClr val="accent1"/>
+          </a:fillRef>
+          <a:effectRef idx="0">
+            <a:schemeClr val="accent1"/>
+          </a:effectRef>
+          <a:fontRef idx="minor">
+            <a:schemeClr val="tx1"/>
+          </a:fontRef>
+        </p:style>
+      </p:cxnSp>
+      <p:cxnSp>
+        <p:nvCxnSpPr>
+          <p:cNvPr id="20" name="Straight Arrow Connector 19">
+            <a:extLst>
+              <a:ext uri="{FF2B5EF4-FFF2-40B4-BE49-F238E27FC236}">
+                <a16:creationId xmlns:a16="http://schemas.microsoft.com/office/drawing/2014/main" id="{95075AF3-2AE3-5A6F-E2E9-CF94CA33229D}"/>
+              </a:ext>
+            </a:extLst>
+          </p:cNvPr>
+          <p:cNvCxnSpPr>
+            <a:cxnSpLocks/>
+            <a:stCxn id="5" idx="1"/>
+            <a:endCxn id="7" idx="3"/>
+          </p:cNvCxnSpPr>
+          <p:nvPr/>
+        </p:nvCxnSpPr>
+        <p:spPr>
+          <a:xfrm flipH="1">
+            <a:off x="4291965" y="4060033"/>
+            <a:ext cx="2661285" cy="1900554"/>
+          </a:xfrm>
+          <a:prstGeom prst="straightConnector1">
+            <a:avLst/>
+          </a:prstGeom>
+          <a:ln w="38100">
+            <a:tailEnd type="triangle"/>
+          </a:ln>
+        </p:spPr>
+        <p:style>
+          <a:lnRef idx="1">
+            <a:schemeClr val="accent1"/>
+          </a:lnRef>
+          <a:fillRef idx="0">
+            <a:schemeClr val="accent1"/>
+          </a:fillRef>
+          <a:effectRef idx="0">
+            <a:schemeClr val="accent1"/>
+          </a:effectRef>
+          <a:fontRef idx="minor">
+            <a:schemeClr val="tx1"/>
+          </a:fontRef>
+        </p:style>
+      </p:cxnSp>
+      <p:sp>
+        <p:nvSpPr>
+          <p:cNvPr id="26" name="TextBox 25">
+            <a:extLst>
+              <a:ext uri="{FF2B5EF4-FFF2-40B4-BE49-F238E27FC236}">
+                <a16:creationId xmlns:a16="http://schemas.microsoft.com/office/drawing/2014/main" id="{7A4C5900-128F-D8F6-AE2C-C46C080725F9}"/>
+              </a:ext>
+            </a:extLst>
+          </p:cNvPr>
+          <p:cNvSpPr txBox="1"/>
+          <p:nvPr/>
+        </p:nvSpPr>
+        <p:spPr>
+          <a:xfrm rot="2084661">
+            <a:off x="5258910" y="2948820"/>
+            <a:ext cx="954405" cy="369332"/>
+          </a:xfrm>
+          <a:prstGeom prst="rect">
+            <a:avLst/>
+          </a:prstGeom>
+          <a:noFill/>
+        </p:spPr>
+        <p:txBody>
+          <a:bodyPr wrap="square" rtlCol="0">
+            <a:spAutoFit/>
+          </a:bodyPr>
+          <a:lstStyle/>
+          <a:p>
+            <a:r>
+              <a:rPr lang="en-US" dirty="0"/>
+              <a:t>Data</a:t>
+            </a:r>
+          </a:p>
+        </p:txBody>
+      </p:sp>
+      <p:cxnSp>
+        <p:nvCxnSpPr>
+          <p:cNvPr id="30" name="Straight Arrow Connector 29">
+            <a:extLst>
+              <a:ext uri="{FF2B5EF4-FFF2-40B4-BE49-F238E27FC236}">
+                <a16:creationId xmlns:a16="http://schemas.microsoft.com/office/drawing/2014/main" id="{B80B847C-CAE5-B372-C572-ED2D4138B84B}"/>
+              </a:ext>
+            </a:extLst>
+          </p:cNvPr>
+          <p:cNvCxnSpPr/>
+          <p:nvPr/>
+        </p:nvCxnSpPr>
+        <p:spPr>
+          <a:xfrm>
+            <a:off x="4291965" y="1690688"/>
+            <a:ext cx="2661285" cy="1363663"/>
+          </a:xfrm>
+          <a:prstGeom prst="straightConnector1">
+            <a:avLst/>
+          </a:prstGeom>
+          <a:ln w="38100">
+            <a:tailEnd type="triangle"/>
+          </a:ln>
+        </p:spPr>
+        <p:style>
+          <a:lnRef idx="1">
+            <a:schemeClr val="accent2"/>
+          </a:lnRef>
+          <a:fillRef idx="0">
+            <a:schemeClr val="accent2"/>
+          </a:fillRef>
+          <a:effectRef idx="0">
+            <a:schemeClr val="accent2"/>
+          </a:effectRef>
+          <a:fontRef idx="minor">
+            <a:schemeClr val="tx1"/>
+          </a:fontRef>
+        </p:style>
+      </p:cxnSp>
+      <p:sp>
+        <p:nvSpPr>
+          <p:cNvPr id="31" name="TextBox 30">
+            <a:extLst>
+              <a:ext uri="{FF2B5EF4-FFF2-40B4-BE49-F238E27FC236}">
+                <a16:creationId xmlns:a16="http://schemas.microsoft.com/office/drawing/2014/main" id="{6875F088-D363-435D-CD97-CF2652755053}"/>
+              </a:ext>
+            </a:extLst>
+          </p:cNvPr>
+          <p:cNvSpPr txBox="1"/>
+          <p:nvPr/>
+        </p:nvSpPr>
+        <p:spPr>
+          <a:xfrm>
+            <a:off x="4282995" y="3601284"/>
+            <a:ext cx="1991860" cy="369332"/>
+          </a:xfrm>
+          <a:prstGeom prst="rect">
+            <a:avLst/>
+          </a:prstGeom>
+          <a:noFill/>
+        </p:spPr>
+        <p:txBody>
+          <a:bodyPr wrap="square" rtlCol="0">
+            <a:spAutoFit/>
+          </a:bodyPr>
+          <a:lstStyle/>
+          <a:p>
+            <a:r>
+              <a:rPr lang="en-US" dirty="0" err="1"/>
+              <a:t>ProjectReference</a:t>
+            </a:r>
+            <a:endParaRPr lang="en-US" dirty="0"/>
+          </a:p>
+        </p:txBody>
+      </p:sp>
+      <p:cxnSp>
+        <p:nvCxnSpPr>
+          <p:cNvPr id="32" name="Straight Arrow Connector 31">
+            <a:extLst>
+              <a:ext uri="{FF2B5EF4-FFF2-40B4-BE49-F238E27FC236}">
+                <a16:creationId xmlns:a16="http://schemas.microsoft.com/office/drawing/2014/main" id="{1D220950-6CF0-4C25-5F81-7A55CA2DC531}"/>
+              </a:ext>
+            </a:extLst>
+          </p:cNvPr>
+          <p:cNvCxnSpPr>
+            <a:cxnSpLocks/>
+          </p:cNvCxnSpPr>
+          <p:nvPr/>
+        </p:nvCxnSpPr>
+        <p:spPr>
+          <a:xfrm flipV="1">
+            <a:off x="4291964" y="3857198"/>
+            <a:ext cx="2661286" cy="101789"/>
+          </a:xfrm>
+          <a:prstGeom prst="straightConnector1">
+            <a:avLst/>
+          </a:prstGeom>
+          <a:ln w="38100">
+            <a:tailEnd type="triangle"/>
+          </a:ln>
+        </p:spPr>
+        <p:style>
+          <a:lnRef idx="1">
+            <a:schemeClr val="accent2"/>
+          </a:lnRef>
+          <a:fillRef idx="0">
+            <a:schemeClr val="accent2"/>
+          </a:fillRef>
+          <a:effectRef idx="0">
+            <a:schemeClr val="accent2"/>
+          </a:effectRef>
+          <a:fontRef idx="minor">
+            <a:schemeClr val="tx1"/>
+          </a:fontRef>
+        </p:style>
+      </p:cxnSp>
+      <p:sp>
+        <p:nvSpPr>
+          <p:cNvPr id="33" name="TextBox 32">
+            <a:extLst>
+              <a:ext uri="{FF2B5EF4-FFF2-40B4-BE49-F238E27FC236}">
+                <a16:creationId xmlns:a16="http://schemas.microsoft.com/office/drawing/2014/main" id="{82E9A25A-7C99-8CD4-9886-7C1988DD2095}"/>
+              </a:ext>
+            </a:extLst>
+          </p:cNvPr>
+          <p:cNvSpPr txBox="1"/>
+          <p:nvPr/>
+        </p:nvSpPr>
+        <p:spPr>
+          <a:xfrm rot="1766913">
+            <a:off x="5094353" y="2371637"/>
+            <a:ext cx="1991860" cy="369332"/>
+          </a:xfrm>
+          <a:prstGeom prst="rect">
+            <a:avLst/>
+          </a:prstGeom>
+          <a:noFill/>
+        </p:spPr>
+        <p:txBody>
+          <a:bodyPr wrap="square" rtlCol="0">
+            <a:spAutoFit/>
+          </a:bodyPr>
+          <a:lstStyle/>
+          <a:p>
+            <a:r>
+              <a:rPr lang="en-US" dirty="0" err="1"/>
+              <a:t>ProjectReference</a:t>
+            </a:r>
+            <a:endParaRPr lang="en-US" dirty="0"/>
+          </a:p>
+        </p:txBody>
+      </p:sp>
+      <p:cxnSp>
+        <p:nvCxnSpPr>
+          <p:cNvPr id="35" name="Straight Arrow Connector 34">
+            <a:extLst>
+              <a:ext uri="{FF2B5EF4-FFF2-40B4-BE49-F238E27FC236}">
+                <a16:creationId xmlns:a16="http://schemas.microsoft.com/office/drawing/2014/main" id="{4575768A-23B0-E3EF-FB43-14E62FACA6E1}"/>
+              </a:ext>
+            </a:extLst>
+          </p:cNvPr>
+          <p:cNvCxnSpPr>
+            <a:cxnSpLocks/>
+          </p:cNvCxnSpPr>
+          <p:nvPr/>
+        </p:nvCxnSpPr>
+        <p:spPr>
+          <a:xfrm flipV="1">
+            <a:off x="4274846" y="4301251"/>
+            <a:ext cx="2670255" cy="1916669"/>
+          </a:xfrm>
+          <a:prstGeom prst="straightConnector1">
+            <a:avLst/>
+          </a:prstGeom>
+          <a:ln w="38100">
+            <a:tailEnd type="triangle"/>
+          </a:ln>
+        </p:spPr>
+        <p:style>
+          <a:lnRef idx="1">
+            <a:schemeClr val="accent2"/>
+          </a:lnRef>
+          <a:fillRef idx="0">
+            <a:schemeClr val="accent2"/>
+          </a:fillRef>
+          <a:effectRef idx="0">
+            <a:schemeClr val="accent2"/>
+          </a:effectRef>
+          <a:fontRef idx="minor">
+            <a:schemeClr val="tx1"/>
+          </a:fontRef>
+        </p:style>
+      </p:cxnSp>
+      <p:sp>
+        <p:nvSpPr>
+          <p:cNvPr id="36" name="TextBox 35">
+            <a:extLst>
+              <a:ext uri="{FF2B5EF4-FFF2-40B4-BE49-F238E27FC236}">
+                <a16:creationId xmlns:a16="http://schemas.microsoft.com/office/drawing/2014/main" id="{D160547D-A1D0-EF6E-64D1-5BEBAFFF3447}"/>
+              </a:ext>
+            </a:extLst>
+          </p:cNvPr>
+          <p:cNvSpPr txBox="1"/>
+          <p:nvPr/>
+        </p:nvSpPr>
+        <p:spPr>
+          <a:xfrm rot="19379314">
+            <a:off x="4825570" y="5151311"/>
+            <a:ext cx="1991860" cy="369332"/>
+          </a:xfrm>
+          <a:prstGeom prst="rect">
+            <a:avLst/>
+          </a:prstGeom>
+          <a:noFill/>
+        </p:spPr>
+        <p:txBody>
+          <a:bodyPr wrap="square" rtlCol="0">
+            <a:spAutoFit/>
+          </a:bodyPr>
+          <a:lstStyle/>
+          <a:p>
+            <a:r>
+              <a:rPr lang="en-US" dirty="0" err="1"/>
+              <a:t>ProjectReference</a:t>
+            </a:r>
+            <a:endParaRPr lang="en-US" dirty="0"/>
+          </a:p>
+        </p:txBody>
+      </p:sp>
+      <p:cxnSp>
+        <p:nvCxnSpPr>
+          <p:cNvPr id="40" name="Straight Arrow Connector 39">
+            <a:extLst>
+              <a:ext uri="{FF2B5EF4-FFF2-40B4-BE49-F238E27FC236}">
+                <a16:creationId xmlns:a16="http://schemas.microsoft.com/office/drawing/2014/main" id="{735DE6BD-D702-8096-DEC7-783CD627A8B2}"/>
+              </a:ext>
+            </a:extLst>
+          </p:cNvPr>
+          <p:cNvCxnSpPr>
+            <a:cxnSpLocks/>
+          </p:cNvCxnSpPr>
+          <p:nvPr/>
+        </p:nvCxnSpPr>
+        <p:spPr>
+          <a:xfrm>
+            <a:off x="2874645" y="2897407"/>
+            <a:ext cx="0" cy="659785"/>
+          </a:xfrm>
+          <a:prstGeom prst="straightConnector1">
+            <a:avLst/>
+          </a:prstGeom>
+          <a:ln w="38100">
+            <a:tailEnd type="triangle"/>
+          </a:ln>
+        </p:spPr>
+        <p:style>
+          <a:lnRef idx="1">
+            <a:schemeClr val="accent2"/>
+          </a:lnRef>
+          <a:fillRef idx="0">
+            <a:schemeClr val="accent2"/>
+          </a:fillRef>
+          <a:effectRef idx="0">
+            <a:schemeClr val="accent2"/>
+          </a:effectRef>
+          <a:fontRef idx="minor">
+            <a:schemeClr val="tx1"/>
+          </a:fontRef>
+        </p:style>
+      </p:cxnSp>
+      <p:cxnSp>
+        <p:nvCxnSpPr>
+          <p:cNvPr id="43" name="Straight Arrow Connector 42">
+            <a:extLst>
+              <a:ext uri="{FF2B5EF4-FFF2-40B4-BE49-F238E27FC236}">
+                <a16:creationId xmlns:a16="http://schemas.microsoft.com/office/drawing/2014/main" id="{D23C9BF0-6DC3-A634-6CC3-2D2692EB89E6}"/>
+              </a:ext>
+            </a:extLst>
+          </p:cNvPr>
+          <p:cNvCxnSpPr>
+            <a:cxnSpLocks/>
+          </p:cNvCxnSpPr>
+          <p:nvPr/>
+        </p:nvCxnSpPr>
+        <p:spPr>
+          <a:xfrm>
+            <a:off x="2874645" y="4722557"/>
+            <a:ext cx="0" cy="659785"/>
+          </a:xfrm>
+          <a:prstGeom prst="straightConnector1">
+            <a:avLst/>
+          </a:prstGeom>
+          <a:ln w="38100">
+            <a:tailEnd type="triangle"/>
+          </a:ln>
+        </p:spPr>
+        <p:style>
+          <a:lnRef idx="1">
+            <a:schemeClr val="accent2"/>
+          </a:lnRef>
+          <a:fillRef idx="0">
+            <a:schemeClr val="accent2"/>
+          </a:fillRef>
+          <a:effectRef idx="0">
+            <a:schemeClr val="accent2"/>
+          </a:effectRef>
+          <a:fontRef idx="minor">
+            <a:schemeClr val="tx1"/>
+          </a:fontRef>
+        </p:style>
+      </p:cxnSp>
+    </p:spTree>
+    <p:extLst>
+      <p:ext uri="{BB962C8B-B14F-4D97-AF65-F5344CB8AC3E}">
+        <p14:creationId xmlns:p14="http://schemas.microsoft.com/office/powerpoint/2010/main" val="661072079"/>
+      </p:ext>
+    </p:extLst>
+  </p:cSld>
+  <p:clrMapOvr>
+    <a:masterClrMapping/>
+  </p:clrMapOvr>
+</p:sld>
+</file>
+
 <file path=ppt/theme/theme1.xml><?xml version="1.0" encoding="utf-8"?>
 <a:theme xmlns:a="http://schemas.openxmlformats.org/drawingml/2006/main" name="Office Theme">
   <a:themeElements>

</xml_diff>

<commit_message>
adds custome exceptions, dependency mocking
</commit_message>
<xml_diff>
--- a/resources/MarksDrawrings.pptx
+++ b/resources/MarksDrawrings.pptx
@@ -15,6 +15,8 @@
     <p:sldId id="263" r:id="rId9"/>
     <p:sldId id="264" r:id="rId10"/>
     <p:sldId id="265" r:id="rId11"/>
+    <p:sldId id="266" r:id="rId12"/>
+    <p:sldId id="267" r:id="rId13"/>
   </p:sldIdLst>
   <p:sldSz cx="12192000" cy="6858000"/>
   <p:notesSz cx="6858000" cy="9144000"/>
@@ -4361,7 +4363,7 @@
           <a:p>
             <a:fld id="{EFED3043-6CE1-4075-A706-4B000AA47C6A}" type="datetimeFigureOut">
               <a:rPr lang="en-US" smtClean="0"/>
-              <a:t>11/23/2022</a:t>
+              <a:t>12/5/2022</a:t>
             </a:fld>
             <a:endParaRPr lang="en-US"/>
           </a:p>
@@ -4559,7 +4561,7 @@
           <a:p>
             <a:fld id="{EFED3043-6CE1-4075-A706-4B000AA47C6A}" type="datetimeFigureOut">
               <a:rPr lang="en-US" smtClean="0"/>
-              <a:t>11/23/2022</a:t>
+              <a:t>12/5/2022</a:t>
             </a:fld>
             <a:endParaRPr lang="en-US"/>
           </a:p>
@@ -4767,7 +4769,7 @@
           <a:p>
             <a:fld id="{EFED3043-6CE1-4075-A706-4B000AA47C6A}" type="datetimeFigureOut">
               <a:rPr lang="en-US" smtClean="0"/>
-              <a:t>11/23/2022</a:t>
+              <a:t>12/5/2022</a:t>
             </a:fld>
             <a:endParaRPr lang="en-US"/>
           </a:p>
@@ -4965,7 +4967,7 @@
           <a:p>
             <a:fld id="{EFED3043-6CE1-4075-A706-4B000AA47C6A}" type="datetimeFigureOut">
               <a:rPr lang="en-US" smtClean="0"/>
-              <a:t>11/23/2022</a:t>
+              <a:t>12/5/2022</a:t>
             </a:fld>
             <a:endParaRPr lang="en-US"/>
           </a:p>
@@ -5240,7 +5242,7 @@
           <a:p>
             <a:fld id="{EFED3043-6CE1-4075-A706-4B000AA47C6A}" type="datetimeFigureOut">
               <a:rPr lang="en-US" smtClean="0"/>
-              <a:t>11/23/2022</a:t>
+              <a:t>12/5/2022</a:t>
             </a:fld>
             <a:endParaRPr lang="en-US"/>
           </a:p>
@@ -5505,7 +5507,7 @@
           <a:p>
             <a:fld id="{EFED3043-6CE1-4075-A706-4B000AA47C6A}" type="datetimeFigureOut">
               <a:rPr lang="en-US" smtClean="0"/>
-              <a:t>11/23/2022</a:t>
+              <a:t>12/5/2022</a:t>
             </a:fld>
             <a:endParaRPr lang="en-US"/>
           </a:p>
@@ -5917,7 +5919,7 @@
           <a:p>
             <a:fld id="{EFED3043-6CE1-4075-A706-4B000AA47C6A}" type="datetimeFigureOut">
               <a:rPr lang="en-US" smtClean="0"/>
-              <a:t>11/23/2022</a:t>
+              <a:t>12/5/2022</a:t>
             </a:fld>
             <a:endParaRPr lang="en-US"/>
           </a:p>
@@ -6058,7 +6060,7 @@
           <a:p>
             <a:fld id="{EFED3043-6CE1-4075-A706-4B000AA47C6A}" type="datetimeFigureOut">
               <a:rPr lang="en-US" smtClean="0"/>
-              <a:t>11/23/2022</a:t>
+              <a:t>12/5/2022</a:t>
             </a:fld>
             <a:endParaRPr lang="en-US"/>
           </a:p>
@@ -6171,7 +6173,7 @@
           <a:p>
             <a:fld id="{EFED3043-6CE1-4075-A706-4B000AA47C6A}" type="datetimeFigureOut">
               <a:rPr lang="en-US" smtClean="0"/>
-              <a:t>11/23/2022</a:t>
+              <a:t>12/5/2022</a:t>
             </a:fld>
             <a:endParaRPr lang="en-US"/>
           </a:p>
@@ -6482,7 +6484,7 @@
           <a:p>
             <a:fld id="{EFED3043-6CE1-4075-A706-4B000AA47C6A}" type="datetimeFigureOut">
               <a:rPr lang="en-US" smtClean="0"/>
-              <a:t>11/23/2022</a:t>
+              <a:t>12/5/2022</a:t>
             </a:fld>
             <a:endParaRPr lang="en-US"/>
           </a:p>
@@ -6770,7 +6772,7 @@
           <a:p>
             <a:fld id="{EFED3043-6CE1-4075-A706-4B000AA47C6A}" type="datetimeFigureOut">
               <a:rPr lang="en-US" smtClean="0"/>
-              <a:t>11/23/2022</a:t>
+              <a:t>12/5/2022</a:t>
             </a:fld>
             <a:endParaRPr lang="en-US"/>
           </a:p>
@@ -7011,7 +7013,7 @@
           <a:p>
             <a:fld id="{EFED3043-6CE1-4075-A706-4B000AA47C6A}" type="datetimeFigureOut">
               <a:rPr lang="en-US" smtClean="0"/>
-              <a:t>11/23/2022</a:t>
+              <a:t>12/5/2022</a:t>
             </a:fld>
             <a:endParaRPr lang="en-US"/>
           </a:p>
@@ -8372,6 +8374,1196 @@
     <p:extLst>
       <p:ext uri="{BB962C8B-B14F-4D97-AF65-F5344CB8AC3E}">
         <p14:creationId xmlns:p14="http://schemas.microsoft.com/office/powerpoint/2010/main" val="1494475430"/>
+      </p:ext>
+    </p:extLst>
+  </p:cSld>
+  <p:clrMapOvr>
+    <a:masterClrMapping/>
+  </p:clrMapOvr>
+</p:sld>
+</file>
+
+<file path=ppt/slides/slide11.xml><?xml version="1.0" encoding="utf-8"?>
+<p:sld xmlns:a="http://schemas.openxmlformats.org/drawingml/2006/main" xmlns:r="http://schemas.openxmlformats.org/officeDocument/2006/relationships" xmlns:p="http://schemas.openxmlformats.org/presentationml/2006/main">
+  <p:cSld>
+    <p:spTree>
+      <p:nvGrpSpPr>
+        <p:cNvPr id="1" name=""/>
+        <p:cNvGrpSpPr/>
+        <p:nvPr/>
+      </p:nvGrpSpPr>
+      <p:grpSpPr>
+        <a:xfrm>
+          <a:off x="0" y="0"/>
+          <a:ext cx="0" cy="0"/>
+          <a:chOff x="0" y="0"/>
+          <a:chExt cx="0" cy="0"/>
+        </a:xfrm>
+      </p:grpSpPr>
+      <p:sp>
+        <p:nvSpPr>
+          <p:cNvPr id="2" name="Title 1">
+            <a:extLst>
+              <a:ext uri="{FF2B5EF4-FFF2-40B4-BE49-F238E27FC236}">
+                <a16:creationId xmlns:a16="http://schemas.microsoft.com/office/drawing/2014/main" id="{34AF08A4-4338-AF93-2799-F5C76DA82938}"/>
+              </a:ext>
+            </a:extLst>
+          </p:cNvPr>
+          <p:cNvSpPr>
+            <a:spLocks noGrp="1"/>
+          </p:cNvSpPr>
+          <p:nvPr>
+            <p:ph type="title"/>
+          </p:nvPr>
+        </p:nvSpPr>
+        <p:spPr/>
+        <p:txBody>
+          <a:bodyPr/>
+          <a:lstStyle/>
+          <a:p>
+            <a:r>
+              <a:rPr lang="en-US" dirty="0"/>
+              <a:t>Azure Portal structure</a:t>
+            </a:r>
+          </a:p>
+        </p:txBody>
+      </p:sp>
+      <p:sp>
+        <p:nvSpPr>
+          <p:cNvPr id="4" name="Rectangle 3">
+            <a:extLst>
+              <a:ext uri="{FF2B5EF4-FFF2-40B4-BE49-F238E27FC236}">
+                <a16:creationId xmlns:a16="http://schemas.microsoft.com/office/drawing/2014/main" id="{F6023500-4069-87D9-3E8F-4430ED3FCB00}"/>
+              </a:ext>
+            </a:extLst>
+          </p:cNvPr>
+          <p:cNvSpPr/>
+          <p:nvPr/>
+        </p:nvSpPr>
+        <p:spPr>
+          <a:xfrm>
+            <a:off x="1192306" y="1752600"/>
+            <a:ext cx="9533965" cy="4939553"/>
+          </a:xfrm>
+          <a:prstGeom prst="rect">
+            <a:avLst/>
+          </a:prstGeom>
+        </p:spPr>
+        <p:style>
+          <a:lnRef idx="2">
+            <a:schemeClr val="accent1">
+              <a:shade val="50000"/>
+            </a:schemeClr>
+          </a:lnRef>
+          <a:fillRef idx="1">
+            <a:schemeClr val="accent1"/>
+          </a:fillRef>
+          <a:effectRef idx="0">
+            <a:schemeClr val="accent1"/>
+          </a:effectRef>
+          <a:fontRef idx="minor">
+            <a:schemeClr val="lt1"/>
+          </a:fontRef>
+        </p:style>
+        <p:txBody>
+          <a:bodyPr rtlCol="0" anchor="t"/>
+          <a:lstStyle/>
+          <a:p>
+            <a:r>
+              <a:rPr lang="en-US" dirty="0">
+                <a:solidFill>
+                  <a:schemeClr val="tx1"/>
+                </a:solidFill>
+                <a:highlight>
+                  <a:srgbClr val="FFFF00"/>
+                </a:highlight>
+              </a:rPr>
+              <a:t>Subscription</a:t>
+            </a:r>
+            <a:r>
+              <a:rPr lang="en-US" dirty="0"/>
+              <a:t> (AKA. Tenant)</a:t>
+            </a:r>
+          </a:p>
+        </p:txBody>
+      </p:sp>
+      <p:sp>
+        <p:nvSpPr>
+          <p:cNvPr id="5" name="Rectangle 4">
+            <a:extLst>
+              <a:ext uri="{FF2B5EF4-FFF2-40B4-BE49-F238E27FC236}">
+                <a16:creationId xmlns:a16="http://schemas.microsoft.com/office/drawing/2014/main" id="{BB7559AC-3A5B-D7F2-2D71-77105F90ABE3}"/>
+              </a:ext>
+            </a:extLst>
+          </p:cNvPr>
+          <p:cNvSpPr/>
+          <p:nvPr/>
+        </p:nvSpPr>
+        <p:spPr>
+          <a:xfrm>
+            <a:off x="1703294" y="2263590"/>
+            <a:ext cx="5087471" cy="3980328"/>
+          </a:xfrm>
+          <a:prstGeom prst="rect">
+            <a:avLst/>
+          </a:prstGeom>
+        </p:spPr>
+        <p:style>
+          <a:lnRef idx="2">
+            <a:schemeClr val="accent1">
+              <a:shade val="50000"/>
+            </a:schemeClr>
+          </a:lnRef>
+          <a:fillRef idx="1">
+            <a:schemeClr val="accent1"/>
+          </a:fillRef>
+          <a:effectRef idx="0">
+            <a:schemeClr val="accent1"/>
+          </a:effectRef>
+          <a:fontRef idx="minor">
+            <a:schemeClr val="lt1"/>
+          </a:fontRef>
+        </p:style>
+        <p:txBody>
+          <a:bodyPr rtlCol="0" anchor="t"/>
+          <a:lstStyle/>
+          <a:p>
+            <a:r>
+              <a:rPr lang="en-US" dirty="0">
+                <a:solidFill>
+                  <a:schemeClr val="tx1"/>
+                </a:solidFill>
+                <a:highlight>
+                  <a:srgbClr val="FFFF00"/>
+                </a:highlight>
+              </a:rPr>
+              <a:t>Resource Group1 </a:t>
+            </a:r>
+            <a:r>
+              <a:rPr lang="en-US" dirty="0"/>
+              <a:t>is a logical grouping of related resources (like a namespace in C# programs)</a:t>
+            </a:r>
+          </a:p>
+        </p:txBody>
+      </p:sp>
+      <p:sp>
+        <p:nvSpPr>
+          <p:cNvPr id="6" name="Rectangle 5">
+            <a:extLst>
+              <a:ext uri="{FF2B5EF4-FFF2-40B4-BE49-F238E27FC236}">
+                <a16:creationId xmlns:a16="http://schemas.microsoft.com/office/drawing/2014/main" id="{CFAC86BF-E8A5-D389-DAFC-9D9B16813D66}"/>
+              </a:ext>
+            </a:extLst>
+          </p:cNvPr>
+          <p:cNvSpPr/>
+          <p:nvPr/>
+        </p:nvSpPr>
+        <p:spPr>
+          <a:xfrm>
+            <a:off x="1976718" y="2976282"/>
+            <a:ext cx="1039906" cy="587189"/>
+          </a:xfrm>
+          <a:prstGeom prst="rect">
+            <a:avLst/>
+          </a:prstGeom>
+        </p:spPr>
+        <p:style>
+          <a:lnRef idx="2">
+            <a:schemeClr val="accent1">
+              <a:shade val="50000"/>
+            </a:schemeClr>
+          </a:lnRef>
+          <a:fillRef idx="1">
+            <a:schemeClr val="accent1"/>
+          </a:fillRef>
+          <a:effectRef idx="0">
+            <a:schemeClr val="accent1"/>
+          </a:effectRef>
+          <a:fontRef idx="minor">
+            <a:schemeClr val="lt1"/>
+          </a:fontRef>
+        </p:style>
+        <p:txBody>
+          <a:bodyPr rtlCol="0" anchor="ctr"/>
+          <a:lstStyle/>
+          <a:p>
+            <a:r>
+              <a:rPr lang="en-US" dirty="0"/>
+              <a:t>Azure Db</a:t>
+            </a:r>
+          </a:p>
+        </p:txBody>
+      </p:sp>
+      <p:sp>
+        <p:nvSpPr>
+          <p:cNvPr id="7" name="Rectangle 6">
+            <a:extLst>
+              <a:ext uri="{FF2B5EF4-FFF2-40B4-BE49-F238E27FC236}">
+                <a16:creationId xmlns:a16="http://schemas.microsoft.com/office/drawing/2014/main" id="{92A0441E-DAC0-1BC2-037C-5481E2485EA7}"/>
+              </a:ext>
+            </a:extLst>
+          </p:cNvPr>
+          <p:cNvSpPr/>
+          <p:nvPr/>
+        </p:nvSpPr>
+        <p:spPr>
+          <a:xfrm>
+            <a:off x="1976718" y="3809999"/>
+            <a:ext cx="1039906" cy="587189"/>
+          </a:xfrm>
+          <a:prstGeom prst="rect">
+            <a:avLst/>
+          </a:prstGeom>
+        </p:spPr>
+        <p:style>
+          <a:lnRef idx="2">
+            <a:schemeClr val="accent1">
+              <a:shade val="50000"/>
+            </a:schemeClr>
+          </a:lnRef>
+          <a:fillRef idx="1">
+            <a:schemeClr val="accent1"/>
+          </a:fillRef>
+          <a:effectRef idx="0">
+            <a:schemeClr val="accent1"/>
+          </a:effectRef>
+          <a:fontRef idx="minor">
+            <a:schemeClr val="lt1"/>
+          </a:fontRef>
+        </p:style>
+        <p:txBody>
+          <a:bodyPr rtlCol="0" anchor="ctr"/>
+          <a:lstStyle/>
+          <a:p>
+            <a:r>
+              <a:rPr lang="en-US" dirty="0"/>
+              <a:t>Web App1</a:t>
+            </a:r>
+          </a:p>
+        </p:txBody>
+      </p:sp>
+      <p:sp>
+        <p:nvSpPr>
+          <p:cNvPr id="8" name="Rectangle 7">
+            <a:extLst>
+              <a:ext uri="{FF2B5EF4-FFF2-40B4-BE49-F238E27FC236}">
+                <a16:creationId xmlns:a16="http://schemas.microsoft.com/office/drawing/2014/main" id="{8EF013D7-0481-A565-6199-0FF7ED29FC8A}"/>
+              </a:ext>
+            </a:extLst>
+          </p:cNvPr>
+          <p:cNvSpPr/>
+          <p:nvPr/>
+        </p:nvSpPr>
+        <p:spPr>
+          <a:xfrm>
+            <a:off x="1976717" y="4744569"/>
+            <a:ext cx="1976717" cy="587189"/>
+          </a:xfrm>
+          <a:prstGeom prst="rect">
+            <a:avLst/>
+          </a:prstGeom>
+        </p:spPr>
+        <p:style>
+          <a:lnRef idx="2">
+            <a:schemeClr val="accent1">
+              <a:shade val="50000"/>
+            </a:schemeClr>
+          </a:lnRef>
+          <a:fillRef idx="1">
+            <a:schemeClr val="accent1"/>
+          </a:fillRef>
+          <a:effectRef idx="0">
+            <a:schemeClr val="accent1"/>
+          </a:effectRef>
+          <a:fontRef idx="minor">
+            <a:schemeClr val="lt1"/>
+          </a:fontRef>
+        </p:style>
+        <p:txBody>
+          <a:bodyPr rtlCol="0" anchor="ctr"/>
+          <a:lstStyle/>
+          <a:p>
+            <a:r>
+              <a:rPr lang="en-US" dirty="0"/>
+              <a:t>AKS (Azure Kubernetes Service)</a:t>
+            </a:r>
+          </a:p>
+        </p:txBody>
+      </p:sp>
+      <p:sp>
+        <p:nvSpPr>
+          <p:cNvPr id="9" name="Rectangle 8">
+            <a:extLst>
+              <a:ext uri="{FF2B5EF4-FFF2-40B4-BE49-F238E27FC236}">
+                <a16:creationId xmlns:a16="http://schemas.microsoft.com/office/drawing/2014/main" id="{8F87A69A-E6C0-2E7F-8AAF-4AB7B12C988A}"/>
+              </a:ext>
+            </a:extLst>
+          </p:cNvPr>
+          <p:cNvSpPr/>
+          <p:nvPr/>
+        </p:nvSpPr>
+        <p:spPr>
+          <a:xfrm>
+            <a:off x="3290048" y="2900081"/>
+            <a:ext cx="1039906" cy="587189"/>
+          </a:xfrm>
+          <a:prstGeom prst="rect">
+            <a:avLst/>
+          </a:prstGeom>
+        </p:spPr>
+        <p:style>
+          <a:lnRef idx="2">
+            <a:schemeClr val="accent1">
+              <a:shade val="50000"/>
+            </a:schemeClr>
+          </a:lnRef>
+          <a:fillRef idx="1">
+            <a:schemeClr val="accent1"/>
+          </a:fillRef>
+          <a:effectRef idx="0">
+            <a:schemeClr val="accent1"/>
+          </a:effectRef>
+          <a:fontRef idx="minor">
+            <a:schemeClr val="lt1"/>
+          </a:fontRef>
+        </p:style>
+        <p:txBody>
+          <a:bodyPr rtlCol="0" anchor="ctr"/>
+          <a:lstStyle/>
+          <a:p>
+            <a:r>
+              <a:rPr lang="en-US" dirty="0"/>
+              <a:t>Web App2</a:t>
+            </a:r>
+          </a:p>
+        </p:txBody>
+      </p:sp>
+      <p:sp>
+        <p:nvSpPr>
+          <p:cNvPr id="10" name="Rectangle 9">
+            <a:extLst>
+              <a:ext uri="{FF2B5EF4-FFF2-40B4-BE49-F238E27FC236}">
+                <a16:creationId xmlns:a16="http://schemas.microsoft.com/office/drawing/2014/main" id="{01FB6F64-5602-2E82-76C4-0DD6E84E9BCB}"/>
+              </a:ext>
+            </a:extLst>
+          </p:cNvPr>
+          <p:cNvSpPr/>
+          <p:nvPr/>
+        </p:nvSpPr>
+        <p:spPr>
+          <a:xfrm>
+            <a:off x="3290048" y="3742763"/>
+            <a:ext cx="1039906" cy="587189"/>
+          </a:xfrm>
+          <a:prstGeom prst="rect">
+            <a:avLst/>
+          </a:prstGeom>
+        </p:spPr>
+        <p:style>
+          <a:lnRef idx="2">
+            <a:schemeClr val="accent1">
+              <a:shade val="50000"/>
+            </a:schemeClr>
+          </a:lnRef>
+          <a:fillRef idx="1">
+            <a:schemeClr val="accent1"/>
+          </a:fillRef>
+          <a:effectRef idx="0">
+            <a:schemeClr val="accent1"/>
+          </a:effectRef>
+          <a:fontRef idx="minor">
+            <a:schemeClr val="lt1"/>
+          </a:fontRef>
+        </p:style>
+        <p:txBody>
+          <a:bodyPr rtlCol="0" anchor="ctr"/>
+          <a:lstStyle/>
+          <a:p>
+            <a:r>
+              <a:rPr lang="en-US" dirty="0"/>
+              <a:t>Blob Storage</a:t>
+            </a:r>
+          </a:p>
+        </p:txBody>
+      </p:sp>
+      <p:sp>
+        <p:nvSpPr>
+          <p:cNvPr id="11" name="Rectangle 10">
+            <a:extLst>
+              <a:ext uri="{FF2B5EF4-FFF2-40B4-BE49-F238E27FC236}">
+                <a16:creationId xmlns:a16="http://schemas.microsoft.com/office/drawing/2014/main" id="{52B0B18F-A08E-F497-1969-320EC0D17FD7}"/>
+              </a:ext>
+            </a:extLst>
+          </p:cNvPr>
+          <p:cNvSpPr/>
+          <p:nvPr/>
+        </p:nvSpPr>
+        <p:spPr>
+          <a:xfrm>
+            <a:off x="7057466" y="2263590"/>
+            <a:ext cx="3341594" cy="3980328"/>
+          </a:xfrm>
+          <a:prstGeom prst="rect">
+            <a:avLst/>
+          </a:prstGeom>
+        </p:spPr>
+        <p:style>
+          <a:lnRef idx="2">
+            <a:schemeClr val="accent1">
+              <a:shade val="50000"/>
+            </a:schemeClr>
+          </a:lnRef>
+          <a:fillRef idx="1">
+            <a:schemeClr val="accent1"/>
+          </a:fillRef>
+          <a:effectRef idx="0">
+            <a:schemeClr val="accent1"/>
+          </a:effectRef>
+          <a:fontRef idx="minor">
+            <a:schemeClr val="lt1"/>
+          </a:fontRef>
+        </p:style>
+        <p:txBody>
+          <a:bodyPr rtlCol="0" anchor="t"/>
+          <a:lstStyle/>
+          <a:p>
+            <a:r>
+              <a:rPr lang="en-US">
+                <a:solidFill>
+                  <a:schemeClr val="tx1"/>
+                </a:solidFill>
+                <a:highlight>
+                  <a:srgbClr val="FFFF00"/>
+                </a:highlight>
+              </a:rPr>
+              <a:t>Resource Group2 </a:t>
+            </a:r>
+            <a:r>
+              <a:rPr lang="en-US" dirty="0"/>
+              <a:t>is a logical grouping of related resources (like a namespace in C# programs)</a:t>
+            </a:r>
+          </a:p>
+        </p:txBody>
+      </p:sp>
+      <p:sp>
+        <p:nvSpPr>
+          <p:cNvPr id="12" name="Rectangle 11">
+            <a:extLst>
+              <a:ext uri="{FF2B5EF4-FFF2-40B4-BE49-F238E27FC236}">
+                <a16:creationId xmlns:a16="http://schemas.microsoft.com/office/drawing/2014/main" id="{228677DC-F335-5471-D8A4-554EE786B470}"/>
+              </a:ext>
+            </a:extLst>
+          </p:cNvPr>
+          <p:cNvSpPr/>
+          <p:nvPr/>
+        </p:nvSpPr>
+        <p:spPr>
+          <a:xfrm>
+            <a:off x="7330889" y="3733798"/>
+            <a:ext cx="1039906" cy="587189"/>
+          </a:xfrm>
+          <a:prstGeom prst="rect">
+            <a:avLst/>
+          </a:prstGeom>
+        </p:spPr>
+        <p:style>
+          <a:lnRef idx="2">
+            <a:schemeClr val="accent1">
+              <a:shade val="50000"/>
+            </a:schemeClr>
+          </a:lnRef>
+          <a:fillRef idx="1">
+            <a:schemeClr val="accent1"/>
+          </a:fillRef>
+          <a:effectRef idx="0">
+            <a:schemeClr val="accent1"/>
+          </a:effectRef>
+          <a:fontRef idx="minor">
+            <a:schemeClr val="lt1"/>
+          </a:fontRef>
+        </p:style>
+        <p:txBody>
+          <a:bodyPr rtlCol="0" anchor="ctr"/>
+          <a:lstStyle/>
+          <a:p>
+            <a:r>
+              <a:rPr lang="en-US" dirty="0"/>
+              <a:t>Azure Db</a:t>
+            </a:r>
+          </a:p>
+        </p:txBody>
+      </p:sp>
+      <p:sp>
+        <p:nvSpPr>
+          <p:cNvPr id="13" name="Rectangle 12">
+            <a:extLst>
+              <a:ext uri="{FF2B5EF4-FFF2-40B4-BE49-F238E27FC236}">
+                <a16:creationId xmlns:a16="http://schemas.microsoft.com/office/drawing/2014/main" id="{61DEA3FD-1AE9-2398-DC3B-305F415A193C}"/>
+              </a:ext>
+            </a:extLst>
+          </p:cNvPr>
+          <p:cNvSpPr/>
+          <p:nvPr/>
+        </p:nvSpPr>
+        <p:spPr>
+          <a:xfrm>
+            <a:off x="7330889" y="4574660"/>
+            <a:ext cx="1039906" cy="587189"/>
+          </a:xfrm>
+          <a:prstGeom prst="rect">
+            <a:avLst/>
+          </a:prstGeom>
+        </p:spPr>
+        <p:style>
+          <a:lnRef idx="2">
+            <a:schemeClr val="accent1">
+              <a:shade val="50000"/>
+            </a:schemeClr>
+          </a:lnRef>
+          <a:fillRef idx="1">
+            <a:schemeClr val="accent1"/>
+          </a:fillRef>
+          <a:effectRef idx="0">
+            <a:schemeClr val="accent1"/>
+          </a:effectRef>
+          <a:fontRef idx="minor">
+            <a:schemeClr val="lt1"/>
+          </a:fontRef>
+        </p:style>
+        <p:txBody>
+          <a:bodyPr rtlCol="0" anchor="ctr"/>
+          <a:lstStyle/>
+          <a:p>
+            <a:r>
+              <a:rPr lang="en-US" dirty="0"/>
+              <a:t>Web App1</a:t>
+            </a:r>
+          </a:p>
+        </p:txBody>
+      </p:sp>
+      <p:sp>
+        <p:nvSpPr>
+          <p:cNvPr id="14" name="Rectangle 13">
+            <a:extLst>
+              <a:ext uri="{FF2B5EF4-FFF2-40B4-BE49-F238E27FC236}">
+                <a16:creationId xmlns:a16="http://schemas.microsoft.com/office/drawing/2014/main" id="{1F24CCC9-864C-56E2-918D-071ABF0281F9}"/>
+              </a:ext>
+            </a:extLst>
+          </p:cNvPr>
+          <p:cNvSpPr/>
+          <p:nvPr/>
+        </p:nvSpPr>
+        <p:spPr>
+          <a:xfrm>
+            <a:off x="7382436" y="5486399"/>
+            <a:ext cx="2738717" cy="587189"/>
+          </a:xfrm>
+          <a:prstGeom prst="rect">
+            <a:avLst/>
+          </a:prstGeom>
+        </p:spPr>
+        <p:style>
+          <a:lnRef idx="2">
+            <a:schemeClr val="accent1">
+              <a:shade val="50000"/>
+            </a:schemeClr>
+          </a:lnRef>
+          <a:fillRef idx="1">
+            <a:schemeClr val="accent1"/>
+          </a:fillRef>
+          <a:effectRef idx="0">
+            <a:schemeClr val="accent1"/>
+          </a:effectRef>
+          <a:fontRef idx="minor">
+            <a:schemeClr val="lt1"/>
+          </a:fontRef>
+        </p:style>
+        <p:txBody>
+          <a:bodyPr rtlCol="0" anchor="ctr"/>
+          <a:lstStyle/>
+          <a:p>
+            <a:r>
+              <a:rPr lang="en-US" dirty="0"/>
+              <a:t>AKS (Azure Kubernetes Service)</a:t>
+            </a:r>
+          </a:p>
+        </p:txBody>
+      </p:sp>
+      <p:sp>
+        <p:nvSpPr>
+          <p:cNvPr id="15" name="Rectangle 14">
+            <a:extLst>
+              <a:ext uri="{FF2B5EF4-FFF2-40B4-BE49-F238E27FC236}">
+                <a16:creationId xmlns:a16="http://schemas.microsoft.com/office/drawing/2014/main" id="{96878395-C097-71A1-22D3-D71103915197}"/>
+              </a:ext>
+            </a:extLst>
+          </p:cNvPr>
+          <p:cNvSpPr/>
+          <p:nvPr/>
+        </p:nvSpPr>
+        <p:spPr>
+          <a:xfrm>
+            <a:off x="8637496" y="4619902"/>
+            <a:ext cx="1039906" cy="587189"/>
+          </a:xfrm>
+          <a:prstGeom prst="rect">
+            <a:avLst/>
+          </a:prstGeom>
+        </p:spPr>
+        <p:style>
+          <a:lnRef idx="2">
+            <a:schemeClr val="accent1">
+              <a:shade val="50000"/>
+            </a:schemeClr>
+          </a:lnRef>
+          <a:fillRef idx="1">
+            <a:schemeClr val="accent1"/>
+          </a:fillRef>
+          <a:effectRef idx="0">
+            <a:schemeClr val="accent1"/>
+          </a:effectRef>
+          <a:fontRef idx="minor">
+            <a:schemeClr val="lt1"/>
+          </a:fontRef>
+        </p:style>
+        <p:txBody>
+          <a:bodyPr rtlCol="0" anchor="ctr"/>
+          <a:lstStyle/>
+          <a:p>
+            <a:r>
+              <a:rPr lang="en-US" dirty="0"/>
+              <a:t>Web App2</a:t>
+            </a:r>
+          </a:p>
+        </p:txBody>
+      </p:sp>
+      <p:sp>
+        <p:nvSpPr>
+          <p:cNvPr id="16" name="Rectangle 15">
+            <a:extLst>
+              <a:ext uri="{FF2B5EF4-FFF2-40B4-BE49-F238E27FC236}">
+                <a16:creationId xmlns:a16="http://schemas.microsoft.com/office/drawing/2014/main" id="{1DECBA56-960E-EA4C-7639-59406E95544C}"/>
+              </a:ext>
+            </a:extLst>
+          </p:cNvPr>
+          <p:cNvSpPr/>
+          <p:nvPr/>
+        </p:nvSpPr>
+        <p:spPr>
+          <a:xfrm>
+            <a:off x="8644219" y="3742763"/>
+            <a:ext cx="1039906" cy="587189"/>
+          </a:xfrm>
+          <a:prstGeom prst="rect">
+            <a:avLst/>
+          </a:prstGeom>
+        </p:spPr>
+        <p:style>
+          <a:lnRef idx="2">
+            <a:schemeClr val="accent1">
+              <a:shade val="50000"/>
+            </a:schemeClr>
+          </a:lnRef>
+          <a:fillRef idx="1">
+            <a:schemeClr val="accent1"/>
+          </a:fillRef>
+          <a:effectRef idx="0">
+            <a:schemeClr val="accent1"/>
+          </a:effectRef>
+          <a:fontRef idx="minor">
+            <a:schemeClr val="lt1"/>
+          </a:fontRef>
+        </p:style>
+        <p:txBody>
+          <a:bodyPr rtlCol="0" anchor="ctr"/>
+          <a:lstStyle/>
+          <a:p>
+            <a:r>
+              <a:rPr lang="en-US" dirty="0"/>
+              <a:t>Blob Storage</a:t>
+            </a:r>
+          </a:p>
+        </p:txBody>
+      </p:sp>
+    </p:spTree>
+    <p:extLst>
+      <p:ext uri="{BB962C8B-B14F-4D97-AF65-F5344CB8AC3E}">
+        <p14:creationId xmlns:p14="http://schemas.microsoft.com/office/powerpoint/2010/main" val="772828400"/>
+      </p:ext>
+    </p:extLst>
+  </p:cSld>
+  <p:clrMapOvr>
+    <a:masterClrMapping/>
+  </p:clrMapOvr>
+</p:sld>
+</file>
+
+<file path=ppt/slides/slide12.xml><?xml version="1.0" encoding="utf-8"?>
+<p:sld xmlns:a="http://schemas.openxmlformats.org/drawingml/2006/main" xmlns:r="http://schemas.openxmlformats.org/officeDocument/2006/relationships" xmlns:p="http://schemas.openxmlformats.org/presentationml/2006/main">
+  <p:cSld>
+    <p:spTree>
+      <p:nvGrpSpPr>
+        <p:cNvPr id="1" name=""/>
+        <p:cNvGrpSpPr/>
+        <p:nvPr/>
+      </p:nvGrpSpPr>
+      <p:grpSpPr>
+        <a:xfrm>
+          <a:off x="0" y="0"/>
+          <a:ext cx="0" cy="0"/>
+          <a:chOff x="0" y="0"/>
+          <a:chExt cx="0" cy="0"/>
+        </a:xfrm>
+      </p:grpSpPr>
+      <p:sp>
+        <p:nvSpPr>
+          <p:cNvPr id="2" name="Title 1">
+            <a:extLst>
+              <a:ext uri="{FF2B5EF4-FFF2-40B4-BE49-F238E27FC236}">
+                <a16:creationId xmlns:a16="http://schemas.microsoft.com/office/drawing/2014/main" id="{FFCA32EA-3FC6-5C4D-A580-6FD901C4F53C}"/>
+              </a:ext>
+            </a:extLst>
+          </p:cNvPr>
+          <p:cNvSpPr>
+            <a:spLocks noGrp="1"/>
+          </p:cNvSpPr>
+          <p:nvPr>
+            <p:ph type="title"/>
+          </p:nvPr>
+        </p:nvSpPr>
+        <p:spPr/>
+        <p:txBody>
+          <a:bodyPr/>
+          <a:lstStyle/>
+          <a:p>
+            <a:r>
+              <a:rPr lang="en-US" dirty="0"/>
+              <a:t>Marks Db Structure</a:t>
+            </a:r>
+          </a:p>
+        </p:txBody>
+      </p:sp>
+      <p:sp>
+        <p:nvSpPr>
+          <p:cNvPr id="4" name="Rectangle 3">
+            <a:extLst>
+              <a:ext uri="{FF2B5EF4-FFF2-40B4-BE49-F238E27FC236}">
+                <a16:creationId xmlns:a16="http://schemas.microsoft.com/office/drawing/2014/main" id="{DB6F96BA-0216-3127-B2B8-0A1D96F3739B}"/>
+              </a:ext>
+            </a:extLst>
+          </p:cNvPr>
+          <p:cNvSpPr/>
+          <p:nvPr/>
+        </p:nvSpPr>
+        <p:spPr>
+          <a:xfrm>
+            <a:off x="6259157" y="1604720"/>
+            <a:ext cx="2021541" cy="887506"/>
+          </a:xfrm>
+          <a:prstGeom prst="rect">
+            <a:avLst/>
+          </a:prstGeom>
+        </p:spPr>
+        <p:style>
+          <a:lnRef idx="2">
+            <a:schemeClr val="accent1">
+              <a:shade val="50000"/>
+            </a:schemeClr>
+          </a:lnRef>
+          <a:fillRef idx="1">
+            <a:schemeClr val="accent1"/>
+          </a:fillRef>
+          <a:effectRef idx="0">
+            <a:schemeClr val="accent1"/>
+          </a:effectRef>
+          <a:fontRef idx="minor">
+            <a:schemeClr val="lt1"/>
+          </a:fontRef>
+        </p:style>
+        <p:txBody>
+          <a:bodyPr rtlCol="0" anchor="ctr"/>
+          <a:lstStyle/>
+          <a:p>
+            <a:pPr algn="ctr"/>
+            <a:r>
+              <a:rPr lang="en-US" dirty="0"/>
+              <a:t>Customer/Address Junction</a:t>
+            </a:r>
+          </a:p>
+        </p:txBody>
+      </p:sp>
+      <p:sp>
+        <p:nvSpPr>
+          <p:cNvPr id="5" name="Rectangle 4">
+            <a:extLst>
+              <a:ext uri="{FF2B5EF4-FFF2-40B4-BE49-F238E27FC236}">
+                <a16:creationId xmlns:a16="http://schemas.microsoft.com/office/drawing/2014/main" id="{51A4D50A-3F51-0CB4-D855-8D1FD6C8EF0C}"/>
+              </a:ext>
+            </a:extLst>
+          </p:cNvPr>
+          <p:cNvSpPr/>
+          <p:nvPr/>
+        </p:nvSpPr>
+        <p:spPr>
+          <a:xfrm>
+            <a:off x="1775909" y="4968876"/>
+            <a:ext cx="2021541" cy="887506"/>
+          </a:xfrm>
+          <a:prstGeom prst="rect">
+            <a:avLst/>
+          </a:prstGeom>
+        </p:spPr>
+        <p:style>
+          <a:lnRef idx="2">
+            <a:schemeClr val="accent1">
+              <a:shade val="50000"/>
+            </a:schemeClr>
+          </a:lnRef>
+          <a:fillRef idx="1">
+            <a:schemeClr val="accent1"/>
+          </a:fillRef>
+          <a:effectRef idx="0">
+            <a:schemeClr val="accent1"/>
+          </a:effectRef>
+          <a:fontRef idx="minor">
+            <a:schemeClr val="lt1"/>
+          </a:fontRef>
+        </p:style>
+        <p:txBody>
+          <a:bodyPr rtlCol="0" anchor="ctr"/>
+          <a:lstStyle/>
+          <a:p>
+            <a:pPr algn="ctr"/>
+            <a:r>
+              <a:rPr lang="en-US" dirty="0"/>
+              <a:t>Orders</a:t>
+            </a:r>
+          </a:p>
+        </p:txBody>
+      </p:sp>
+      <p:sp>
+        <p:nvSpPr>
+          <p:cNvPr id="6" name="Rectangle 5">
+            <a:extLst>
+              <a:ext uri="{FF2B5EF4-FFF2-40B4-BE49-F238E27FC236}">
+                <a16:creationId xmlns:a16="http://schemas.microsoft.com/office/drawing/2014/main" id="{BAB1F970-39D3-EDBA-3515-7FC06877D4AE}"/>
+              </a:ext>
+            </a:extLst>
+          </p:cNvPr>
+          <p:cNvSpPr/>
+          <p:nvPr/>
+        </p:nvSpPr>
+        <p:spPr>
+          <a:xfrm>
+            <a:off x="9190168" y="3161218"/>
+            <a:ext cx="2021541" cy="887506"/>
+          </a:xfrm>
+          <a:prstGeom prst="rect">
+            <a:avLst/>
+          </a:prstGeom>
+        </p:spPr>
+        <p:style>
+          <a:lnRef idx="2">
+            <a:schemeClr val="accent1">
+              <a:shade val="50000"/>
+            </a:schemeClr>
+          </a:lnRef>
+          <a:fillRef idx="1">
+            <a:schemeClr val="accent1"/>
+          </a:fillRef>
+          <a:effectRef idx="0">
+            <a:schemeClr val="accent1"/>
+          </a:effectRef>
+          <a:fontRef idx="minor">
+            <a:schemeClr val="lt1"/>
+          </a:fontRef>
+        </p:style>
+        <p:txBody>
+          <a:bodyPr rtlCol="0" anchor="ctr"/>
+          <a:lstStyle/>
+          <a:p>
+            <a:pPr algn="ctr"/>
+            <a:r>
+              <a:rPr lang="en-US" dirty="0"/>
+              <a:t>Addresses</a:t>
+            </a:r>
+          </a:p>
+        </p:txBody>
+      </p:sp>
+      <p:sp>
+        <p:nvSpPr>
+          <p:cNvPr id="7" name="Rectangle 6">
+            <a:extLst>
+              <a:ext uri="{FF2B5EF4-FFF2-40B4-BE49-F238E27FC236}">
+                <a16:creationId xmlns:a16="http://schemas.microsoft.com/office/drawing/2014/main" id="{43430ECB-1132-CDDE-4293-6F52E94DC96A}"/>
+              </a:ext>
+            </a:extLst>
+          </p:cNvPr>
+          <p:cNvSpPr/>
+          <p:nvPr/>
+        </p:nvSpPr>
+        <p:spPr>
+          <a:xfrm>
+            <a:off x="3275255" y="2884973"/>
+            <a:ext cx="2021541" cy="887506"/>
+          </a:xfrm>
+          <a:prstGeom prst="rect">
+            <a:avLst/>
+          </a:prstGeom>
+        </p:spPr>
+        <p:style>
+          <a:lnRef idx="2">
+            <a:schemeClr val="accent1">
+              <a:shade val="50000"/>
+            </a:schemeClr>
+          </a:lnRef>
+          <a:fillRef idx="1">
+            <a:schemeClr val="accent1"/>
+          </a:fillRef>
+          <a:effectRef idx="0">
+            <a:schemeClr val="accent1"/>
+          </a:effectRef>
+          <a:fontRef idx="minor">
+            <a:schemeClr val="lt1"/>
+          </a:fontRef>
+        </p:style>
+        <p:txBody>
+          <a:bodyPr rtlCol="0" anchor="ctr"/>
+          <a:lstStyle/>
+          <a:p>
+            <a:pPr algn="ctr"/>
+            <a:r>
+              <a:rPr lang="en-US" dirty="0"/>
+              <a:t>Customers</a:t>
+            </a:r>
+          </a:p>
+        </p:txBody>
+      </p:sp>
+      <p:sp>
+        <p:nvSpPr>
+          <p:cNvPr id="8" name="Rectangle 7">
+            <a:extLst>
+              <a:ext uri="{FF2B5EF4-FFF2-40B4-BE49-F238E27FC236}">
+                <a16:creationId xmlns:a16="http://schemas.microsoft.com/office/drawing/2014/main" id="{1450924E-95F0-5F05-675E-829B519980E3}"/>
+              </a:ext>
+            </a:extLst>
+          </p:cNvPr>
+          <p:cNvSpPr/>
+          <p:nvPr/>
+        </p:nvSpPr>
+        <p:spPr>
+          <a:xfrm>
+            <a:off x="8709212" y="443753"/>
+            <a:ext cx="2021541" cy="887506"/>
+          </a:xfrm>
+          <a:prstGeom prst="rect">
+            <a:avLst/>
+          </a:prstGeom>
+        </p:spPr>
+        <p:style>
+          <a:lnRef idx="2">
+            <a:schemeClr val="accent1">
+              <a:shade val="50000"/>
+            </a:schemeClr>
+          </a:lnRef>
+          <a:fillRef idx="1">
+            <a:schemeClr val="accent1"/>
+          </a:fillRef>
+          <a:effectRef idx="0">
+            <a:schemeClr val="accent1"/>
+          </a:effectRef>
+          <a:fontRef idx="minor">
+            <a:schemeClr val="lt1"/>
+          </a:fontRef>
+        </p:style>
+        <p:txBody>
+          <a:bodyPr rtlCol="0" anchor="ctr"/>
+          <a:lstStyle/>
+          <a:p>
+            <a:pPr algn="ctr"/>
+            <a:endParaRPr lang="en-US"/>
+          </a:p>
+        </p:txBody>
+      </p:sp>
+      <p:cxnSp>
+        <p:nvCxnSpPr>
+          <p:cNvPr id="10" name="Straight Arrow Connector 9">
+            <a:extLst>
+              <a:ext uri="{FF2B5EF4-FFF2-40B4-BE49-F238E27FC236}">
+                <a16:creationId xmlns:a16="http://schemas.microsoft.com/office/drawing/2014/main" id="{121FF272-FFAA-1E92-22DD-D520CC450837}"/>
+              </a:ext>
+            </a:extLst>
+          </p:cNvPr>
+          <p:cNvCxnSpPr>
+            <a:cxnSpLocks/>
+            <a:stCxn id="4" idx="1"/>
+            <a:endCxn id="7" idx="0"/>
+          </p:cNvCxnSpPr>
+          <p:nvPr/>
+        </p:nvCxnSpPr>
+        <p:spPr>
+          <a:xfrm flipH="1">
+            <a:off x="4286026" y="2048473"/>
+            <a:ext cx="1973131" cy="836500"/>
+          </a:xfrm>
+          <a:prstGeom prst="straightConnector1">
+            <a:avLst/>
+          </a:prstGeom>
+          <a:ln>
+            <a:tailEnd type="triangle"/>
+          </a:ln>
+        </p:spPr>
+        <p:style>
+          <a:lnRef idx="1">
+            <a:schemeClr val="accent1"/>
+          </a:lnRef>
+          <a:fillRef idx="0">
+            <a:schemeClr val="accent1"/>
+          </a:fillRef>
+          <a:effectRef idx="0">
+            <a:schemeClr val="accent1"/>
+          </a:effectRef>
+          <a:fontRef idx="minor">
+            <a:schemeClr val="tx1"/>
+          </a:fontRef>
+        </p:style>
+      </p:cxnSp>
+      <p:cxnSp>
+        <p:nvCxnSpPr>
+          <p:cNvPr id="14" name="Straight Arrow Connector 13">
+            <a:extLst>
+              <a:ext uri="{FF2B5EF4-FFF2-40B4-BE49-F238E27FC236}">
+                <a16:creationId xmlns:a16="http://schemas.microsoft.com/office/drawing/2014/main" id="{FFD3799A-8802-38F4-6862-AEC3242CC46C}"/>
+              </a:ext>
+            </a:extLst>
+          </p:cNvPr>
+          <p:cNvCxnSpPr>
+            <a:stCxn id="4" idx="3"/>
+            <a:endCxn id="6" idx="0"/>
+          </p:cNvCxnSpPr>
+          <p:nvPr/>
+        </p:nvCxnSpPr>
+        <p:spPr>
+          <a:xfrm>
+            <a:off x="8280698" y="2048473"/>
+            <a:ext cx="1920241" cy="1112745"/>
+          </a:xfrm>
+          <a:prstGeom prst="straightConnector1">
+            <a:avLst/>
+          </a:prstGeom>
+          <a:ln>
+            <a:tailEnd type="triangle"/>
+          </a:ln>
+        </p:spPr>
+        <p:style>
+          <a:lnRef idx="1">
+            <a:schemeClr val="accent1"/>
+          </a:lnRef>
+          <a:fillRef idx="0">
+            <a:schemeClr val="accent1"/>
+          </a:fillRef>
+          <a:effectRef idx="0">
+            <a:schemeClr val="accent1"/>
+          </a:effectRef>
+          <a:fontRef idx="minor">
+            <a:schemeClr val="tx1"/>
+          </a:fontRef>
+        </p:style>
+      </p:cxnSp>
+      <p:cxnSp>
+        <p:nvCxnSpPr>
+          <p:cNvPr id="15" name="Straight Arrow Connector 14">
+            <a:extLst>
+              <a:ext uri="{FF2B5EF4-FFF2-40B4-BE49-F238E27FC236}">
+                <a16:creationId xmlns:a16="http://schemas.microsoft.com/office/drawing/2014/main" id="{92512A35-9E41-0617-29E1-927235E9293D}"/>
+              </a:ext>
+            </a:extLst>
+          </p:cNvPr>
+          <p:cNvCxnSpPr>
+            <a:cxnSpLocks/>
+            <a:stCxn id="5" idx="0"/>
+            <a:endCxn id="7" idx="2"/>
+          </p:cNvCxnSpPr>
+          <p:nvPr/>
+        </p:nvCxnSpPr>
+        <p:spPr>
+          <a:xfrm flipV="1">
+            <a:off x="2786680" y="3772479"/>
+            <a:ext cx="1499346" cy="1196397"/>
+          </a:xfrm>
+          <a:prstGeom prst="straightConnector1">
+            <a:avLst/>
+          </a:prstGeom>
+          <a:ln>
+            <a:tailEnd type="triangle"/>
+          </a:ln>
+        </p:spPr>
+        <p:style>
+          <a:lnRef idx="1">
+            <a:schemeClr val="accent1"/>
+          </a:lnRef>
+          <a:fillRef idx="0">
+            <a:schemeClr val="accent1"/>
+          </a:fillRef>
+          <a:effectRef idx="0">
+            <a:schemeClr val="accent1"/>
+          </a:effectRef>
+          <a:fontRef idx="minor">
+            <a:schemeClr val="tx1"/>
+          </a:fontRef>
+        </p:style>
+      </p:cxnSp>
+      <p:sp>
+        <p:nvSpPr>
+          <p:cNvPr id="22" name="TextBox 21">
+            <a:extLst>
+              <a:ext uri="{FF2B5EF4-FFF2-40B4-BE49-F238E27FC236}">
+                <a16:creationId xmlns:a16="http://schemas.microsoft.com/office/drawing/2014/main" id="{A8451D41-3133-ABDA-496D-A07F72EEBCDC}"/>
+              </a:ext>
+            </a:extLst>
+          </p:cNvPr>
+          <p:cNvSpPr txBox="1"/>
+          <p:nvPr/>
+        </p:nvSpPr>
+        <p:spPr>
+          <a:xfrm>
+            <a:off x="4749501" y="4383740"/>
+            <a:ext cx="4091045" cy="2474260"/>
+          </a:xfrm>
+          <a:prstGeom prst="rect">
+            <a:avLst/>
+          </a:prstGeom>
+          <a:noFill/>
+        </p:spPr>
+        <p:txBody>
+          <a:bodyPr wrap="square" rtlCol="0">
+            <a:normAutofit/>
+          </a:bodyPr>
+          <a:lstStyle/>
+          <a:p>
+            <a:r>
+              <a:rPr lang="en-US" dirty="0"/>
+              <a:t>It I want to see all the orders of Customer 1 and where they were delivered to….</a:t>
+            </a:r>
+          </a:p>
+          <a:p>
+            <a:endParaRPr lang="en-US" dirty="0"/>
+          </a:p>
+          <a:p>
+            <a:r>
+              <a:rPr lang="en-US" dirty="0"/>
+              <a:t>Inner join customers / orders…</a:t>
+            </a:r>
+          </a:p>
+          <a:p>
+            <a:endParaRPr lang="en-US" dirty="0"/>
+          </a:p>
+        </p:txBody>
+      </p:sp>
+    </p:spTree>
+    <p:extLst>
+      <p:ext uri="{BB962C8B-B14F-4D97-AF65-F5344CB8AC3E}">
+        <p14:creationId xmlns:p14="http://schemas.microsoft.com/office/powerpoint/2010/main" val="2445152466"/>
       </p:ext>
     </p:extLst>
   </p:cSld>
@@ -15635,8 +16827,8 @@
           </a:p>
         </p:txBody>
       </p:sp>
-      <mc:AlternateContent xmlns:mc="http://schemas.openxmlformats.org/markup-compatibility/2006">
-        <mc:Choice xmlns:p14="http://schemas.microsoft.com/office/powerpoint/2010/main" Requires="p14">
+      <mc:AlternateContent xmlns:mc="http://schemas.openxmlformats.org/markup-compatibility/2006" xmlns:p14="http://schemas.microsoft.com/office/powerpoint/2010/main">
+        <mc:Choice Requires="p14">
           <p:contentPart p14:bwMode="auto" r:id="rId2">
             <p14:nvContentPartPr>
               <p14:cNvPr id="33" name="Ink 32">
@@ -15655,7 +16847,7 @@
             </p14:xfrm>
           </p:contentPart>
         </mc:Choice>
-        <mc:Fallback>
+        <mc:Fallback xmlns="">
           <p:pic>
             <p:nvPicPr>
               <p:cNvPr id="33" name="Ink 32">
@@ -15686,8 +16878,8 @@
           </p:pic>
         </mc:Fallback>
       </mc:AlternateContent>
-      <mc:AlternateContent xmlns:mc="http://schemas.openxmlformats.org/markup-compatibility/2006">
-        <mc:Choice xmlns:p14="http://schemas.microsoft.com/office/powerpoint/2010/main" Requires="p14">
+      <mc:AlternateContent xmlns:mc="http://schemas.openxmlformats.org/markup-compatibility/2006" xmlns:p14="http://schemas.microsoft.com/office/powerpoint/2010/main">
+        <mc:Choice Requires="p14">
           <p:contentPart p14:bwMode="auto" r:id="rId4">
             <p14:nvContentPartPr>
               <p14:cNvPr id="4" name="Ink 3">
@@ -15706,7 +16898,7 @@
             </p14:xfrm>
           </p:contentPart>
         </mc:Choice>
-        <mc:Fallback>
+        <mc:Fallback xmlns="">
           <p:pic>
             <p:nvPicPr>
               <p:cNvPr id="4" name="Ink 3">
@@ -15737,8 +16929,8 @@
           </p:pic>
         </mc:Fallback>
       </mc:AlternateContent>
-      <mc:AlternateContent xmlns:mc="http://schemas.openxmlformats.org/markup-compatibility/2006">
-        <mc:Choice xmlns:p14="http://schemas.microsoft.com/office/powerpoint/2010/main" Requires="p14">
+      <mc:AlternateContent xmlns:mc="http://schemas.openxmlformats.org/markup-compatibility/2006" xmlns:p14="http://schemas.microsoft.com/office/powerpoint/2010/main">
+        <mc:Choice Requires="p14">
           <p:contentPart p14:bwMode="auto" r:id="rId6">
             <p14:nvContentPartPr>
               <p14:cNvPr id="5" name="Ink 4">
@@ -15757,7 +16949,7 @@
             </p14:xfrm>
           </p:contentPart>
         </mc:Choice>
-        <mc:Fallback>
+        <mc:Fallback xmlns="">
           <p:pic>
             <p:nvPicPr>
               <p:cNvPr id="5" name="Ink 4">
@@ -15788,8 +16980,8 @@
           </p:pic>
         </mc:Fallback>
       </mc:AlternateContent>
-      <mc:AlternateContent xmlns:mc="http://schemas.openxmlformats.org/markup-compatibility/2006">
-        <mc:Choice xmlns:p14="http://schemas.microsoft.com/office/powerpoint/2010/main" Requires="p14">
+      <mc:AlternateContent xmlns:mc="http://schemas.openxmlformats.org/markup-compatibility/2006" xmlns:p14="http://schemas.microsoft.com/office/powerpoint/2010/main">
+        <mc:Choice Requires="p14">
           <p:contentPart p14:bwMode="auto" r:id="rId8">
             <p14:nvContentPartPr>
               <p14:cNvPr id="7" name="Ink 6">
@@ -15808,7 +17000,7 @@
             </p14:xfrm>
           </p:contentPart>
         </mc:Choice>
-        <mc:Fallback>
+        <mc:Fallback xmlns="">
           <p:pic>
             <p:nvPicPr>
               <p:cNvPr id="7" name="Ink 6">
@@ -15839,8 +17031,8 @@
           </p:pic>
         </mc:Fallback>
       </mc:AlternateContent>
-      <mc:AlternateContent xmlns:mc="http://schemas.openxmlformats.org/markup-compatibility/2006">
-        <mc:Choice xmlns:p14="http://schemas.microsoft.com/office/powerpoint/2010/main" Requires="p14">
+      <mc:AlternateContent xmlns:mc="http://schemas.openxmlformats.org/markup-compatibility/2006" xmlns:p14="http://schemas.microsoft.com/office/powerpoint/2010/main">
+        <mc:Choice Requires="p14">
           <p:contentPart p14:bwMode="auto" r:id="rId10">
             <p14:nvContentPartPr>
               <p14:cNvPr id="9" name="Ink 8">
@@ -15859,7 +17051,7 @@
             </p14:xfrm>
           </p:contentPart>
         </mc:Choice>
-        <mc:Fallback>
+        <mc:Fallback xmlns="">
           <p:pic>
             <p:nvPicPr>
               <p:cNvPr id="9" name="Ink 8">
@@ -15890,8 +17082,8 @@
           </p:pic>
         </mc:Fallback>
       </mc:AlternateContent>
-      <mc:AlternateContent xmlns:mc="http://schemas.openxmlformats.org/markup-compatibility/2006">
-        <mc:Choice xmlns:p14="http://schemas.microsoft.com/office/powerpoint/2010/main" Requires="p14">
+      <mc:AlternateContent xmlns:mc="http://schemas.openxmlformats.org/markup-compatibility/2006" xmlns:p14="http://schemas.microsoft.com/office/powerpoint/2010/main">
+        <mc:Choice Requires="p14">
           <p:contentPart p14:bwMode="auto" r:id="rId12">
             <p14:nvContentPartPr>
               <p14:cNvPr id="10" name="Ink 9">
@@ -15910,7 +17102,7 @@
             </p14:xfrm>
           </p:contentPart>
         </mc:Choice>
-        <mc:Fallback>
+        <mc:Fallback xmlns="">
           <p:pic>
             <p:nvPicPr>
               <p:cNvPr id="10" name="Ink 9">
@@ -15941,8 +17133,8 @@
           </p:pic>
         </mc:Fallback>
       </mc:AlternateContent>
-      <mc:AlternateContent xmlns:mc="http://schemas.openxmlformats.org/markup-compatibility/2006">
-        <mc:Choice xmlns:p14="http://schemas.microsoft.com/office/powerpoint/2010/main" Requires="p14">
+      <mc:AlternateContent xmlns:mc="http://schemas.openxmlformats.org/markup-compatibility/2006" xmlns:p14="http://schemas.microsoft.com/office/powerpoint/2010/main">
+        <mc:Choice Requires="p14">
           <p:contentPart p14:bwMode="auto" r:id="rId14">
             <p14:nvContentPartPr>
               <p14:cNvPr id="11" name="Ink 10">
@@ -15961,7 +17153,7 @@
             </p14:xfrm>
           </p:contentPart>
         </mc:Choice>
-        <mc:Fallback>
+        <mc:Fallback xmlns="">
           <p:pic>
             <p:nvPicPr>
               <p:cNvPr id="11" name="Ink 10">
@@ -15992,8 +17184,8 @@
           </p:pic>
         </mc:Fallback>
       </mc:AlternateContent>
-      <mc:AlternateContent xmlns:mc="http://schemas.openxmlformats.org/markup-compatibility/2006">
-        <mc:Choice xmlns:p14="http://schemas.microsoft.com/office/powerpoint/2010/main" Requires="p14">
+      <mc:AlternateContent xmlns:mc="http://schemas.openxmlformats.org/markup-compatibility/2006" xmlns:p14="http://schemas.microsoft.com/office/powerpoint/2010/main">
+        <mc:Choice Requires="p14">
           <p:contentPart p14:bwMode="auto" r:id="rId16">
             <p14:nvContentPartPr>
               <p14:cNvPr id="12" name="Ink 11">
@@ -16012,7 +17204,7 @@
             </p14:xfrm>
           </p:contentPart>
         </mc:Choice>
-        <mc:Fallback>
+        <mc:Fallback xmlns="">
           <p:pic>
             <p:nvPicPr>
               <p:cNvPr id="12" name="Ink 11">
@@ -16043,8 +17235,8 @@
           </p:pic>
         </mc:Fallback>
       </mc:AlternateContent>
-      <mc:AlternateContent xmlns:mc="http://schemas.openxmlformats.org/markup-compatibility/2006">
-        <mc:Choice xmlns:p14="http://schemas.microsoft.com/office/powerpoint/2010/main" Requires="p14">
+      <mc:AlternateContent xmlns:mc="http://schemas.openxmlformats.org/markup-compatibility/2006" xmlns:p14="http://schemas.microsoft.com/office/powerpoint/2010/main">
+        <mc:Choice Requires="p14">
           <p:contentPart p14:bwMode="auto" r:id="rId18">
             <p14:nvContentPartPr>
               <p14:cNvPr id="13" name="Ink 12">
@@ -16063,7 +17255,7 @@
             </p14:xfrm>
           </p:contentPart>
         </mc:Choice>
-        <mc:Fallback>
+        <mc:Fallback xmlns="">
           <p:pic>
             <p:nvPicPr>
               <p:cNvPr id="13" name="Ink 12">
@@ -16094,8 +17286,8 @@
           </p:pic>
         </mc:Fallback>
       </mc:AlternateContent>
-      <mc:AlternateContent xmlns:mc="http://schemas.openxmlformats.org/markup-compatibility/2006">
-        <mc:Choice xmlns:p14="http://schemas.microsoft.com/office/powerpoint/2010/main" Requires="p14">
+      <mc:AlternateContent xmlns:mc="http://schemas.openxmlformats.org/markup-compatibility/2006" xmlns:p14="http://schemas.microsoft.com/office/powerpoint/2010/main">
+        <mc:Choice Requires="p14">
           <p:contentPart p14:bwMode="auto" r:id="rId20">
             <p14:nvContentPartPr>
               <p14:cNvPr id="14" name="Ink 13">
@@ -16114,7 +17306,7 @@
             </p14:xfrm>
           </p:contentPart>
         </mc:Choice>
-        <mc:Fallback>
+        <mc:Fallback xmlns="">
           <p:pic>
             <p:nvPicPr>
               <p:cNvPr id="14" name="Ink 13">
@@ -16145,8 +17337,8 @@
           </p:pic>
         </mc:Fallback>
       </mc:AlternateContent>
-      <mc:AlternateContent xmlns:mc="http://schemas.openxmlformats.org/markup-compatibility/2006">
-        <mc:Choice xmlns:p14="http://schemas.microsoft.com/office/powerpoint/2010/main" Requires="p14">
+      <mc:AlternateContent xmlns:mc="http://schemas.openxmlformats.org/markup-compatibility/2006" xmlns:p14="http://schemas.microsoft.com/office/powerpoint/2010/main">
+        <mc:Choice Requires="p14">
           <p:contentPart p14:bwMode="auto" r:id="rId22">
             <p14:nvContentPartPr>
               <p14:cNvPr id="16" name="Ink 15">
@@ -16165,7 +17357,7 @@
             </p14:xfrm>
           </p:contentPart>
         </mc:Choice>
-        <mc:Fallback>
+        <mc:Fallback xmlns="">
           <p:pic>
             <p:nvPicPr>
               <p:cNvPr id="16" name="Ink 15">
@@ -16196,8 +17388,8 @@
           </p:pic>
         </mc:Fallback>
       </mc:AlternateContent>
-      <mc:AlternateContent xmlns:mc="http://schemas.openxmlformats.org/markup-compatibility/2006">
-        <mc:Choice xmlns:p14="http://schemas.microsoft.com/office/powerpoint/2010/main" Requires="p14">
+      <mc:AlternateContent xmlns:mc="http://schemas.openxmlformats.org/markup-compatibility/2006" xmlns:p14="http://schemas.microsoft.com/office/powerpoint/2010/main">
+        <mc:Choice Requires="p14">
           <p:contentPart p14:bwMode="auto" r:id="rId24">
             <p14:nvContentPartPr>
               <p14:cNvPr id="17" name="Ink 16">
@@ -16216,7 +17408,7 @@
             </p14:xfrm>
           </p:contentPart>
         </mc:Choice>
-        <mc:Fallback>
+        <mc:Fallback xmlns="">
           <p:pic>
             <p:nvPicPr>
               <p:cNvPr id="17" name="Ink 16">
@@ -16247,8 +17439,8 @@
           </p:pic>
         </mc:Fallback>
       </mc:AlternateContent>
-      <mc:AlternateContent xmlns:mc="http://schemas.openxmlformats.org/markup-compatibility/2006">
-        <mc:Choice xmlns:p14="http://schemas.microsoft.com/office/powerpoint/2010/main" Requires="p14">
+      <mc:AlternateContent xmlns:mc="http://schemas.openxmlformats.org/markup-compatibility/2006" xmlns:p14="http://schemas.microsoft.com/office/powerpoint/2010/main">
+        <mc:Choice Requires="p14">
           <p:contentPart p14:bwMode="auto" r:id="rId26">
             <p14:nvContentPartPr>
               <p14:cNvPr id="19" name="Ink 18">
@@ -16267,7 +17459,7 @@
             </p14:xfrm>
           </p:contentPart>
         </mc:Choice>
-        <mc:Fallback>
+        <mc:Fallback xmlns="">
           <p:pic>
             <p:nvPicPr>
               <p:cNvPr id="19" name="Ink 18">
@@ -16298,8 +17490,8 @@
           </p:pic>
         </mc:Fallback>
       </mc:AlternateContent>
-      <mc:AlternateContent xmlns:mc="http://schemas.openxmlformats.org/markup-compatibility/2006">
-        <mc:Choice xmlns:p14="http://schemas.microsoft.com/office/powerpoint/2010/main" Requires="p14">
+      <mc:AlternateContent xmlns:mc="http://schemas.openxmlformats.org/markup-compatibility/2006" xmlns:p14="http://schemas.microsoft.com/office/powerpoint/2010/main">
+        <mc:Choice Requires="p14">
           <p:contentPart p14:bwMode="auto" r:id="rId28">
             <p14:nvContentPartPr>
               <p14:cNvPr id="20" name="Ink 19">
@@ -16318,7 +17510,7 @@
             </p14:xfrm>
           </p:contentPart>
         </mc:Choice>
-        <mc:Fallback>
+        <mc:Fallback xmlns="">
           <p:pic>
             <p:nvPicPr>
               <p:cNvPr id="20" name="Ink 19">
@@ -16349,8 +17541,8 @@
           </p:pic>
         </mc:Fallback>
       </mc:AlternateContent>
-      <mc:AlternateContent xmlns:mc="http://schemas.openxmlformats.org/markup-compatibility/2006">
-        <mc:Choice xmlns:p14="http://schemas.microsoft.com/office/powerpoint/2010/main" Requires="p14">
+      <mc:AlternateContent xmlns:mc="http://schemas.openxmlformats.org/markup-compatibility/2006" xmlns:p14="http://schemas.microsoft.com/office/powerpoint/2010/main">
+        <mc:Choice Requires="p14">
           <p:contentPart p14:bwMode="auto" r:id="rId30">
             <p14:nvContentPartPr>
               <p14:cNvPr id="22" name="Ink 21">
@@ -16369,7 +17561,7 @@
             </p14:xfrm>
           </p:contentPart>
         </mc:Choice>
-        <mc:Fallback>
+        <mc:Fallback xmlns="">
           <p:pic>
             <p:nvPicPr>
               <p:cNvPr id="22" name="Ink 21">
@@ -16400,8 +17592,8 @@
           </p:pic>
         </mc:Fallback>
       </mc:AlternateContent>
-      <mc:AlternateContent xmlns:mc="http://schemas.openxmlformats.org/markup-compatibility/2006">
-        <mc:Choice xmlns:p14="http://schemas.microsoft.com/office/powerpoint/2010/main" Requires="p14">
+      <mc:AlternateContent xmlns:mc="http://schemas.openxmlformats.org/markup-compatibility/2006" xmlns:p14="http://schemas.microsoft.com/office/powerpoint/2010/main">
+        <mc:Choice Requires="p14">
           <p:contentPart p14:bwMode="auto" r:id="rId32">
             <p14:nvContentPartPr>
               <p14:cNvPr id="23" name="Ink 22">
@@ -16420,7 +17612,7 @@
             </p14:xfrm>
           </p:contentPart>
         </mc:Choice>
-        <mc:Fallback>
+        <mc:Fallback xmlns="">
           <p:pic>
             <p:nvPicPr>
               <p:cNvPr id="23" name="Ink 22">
@@ -16451,8 +17643,8 @@
           </p:pic>
         </mc:Fallback>
       </mc:AlternateContent>
-      <mc:AlternateContent xmlns:mc="http://schemas.openxmlformats.org/markup-compatibility/2006">
-        <mc:Choice xmlns:p14="http://schemas.microsoft.com/office/powerpoint/2010/main" Requires="p14">
+      <mc:AlternateContent xmlns:mc="http://schemas.openxmlformats.org/markup-compatibility/2006" xmlns:p14="http://schemas.microsoft.com/office/powerpoint/2010/main">
+        <mc:Choice Requires="p14">
           <p:contentPart p14:bwMode="auto" r:id="rId34">
             <p14:nvContentPartPr>
               <p14:cNvPr id="24" name="Ink 23">
@@ -16471,7 +17663,7 @@
             </p14:xfrm>
           </p:contentPart>
         </mc:Choice>
-        <mc:Fallback>
+        <mc:Fallback xmlns="">
           <p:pic>
             <p:nvPicPr>
               <p:cNvPr id="24" name="Ink 23">
@@ -16502,8 +17694,8 @@
           </p:pic>
         </mc:Fallback>
       </mc:AlternateContent>
-      <mc:AlternateContent xmlns:mc="http://schemas.openxmlformats.org/markup-compatibility/2006">
-        <mc:Choice xmlns:p14="http://schemas.microsoft.com/office/powerpoint/2010/main" Requires="p14">
+      <mc:AlternateContent xmlns:mc="http://schemas.openxmlformats.org/markup-compatibility/2006" xmlns:p14="http://schemas.microsoft.com/office/powerpoint/2010/main">
+        <mc:Choice Requires="p14">
           <p:contentPart p14:bwMode="auto" r:id="rId36">
             <p14:nvContentPartPr>
               <p14:cNvPr id="25" name="Ink 24">
@@ -16522,7 +17714,7 @@
             </p14:xfrm>
           </p:contentPart>
         </mc:Choice>
-        <mc:Fallback>
+        <mc:Fallback xmlns="">
           <p:pic>
             <p:nvPicPr>
               <p:cNvPr id="25" name="Ink 24">
@@ -16553,8 +17745,8 @@
           </p:pic>
         </mc:Fallback>
       </mc:AlternateContent>
-      <mc:AlternateContent xmlns:mc="http://schemas.openxmlformats.org/markup-compatibility/2006">
-        <mc:Choice xmlns:p14="http://schemas.microsoft.com/office/powerpoint/2010/main" Requires="p14">
+      <mc:AlternateContent xmlns:mc="http://schemas.openxmlformats.org/markup-compatibility/2006" xmlns:p14="http://schemas.microsoft.com/office/powerpoint/2010/main">
+        <mc:Choice Requires="p14">
           <p:contentPart p14:bwMode="auto" r:id="rId38">
             <p14:nvContentPartPr>
               <p14:cNvPr id="26" name="Ink 25">
@@ -16573,7 +17765,7 @@
             </p14:xfrm>
           </p:contentPart>
         </mc:Choice>
-        <mc:Fallback>
+        <mc:Fallback xmlns="">
           <p:pic>
             <p:nvPicPr>
               <p:cNvPr id="26" name="Ink 25">
@@ -16604,8 +17796,8 @@
           </p:pic>
         </mc:Fallback>
       </mc:AlternateContent>
-      <mc:AlternateContent xmlns:mc="http://schemas.openxmlformats.org/markup-compatibility/2006">
-        <mc:Choice xmlns:p14="http://schemas.microsoft.com/office/powerpoint/2010/main" Requires="p14">
+      <mc:AlternateContent xmlns:mc="http://schemas.openxmlformats.org/markup-compatibility/2006" xmlns:p14="http://schemas.microsoft.com/office/powerpoint/2010/main">
+        <mc:Choice Requires="p14">
           <p:contentPart p14:bwMode="auto" r:id="rId40">
             <p14:nvContentPartPr>
               <p14:cNvPr id="27" name="Ink 26">
@@ -16624,7 +17816,7 @@
             </p14:xfrm>
           </p:contentPart>
         </mc:Choice>
-        <mc:Fallback>
+        <mc:Fallback xmlns="">
           <p:pic>
             <p:nvPicPr>
               <p:cNvPr id="27" name="Ink 26">
@@ -16655,8 +17847,8 @@
           </p:pic>
         </mc:Fallback>
       </mc:AlternateContent>
-      <mc:AlternateContent xmlns:mc="http://schemas.openxmlformats.org/markup-compatibility/2006">
-        <mc:Choice xmlns:p14="http://schemas.microsoft.com/office/powerpoint/2010/main" Requires="p14">
+      <mc:AlternateContent xmlns:mc="http://schemas.openxmlformats.org/markup-compatibility/2006" xmlns:p14="http://schemas.microsoft.com/office/powerpoint/2010/main">
+        <mc:Choice Requires="p14">
           <p:contentPart p14:bwMode="auto" r:id="rId42">
             <p14:nvContentPartPr>
               <p14:cNvPr id="28" name="Ink 27">
@@ -16675,7 +17867,7 @@
             </p14:xfrm>
           </p:contentPart>
         </mc:Choice>
-        <mc:Fallback>
+        <mc:Fallback xmlns="">
           <p:pic>
             <p:nvPicPr>
               <p:cNvPr id="28" name="Ink 27">
@@ -16706,8 +17898,8 @@
           </p:pic>
         </mc:Fallback>
       </mc:AlternateContent>
-      <mc:AlternateContent xmlns:mc="http://schemas.openxmlformats.org/markup-compatibility/2006">
-        <mc:Choice xmlns:p14="http://schemas.microsoft.com/office/powerpoint/2010/main" Requires="p14">
+      <mc:AlternateContent xmlns:mc="http://schemas.openxmlformats.org/markup-compatibility/2006" xmlns:p14="http://schemas.microsoft.com/office/powerpoint/2010/main">
+        <mc:Choice Requires="p14">
           <p:contentPart p14:bwMode="auto" r:id="rId44">
             <p14:nvContentPartPr>
               <p14:cNvPr id="29" name="Ink 28">
@@ -16726,7 +17918,7 @@
             </p14:xfrm>
           </p:contentPart>
         </mc:Choice>
-        <mc:Fallback>
+        <mc:Fallback xmlns="">
           <p:pic>
             <p:nvPicPr>
               <p:cNvPr id="29" name="Ink 28">
@@ -16757,8 +17949,8 @@
           </p:pic>
         </mc:Fallback>
       </mc:AlternateContent>
-      <mc:AlternateContent xmlns:mc="http://schemas.openxmlformats.org/markup-compatibility/2006">
-        <mc:Choice xmlns:p14="http://schemas.microsoft.com/office/powerpoint/2010/main" Requires="p14">
+      <mc:AlternateContent xmlns:mc="http://schemas.openxmlformats.org/markup-compatibility/2006" xmlns:p14="http://schemas.microsoft.com/office/powerpoint/2010/main">
+        <mc:Choice Requires="p14">
           <p:contentPart p14:bwMode="auto" r:id="rId46">
             <p14:nvContentPartPr>
               <p14:cNvPr id="30" name="Ink 29">
@@ -16777,7 +17969,7 @@
             </p14:xfrm>
           </p:contentPart>
         </mc:Choice>
-        <mc:Fallback>
+        <mc:Fallback xmlns="">
           <p:pic>
             <p:nvPicPr>
               <p:cNvPr id="30" name="Ink 29">
@@ -16808,8 +18000,8 @@
           </p:pic>
         </mc:Fallback>
       </mc:AlternateContent>
-      <mc:AlternateContent xmlns:mc="http://schemas.openxmlformats.org/markup-compatibility/2006">
-        <mc:Choice xmlns:p14="http://schemas.microsoft.com/office/powerpoint/2010/main" Requires="p14">
+      <mc:AlternateContent xmlns:mc="http://schemas.openxmlformats.org/markup-compatibility/2006" xmlns:p14="http://schemas.microsoft.com/office/powerpoint/2010/main">
+        <mc:Choice Requires="p14">
           <p:contentPart p14:bwMode="auto" r:id="rId48">
             <p14:nvContentPartPr>
               <p14:cNvPr id="31" name="Ink 30">
@@ -16828,7 +18020,7 @@
             </p14:xfrm>
           </p:contentPart>
         </mc:Choice>
-        <mc:Fallback>
+        <mc:Fallback xmlns="">
           <p:pic>
             <p:nvPicPr>
               <p:cNvPr id="31" name="Ink 30">
@@ -16859,8 +18051,8 @@
           </p:pic>
         </mc:Fallback>
       </mc:AlternateContent>
-      <mc:AlternateContent xmlns:mc="http://schemas.openxmlformats.org/markup-compatibility/2006">
-        <mc:Choice xmlns:p14="http://schemas.microsoft.com/office/powerpoint/2010/main" Requires="p14">
+      <mc:AlternateContent xmlns:mc="http://schemas.openxmlformats.org/markup-compatibility/2006" xmlns:p14="http://schemas.microsoft.com/office/powerpoint/2010/main">
+        <mc:Choice Requires="p14">
           <p:contentPart p14:bwMode="auto" r:id="rId50">
             <p14:nvContentPartPr>
               <p14:cNvPr id="45" name="Ink 44">
@@ -16879,7 +18071,7 @@
             </p14:xfrm>
           </p:contentPart>
         </mc:Choice>
-        <mc:Fallback>
+        <mc:Fallback xmlns="">
           <p:pic>
             <p:nvPicPr>
               <p:cNvPr id="45" name="Ink 44">
@@ -16910,8 +18102,8 @@
           </p:pic>
         </mc:Fallback>
       </mc:AlternateContent>
-      <mc:AlternateContent xmlns:mc="http://schemas.openxmlformats.org/markup-compatibility/2006">
-        <mc:Choice xmlns:p14="http://schemas.microsoft.com/office/powerpoint/2010/main" Requires="p14">
+      <mc:AlternateContent xmlns:mc="http://schemas.openxmlformats.org/markup-compatibility/2006" xmlns:p14="http://schemas.microsoft.com/office/powerpoint/2010/main">
+        <mc:Choice Requires="p14">
           <p:contentPart p14:bwMode="auto" r:id="rId52">
             <p14:nvContentPartPr>
               <p14:cNvPr id="46" name="Ink 45">
@@ -16930,7 +18122,7 @@
             </p14:xfrm>
           </p:contentPart>
         </mc:Choice>
-        <mc:Fallback>
+        <mc:Fallback xmlns="">
           <p:pic>
             <p:nvPicPr>
               <p:cNvPr id="46" name="Ink 45">
@@ -16961,8 +18153,8 @@
           </p:pic>
         </mc:Fallback>
       </mc:AlternateContent>
-      <mc:AlternateContent xmlns:mc="http://schemas.openxmlformats.org/markup-compatibility/2006">
-        <mc:Choice xmlns:p14="http://schemas.microsoft.com/office/powerpoint/2010/main" Requires="p14">
+      <mc:AlternateContent xmlns:mc="http://schemas.openxmlformats.org/markup-compatibility/2006" xmlns:p14="http://schemas.microsoft.com/office/powerpoint/2010/main">
+        <mc:Choice Requires="p14">
           <p:contentPart p14:bwMode="auto" r:id="rId54">
             <p14:nvContentPartPr>
               <p14:cNvPr id="34" name="Ink 33">
@@ -16981,7 +18173,7 @@
             </p14:xfrm>
           </p:contentPart>
         </mc:Choice>
-        <mc:Fallback>
+        <mc:Fallback xmlns="">
           <p:pic>
             <p:nvPicPr>
               <p:cNvPr id="34" name="Ink 33">
@@ -17012,8 +18204,8 @@
           </p:pic>
         </mc:Fallback>
       </mc:AlternateContent>
-      <mc:AlternateContent xmlns:mc="http://schemas.openxmlformats.org/markup-compatibility/2006">
-        <mc:Choice xmlns:p14="http://schemas.microsoft.com/office/powerpoint/2010/main" Requires="p14">
+      <mc:AlternateContent xmlns:mc="http://schemas.openxmlformats.org/markup-compatibility/2006" xmlns:p14="http://schemas.microsoft.com/office/powerpoint/2010/main">
+        <mc:Choice Requires="p14">
           <p:contentPart p14:bwMode="auto" r:id="rId56">
             <p14:nvContentPartPr>
               <p14:cNvPr id="35" name="Ink 34">
@@ -17032,7 +18224,7 @@
             </p14:xfrm>
           </p:contentPart>
         </mc:Choice>
-        <mc:Fallback>
+        <mc:Fallback xmlns="">
           <p:pic>
             <p:nvPicPr>
               <p:cNvPr id="35" name="Ink 34">
@@ -17063,8 +18255,8 @@
           </p:pic>
         </mc:Fallback>
       </mc:AlternateContent>
-      <mc:AlternateContent xmlns:mc="http://schemas.openxmlformats.org/markup-compatibility/2006">
-        <mc:Choice xmlns:p14="http://schemas.microsoft.com/office/powerpoint/2010/main" Requires="p14">
+      <mc:AlternateContent xmlns:mc="http://schemas.openxmlformats.org/markup-compatibility/2006" xmlns:p14="http://schemas.microsoft.com/office/powerpoint/2010/main">
+        <mc:Choice Requires="p14">
           <p:contentPart p14:bwMode="auto" r:id="rId58">
             <p14:nvContentPartPr>
               <p14:cNvPr id="36" name="Ink 35">
@@ -17083,7 +18275,7 @@
             </p14:xfrm>
           </p:contentPart>
         </mc:Choice>
-        <mc:Fallback>
+        <mc:Fallback xmlns="">
           <p:pic>
             <p:nvPicPr>
               <p:cNvPr id="36" name="Ink 35">
@@ -17114,8 +18306,8 @@
           </p:pic>
         </mc:Fallback>
       </mc:AlternateContent>
-      <mc:AlternateContent xmlns:mc="http://schemas.openxmlformats.org/markup-compatibility/2006">
-        <mc:Choice xmlns:p14="http://schemas.microsoft.com/office/powerpoint/2010/main" Requires="p14">
+      <mc:AlternateContent xmlns:mc="http://schemas.openxmlformats.org/markup-compatibility/2006" xmlns:p14="http://schemas.microsoft.com/office/powerpoint/2010/main">
+        <mc:Choice Requires="p14">
           <p:contentPart p14:bwMode="auto" r:id="rId60">
             <p14:nvContentPartPr>
               <p14:cNvPr id="37" name="Ink 36">
@@ -17134,7 +18326,7 @@
             </p14:xfrm>
           </p:contentPart>
         </mc:Choice>
-        <mc:Fallback>
+        <mc:Fallback xmlns="">
           <p:pic>
             <p:nvPicPr>
               <p:cNvPr id="37" name="Ink 36">
@@ -17165,8 +18357,8 @@
           </p:pic>
         </mc:Fallback>
       </mc:AlternateContent>
-      <mc:AlternateContent xmlns:mc="http://schemas.openxmlformats.org/markup-compatibility/2006">
-        <mc:Choice xmlns:p14="http://schemas.microsoft.com/office/powerpoint/2010/main" Requires="p14">
+      <mc:AlternateContent xmlns:mc="http://schemas.openxmlformats.org/markup-compatibility/2006" xmlns:p14="http://schemas.microsoft.com/office/powerpoint/2010/main">
+        <mc:Choice Requires="p14">
           <p:contentPart p14:bwMode="auto" r:id="rId62">
             <p14:nvContentPartPr>
               <p14:cNvPr id="38" name="Ink 37">
@@ -17185,7 +18377,7 @@
             </p14:xfrm>
           </p:contentPart>
         </mc:Choice>
-        <mc:Fallback>
+        <mc:Fallback xmlns="">
           <p:pic>
             <p:nvPicPr>
               <p:cNvPr id="38" name="Ink 37">
@@ -17216,8 +18408,8 @@
           </p:pic>
         </mc:Fallback>
       </mc:AlternateContent>
-      <mc:AlternateContent xmlns:mc="http://schemas.openxmlformats.org/markup-compatibility/2006">
-        <mc:Choice xmlns:p14="http://schemas.microsoft.com/office/powerpoint/2010/main" Requires="p14">
+      <mc:AlternateContent xmlns:mc="http://schemas.openxmlformats.org/markup-compatibility/2006" xmlns:p14="http://schemas.microsoft.com/office/powerpoint/2010/main">
+        <mc:Choice Requires="p14">
           <p:contentPart p14:bwMode="auto" r:id="rId64">
             <p14:nvContentPartPr>
               <p14:cNvPr id="39" name="Ink 38">
@@ -17236,7 +18428,7 @@
             </p14:xfrm>
           </p:contentPart>
         </mc:Choice>
-        <mc:Fallback>
+        <mc:Fallback xmlns="">
           <p:pic>
             <p:nvPicPr>
               <p:cNvPr id="39" name="Ink 38">
@@ -17267,8 +18459,8 @@
           </p:pic>
         </mc:Fallback>
       </mc:AlternateContent>
-      <mc:AlternateContent xmlns:mc="http://schemas.openxmlformats.org/markup-compatibility/2006">
-        <mc:Choice xmlns:p14="http://schemas.microsoft.com/office/powerpoint/2010/main" Requires="p14">
+      <mc:AlternateContent xmlns:mc="http://schemas.openxmlformats.org/markup-compatibility/2006" xmlns:p14="http://schemas.microsoft.com/office/powerpoint/2010/main">
+        <mc:Choice Requires="p14">
           <p:contentPart p14:bwMode="auto" r:id="rId66">
             <p14:nvContentPartPr>
               <p14:cNvPr id="40" name="Ink 39">
@@ -17287,7 +18479,7 @@
             </p14:xfrm>
           </p:contentPart>
         </mc:Choice>
-        <mc:Fallback>
+        <mc:Fallback xmlns="">
           <p:pic>
             <p:nvPicPr>
               <p:cNvPr id="40" name="Ink 39">
@@ -17318,8 +18510,8 @@
           </p:pic>
         </mc:Fallback>
       </mc:AlternateContent>
-      <mc:AlternateContent xmlns:mc="http://schemas.openxmlformats.org/markup-compatibility/2006">
-        <mc:Choice xmlns:p14="http://schemas.microsoft.com/office/powerpoint/2010/main" Requires="p14">
+      <mc:AlternateContent xmlns:mc="http://schemas.openxmlformats.org/markup-compatibility/2006" xmlns:p14="http://schemas.microsoft.com/office/powerpoint/2010/main">
+        <mc:Choice Requires="p14">
           <p:contentPart p14:bwMode="auto" r:id="rId68">
             <p14:nvContentPartPr>
               <p14:cNvPr id="41" name="Ink 40">
@@ -17338,7 +18530,7 @@
             </p14:xfrm>
           </p:contentPart>
         </mc:Choice>
-        <mc:Fallback>
+        <mc:Fallback xmlns="">
           <p:pic>
             <p:nvPicPr>
               <p:cNvPr id="41" name="Ink 40">
@@ -17389,8 +18581,8 @@
             <a:chExt cx="2582640" cy="835560"/>
           </a:xfrm>
         </p:grpSpPr>
-        <mc:AlternateContent xmlns:mc="http://schemas.openxmlformats.org/markup-compatibility/2006">
-          <mc:Choice xmlns:p14="http://schemas.microsoft.com/office/powerpoint/2010/main" Requires="p14">
+        <mc:AlternateContent xmlns:mc="http://schemas.openxmlformats.org/markup-compatibility/2006" xmlns:p14="http://schemas.microsoft.com/office/powerpoint/2010/main">
+          <mc:Choice Requires="p14">
             <p:contentPart p14:bwMode="auto" r:id="rId70">
               <p14:nvContentPartPr>
                 <p14:cNvPr id="43" name="Ink 42">
@@ -17409,7 +18601,7 @@
               </p14:xfrm>
             </p:contentPart>
           </mc:Choice>
-          <mc:Fallback>
+          <mc:Fallback xmlns="">
             <p:pic>
               <p:nvPicPr>
                 <p:cNvPr id="43" name="Ink 42">
@@ -17440,8 +18632,8 @@
             </p:pic>
           </mc:Fallback>
         </mc:AlternateContent>
-        <mc:AlternateContent xmlns:mc="http://schemas.openxmlformats.org/markup-compatibility/2006">
-          <mc:Choice xmlns:p14="http://schemas.microsoft.com/office/powerpoint/2010/main" Requires="p14">
+        <mc:AlternateContent xmlns:mc="http://schemas.openxmlformats.org/markup-compatibility/2006" xmlns:p14="http://schemas.microsoft.com/office/powerpoint/2010/main">
+          <mc:Choice Requires="p14">
             <p:contentPart p14:bwMode="auto" r:id="rId72">
               <p14:nvContentPartPr>
                 <p14:cNvPr id="44" name="Ink 43">
@@ -17460,7 +18652,7 @@
               </p14:xfrm>
             </p:contentPart>
           </mc:Choice>
-          <mc:Fallback>
+          <mc:Fallback xmlns="">
             <p:pic>
               <p:nvPicPr>
                 <p:cNvPr id="44" name="Ink 43">
@@ -17491,8 +18683,8 @@
             </p:pic>
           </mc:Fallback>
         </mc:AlternateContent>
-        <mc:AlternateContent xmlns:mc="http://schemas.openxmlformats.org/markup-compatibility/2006">
-          <mc:Choice xmlns:p14="http://schemas.microsoft.com/office/powerpoint/2010/main" Requires="p14">
+        <mc:AlternateContent xmlns:mc="http://schemas.openxmlformats.org/markup-compatibility/2006" xmlns:p14="http://schemas.microsoft.com/office/powerpoint/2010/main">
+          <mc:Choice Requires="p14">
             <p:contentPart p14:bwMode="auto" r:id="rId74">
               <p14:nvContentPartPr>
                 <p14:cNvPr id="48" name="Ink 47">
@@ -17511,7 +18703,7 @@
               </p14:xfrm>
             </p:contentPart>
           </mc:Choice>
-          <mc:Fallback>
+          <mc:Fallback xmlns="">
             <p:pic>
               <p:nvPicPr>
                 <p:cNvPr id="48" name="Ink 47">
@@ -17542,8 +18734,8 @@
             </p:pic>
           </mc:Fallback>
         </mc:AlternateContent>
-        <mc:AlternateContent xmlns:mc="http://schemas.openxmlformats.org/markup-compatibility/2006">
-          <mc:Choice xmlns:p14="http://schemas.microsoft.com/office/powerpoint/2010/main" Requires="p14">
+        <mc:AlternateContent xmlns:mc="http://schemas.openxmlformats.org/markup-compatibility/2006" xmlns:p14="http://schemas.microsoft.com/office/powerpoint/2010/main">
+          <mc:Choice Requires="p14">
             <p:contentPart p14:bwMode="auto" r:id="rId76">
               <p14:nvContentPartPr>
                 <p14:cNvPr id="49" name="Ink 48">
@@ -17562,7 +18754,7 @@
               </p14:xfrm>
             </p:contentPart>
           </mc:Choice>
-          <mc:Fallback>
+          <mc:Fallback xmlns="">
             <p:pic>
               <p:nvPicPr>
                 <p:cNvPr id="49" name="Ink 48">
@@ -17593,8 +18785,8 @@
             </p:pic>
           </mc:Fallback>
         </mc:AlternateContent>
-        <mc:AlternateContent xmlns:mc="http://schemas.openxmlformats.org/markup-compatibility/2006">
-          <mc:Choice xmlns:p14="http://schemas.microsoft.com/office/powerpoint/2010/main" Requires="p14">
+        <mc:AlternateContent xmlns:mc="http://schemas.openxmlformats.org/markup-compatibility/2006" xmlns:p14="http://schemas.microsoft.com/office/powerpoint/2010/main">
+          <mc:Choice Requires="p14">
             <p:contentPart p14:bwMode="auto" r:id="rId78">
               <p14:nvContentPartPr>
                 <p14:cNvPr id="51" name="Ink 50">
@@ -17613,7 +18805,7 @@
               </p14:xfrm>
             </p:contentPart>
           </mc:Choice>
-          <mc:Fallback>
+          <mc:Fallback xmlns="">
             <p:pic>
               <p:nvPicPr>
                 <p:cNvPr id="51" name="Ink 50">
@@ -17644,8 +18836,8 @@
             </p:pic>
           </mc:Fallback>
         </mc:AlternateContent>
-        <mc:AlternateContent xmlns:mc="http://schemas.openxmlformats.org/markup-compatibility/2006">
-          <mc:Choice xmlns:p14="http://schemas.microsoft.com/office/powerpoint/2010/main" Requires="p14">
+        <mc:AlternateContent xmlns:mc="http://schemas.openxmlformats.org/markup-compatibility/2006" xmlns:p14="http://schemas.microsoft.com/office/powerpoint/2010/main">
+          <mc:Choice Requires="p14">
             <p:contentPart p14:bwMode="auto" r:id="rId80">
               <p14:nvContentPartPr>
                 <p14:cNvPr id="53" name="Ink 52">
@@ -17664,7 +18856,7 @@
               </p14:xfrm>
             </p:contentPart>
           </mc:Choice>
-          <mc:Fallback>
+          <mc:Fallback xmlns="">
             <p:pic>
               <p:nvPicPr>
                 <p:cNvPr id="53" name="Ink 52">
@@ -17695,8 +18887,8 @@
             </p:pic>
           </mc:Fallback>
         </mc:AlternateContent>
-        <mc:AlternateContent xmlns:mc="http://schemas.openxmlformats.org/markup-compatibility/2006">
-          <mc:Choice xmlns:p14="http://schemas.microsoft.com/office/powerpoint/2010/main" Requires="p14">
+        <mc:AlternateContent xmlns:mc="http://schemas.openxmlformats.org/markup-compatibility/2006" xmlns:p14="http://schemas.microsoft.com/office/powerpoint/2010/main">
+          <mc:Choice Requires="p14">
             <p:contentPart p14:bwMode="auto" r:id="rId82">
               <p14:nvContentPartPr>
                 <p14:cNvPr id="54" name="Ink 53">
@@ -17715,7 +18907,7 @@
               </p14:xfrm>
             </p:contentPart>
           </mc:Choice>
-          <mc:Fallback>
+          <mc:Fallback xmlns="">
             <p:pic>
               <p:nvPicPr>
                 <p:cNvPr id="54" name="Ink 53">
@@ -17746,8 +18938,8 @@
             </p:pic>
           </mc:Fallback>
         </mc:AlternateContent>
-        <mc:AlternateContent xmlns:mc="http://schemas.openxmlformats.org/markup-compatibility/2006">
-          <mc:Choice xmlns:p14="http://schemas.microsoft.com/office/powerpoint/2010/main" Requires="p14">
+        <mc:AlternateContent xmlns:mc="http://schemas.openxmlformats.org/markup-compatibility/2006" xmlns:p14="http://schemas.microsoft.com/office/powerpoint/2010/main">
+          <mc:Choice Requires="p14">
             <p:contentPart p14:bwMode="auto" r:id="rId84">
               <p14:nvContentPartPr>
                 <p14:cNvPr id="55" name="Ink 54">
@@ -17766,7 +18958,7 @@
               </p14:xfrm>
             </p:contentPart>
           </mc:Choice>
-          <mc:Fallback>
+          <mc:Fallback xmlns="">
             <p:pic>
               <p:nvPicPr>
                 <p:cNvPr id="55" name="Ink 54">
@@ -17797,8 +18989,8 @@
             </p:pic>
           </mc:Fallback>
         </mc:AlternateContent>
-        <mc:AlternateContent xmlns:mc="http://schemas.openxmlformats.org/markup-compatibility/2006">
-          <mc:Choice xmlns:p14="http://schemas.microsoft.com/office/powerpoint/2010/main" Requires="p14">
+        <mc:AlternateContent xmlns:mc="http://schemas.openxmlformats.org/markup-compatibility/2006" xmlns:p14="http://schemas.microsoft.com/office/powerpoint/2010/main">
+          <mc:Choice Requires="p14">
             <p:contentPart p14:bwMode="auto" r:id="rId86">
               <p14:nvContentPartPr>
                 <p14:cNvPr id="56" name="Ink 55">
@@ -17817,7 +19009,7 @@
               </p14:xfrm>
             </p:contentPart>
           </mc:Choice>
-          <mc:Fallback>
+          <mc:Fallback xmlns="">
             <p:pic>
               <p:nvPicPr>
                 <p:cNvPr id="56" name="Ink 55">
@@ -17848,8 +19040,8 @@
             </p:pic>
           </mc:Fallback>
         </mc:AlternateContent>
-        <mc:AlternateContent xmlns:mc="http://schemas.openxmlformats.org/markup-compatibility/2006">
-          <mc:Choice xmlns:p14="http://schemas.microsoft.com/office/powerpoint/2010/main" Requires="p14">
+        <mc:AlternateContent xmlns:mc="http://schemas.openxmlformats.org/markup-compatibility/2006" xmlns:p14="http://schemas.microsoft.com/office/powerpoint/2010/main">
+          <mc:Choice Requires="p14">
             <p:contentPart p14:bwMode="auto" r:id="rId88">
               <p14:nvContentPartPr>
                 <p14:cNvPr id="57" name="Ink 56">
@@ -17868,7 +19060,7 @@
               </p14:xfrm>
             </p:contentPart>
           </mc:Choice>
-          <mc:Fallback>
+          <mc:Fallback xmlns="">
             <p:pic>
               <p:nvPicPr>
                 <p:cNvPr id="57" name="Ink 56">
@@ -17899,8 +19091,8 @@
             </p:pic>
           </mc:Fallback>
         </mc:AlternateContent>
-        <mc:AlternateContent xmlns:mc="http://schemas.openxmlformats.org/markup-compatibility/2006">
-          <mc:Choice xmlns:p14="http://schemas.microsoft.com/office/powerpoint/2010/main" Requires="p14">
+        <mc:AlternateContent xmlns:mc="http://schemas.openxmlformats.org/markup-compatibility/2006" xmlns:p14="http://schemas.microsoft.com/office/powerpoint/2010/main">
+          <mc:Choice Requires="p14">
             <p:contentPart p14:bwMode="auto" r:id="rId90">
               <p14:nvContentPartPr>
                 <p14:cNvPr id="58" name="Ink 57">
@@ -17919,7 +19111,7 @@
               </p14:xfrm>
             </p:contentPart>
           </mc:Choice>
-          <mc:Fallback>
+          <mc:Fallback xmlns="">
             <p:pic>
               <p:nvPicPr>
                 <p:cNvPr id="58" name="Ink 57">
@@ -17950,8 +19142,8 @@
             </p:pic>
           </mc:Fallback>
         </mc:AlternateContent>
-        <mc:AlternateContent xmlns:mc="http://schemas.openxmlformats.org/markup-compatibility/2006">
-          <mc:Choice xmlns:p14="http://schemas.microsoft.com/office/powerpoint/2010/main" Requires="p14">
+        <mc:AlternateContent xmlns:mc="http://schemas.openxmlformats.org/markup-compatibility/2006" xmlns:p14="http://schemas.microsoft.com/office/powerpoint/2010/main">
+          <mc:Choice Requires="p14">
             <p:contentPart p14:bwMode="auto" r:id="rId92">
               <p14:nvContentPartPr>
                 <p14:cNvPr id="59" name="Ink 58">
@@ -17970,7 +19162,7 @@
               </p14:xfrm>
             </p:contentPart>
           </mc:Choice>
-          <mc:Fallback>
+          <mc:Fallback xmlns="">
             <p:pic>
               <p:nvPicPr>
                 <p:cNvPr id="59" name="Ink 58">
@@ -18001,8 +19193,8 @@
             </p:pic>
           </mc:Fallback>
         </mc:AlternateContent>
-        <mc:AlternateContent xmlns:mc="http://schemas.openxmlformats.org/markup-compatibility/2006">
-          <mc:Choice xmlns:p14="http://schemas.microsoft.com/office/powerpoint/2010/main" Requires="p14">
+        <mc:AlternateContent xmlns:mc="http://schemas.openxmlformats.org/markup-compatibility/2006" xmlns:p14="http://schemas.microsoft.com/office/powerpoint/2010/main">
+          <mc:Choice Requires="p14">
             <p:contentPart p14:bwMode="auto" r:id="rId94">
               <p14:nvContentPartPr>
                 <p14:cNvPr id="60" name="Ink 59">
@@ -18021,7 +19213,7 @@
               </p14:xfrm>
             </p:contentPart>
           </mc:Choice>
-          <mc:Fallback>
+          <mc:Fallback xmlns="">
             <p:pic>
               <p:nvPicPr>
                 <p:cNvPr id="60" name="Ink 59">
@@ -18052,8 +19244,8 @@
             </p:pic>
           </mc:Fallback>
         </mc:AlternateContent>
-        <mc:AlternateContent xmlns:mc="http://schemas.openxmlformats.org/markup-compatibility/2006">
-          <mc:Choice xmlns:p14="http://schemas.microsoft.com/office/powerpoint/2010/main" Requires="p14">
+        <mc:AlternateContent xmlns:mc="http://schemas.openxmlformats.org/markup-compatibility/2006" xmlns:p14="http://schemas.microsoft.com/office/powerpoint/2010/main">
+          <mc:Choice Requires="p14">
             <p:contentPart p14:bwMode="auto" r:id="rId96">
               <p14:nvContentPartPr>
                 <p14:cNvPr id="61" name="Ink 60">
@@ -18072,7 +19264,7 @@
               </p14:xfrm>
             </p:contentPart>
           </mc:Choice>
-          <mc:Fallback>
+          <mc:Fallback xmlns="">
             <p:pic>
               <p:nvPicPr>
                 <p:cNvPr id="61" name="Ink 60">
@@ -18103,8 +19295,8 @@
             </p:pic>
           </mc:Fallback>
         </mc:AlternateContent>
-        <mc:AlternateContent xmlns:mc="http://schemas.openxmlformats.org/markup-compatibility/2006">
-          <mc:Choice xmlns:p14="http://schemas.microsoft.com/office/powerpoint/2010/main" Requires="p14">
+        <mc:AlternateContent xmlns:mc="http://schemas.openxmlformats.org/markup-compatibility/2006" xmlns:p14="http://schemas.microsoft.com/office/powerpoint/2010/main">
+          <mc:Choice Requires="p14">
             <p:contentPart p14:bwMode="auto" r:id="rId98">
               <p14:nvContentPartPr>
                 <p14:cNvPr id="63" name="Ink 62">
@@ -18123,7 +19315,7 @@
               </p14:xfrm>
             </p:contentPart>
           </mc:Choice>
-          <mc:Fallback>
+          <mc:Fallback xmlns="">
             <p:pic>
               <p:nvPicPr>
                 <p:cNvPr id="63" name="Ink 62">
@@ -18175,8 +19367,8 @@
             <a:chExt cx="906480" cy="1553760"/>
           </a:xfrm>
         </p:grpSpPr>
-        <mc:AlternateContent xmlns:mc="http://schemas.openxmlformats.org/markup-compatibility/2006">
-          <mc:Choice xmlns:p14="http://schemas.microsoft.com/office/powerpoint/2010/main" Requires="p14">
+        <mc:AlternateContent xmlns:mc="http://schemas.openxmlformats.org/markup-compatibility/2006" xmlns:p14="http://schemas.microsoft.com/office/powerpoint/2010/main">
+          <mc:Choice Requires="p14">
             <p:contentPart p14:bwMode="auto" r:id="rId100">
               <p14:nvContentPartPr>
                 <p14:cNvPr id="65" name="Ink 64">
@@ -18195,7 +19387,7 @@
               </p14:xfrm>
             </p:contentPart>
           </mc:Choice>
-          <mc:Fallback>
+          <mc:Fallback xmlns="">
             <p:pic>
               <p:nvPicPr>
                 <p:cNvPr id="65" name="Ink 64">
@@ -18226,8 +19418,8 @@
             </p:pic>
           </mc:Fallback>
         </mc:AlternateContent>
-        <mc:AlternateContent xmlns:mc="http://schemas.openxmlformats.org/markup-compatibility/2006">
-          <mc:Choice xmlns:p14="http://schemas.microsoft.com/office/powerpoint/2010/main" Requires="p14">
+        <mc:AlternateContent xmlns:mc="http://schemas.openxmlformats.org/markup-compatibility/2006" xmlns:p14="http://schemas.microsoft.com/office/powerpoint/2010/main">
+          <mc:Choice Requires="p14">
             <p:contentPart p14:bwMode="auto" r:id="rId102">
               <p14:nvContentPartPr>
                 <p14:cNvPr id="66" name="Ink 65">
@@ -18246,7 +19438,7 @@
               </p14:xfrm>
             </p:contentPart>
           </mc:Choice>
-          <mc:Fallback>
+          <mc:Fallback xmlns="">
             <p:pic>
               <p:nvPicPr>
                 <p:cNvPr id="66" name="Ink 65">
@@ -18298,8 +19490,8 @@
             <a:chExt cx="3557160" cy="1692360"/>
           </a:xfrm>
         </p:grpSpPr>
-        <mc:AlternateContent xmlns:mc="http://schemas.openxmlformats.org/markup-compatibility/2006">
-          <mc:Choice xmlns:p14="http://schemas.microsoft.com/office/powerpoint/2010/main" Requires="p14">
+        <mc:AlternateContent xmlns:mc="http://schemas.openxmlformats.org/markup-compatibility/2006" xmlns:p14="http://schemas.microsoft.com/office/powerpoint/2010/main">
+          <mc:Choice Requires="p14">
             <p:contentPart p14:bwMode="auto" r:id="rId104">
               <p14:nvContentPartPr>
                 <p14:cNvPr id="71" name="Ink 70">
@@ -18318,7 +19510,7 @@
               </p14:xfrm>
             </p:contentPart>
           </mc:Choice>
-          <mc:Fallback>
+          <mc:Fallback xmlns="">
             <p:pic>
               <p:nvPicPr>
                 <p:cNvPr id="71" name="Ink 70">
@@ -18349,8 +19541,8 @@
             </p:pic>
           </mc:Fallback>
         </mc:AlternateContent>
-        <mc:AlternateContent xmlns:mc="http://schemas.openxmlformats.org/markup-compatibility/2006">
-          <mc:Choice xmlns:p14="http://schemas.microsoft.com/office/powerpoint/2010/main" Requires="p14">
+        <mc:AlternateContent xmlns:mc="http://schemas.openxmlformats.org/markup-compatibility/2006" xmlns:p14="http://schemas.microsoft.com/office/powerpoint/2010/main">
+          <mc:Choice Requires="p14">
             <p:contentPart p14:bwMode="auto" r:id="rId106">
               <p14:nvContentPartPr>
                 <p14:cNvPr id="72" name="Ink 71">
@@ -18369,7 +19561,7 @@
               </p14:xfrm>
             </p:contentPart>
           </mc:Choice>
-          <mc:Fallback>
+          <mc:Fallback xmlns="">
             <p:pic>
               <p:nvPicPr>
                 <p:cNvPr id="72" name="Ink 71">
@@ -18401,8 +19593,8 @@
           </mc:Fallback>
         </mc:AlternateContent>
       </p:grpSp>
-      <mc:AlternateContent xmlns:mc="http://schemas.openxmlformats.org/markup-compatibility/2006">
-        <mc:Choice xmlns:p14="http://schemas.microsoft.com/office/powerpoint/2010/main" Requires="p14">
+      <mc:AlternateContent xmlns:mc="http://schemas.openxmlformats.org/markup-compatibility/2006" xmlns:p14="http://schemas.microsoft.com/office/powerpoint/2010/main">
+        <mc:Choice Requires="p14">
           <p:contentPart p14:bwMode="auto" r:id="rId108">
             <p14:nvContentPartPr>
               <p14:cNvPr id="74" name="Ink 73">
@@ -18421,7 +19613,7 @@
             </p14:xfrm>
           </p:contentPart>
         </mc:Choice>
-        <mc:Fallback>
+        <mc:Fallback xmlns="">
           <p:pic>
             <p:nvPicPr>
               <p:cNvPr id="74" name="Ink 73">
@@ -18452,8 +19644,8 @@
           </p:pic>
         </mc:Fallback>
       </mc:AlternateContent>
-      <mc:AlternateContent xmlns:mc="http://schemas.openxmlformats.org/markup-compatibility/2006">
-        <mc:Choice xmlns:p14="http://schemas.microsoft.com/office/powerpoint/2010/main" Requires="p14">
+      <mc:AlternateContent xmlns:mc="http://schemas.openxmlformats.org/markup-compatibility/2006" xmlns:p14="http://schemas.microsoft.com/office/powerpoint/2010/main">
+        <mc:Choice Requires="p14">
           <p:contentPart p14:bwMode="auto" r:id="rId110">
             <p14:nvContentPartPr>
               <p14:cNvPr id="76" name="Ink 75">
@@ -18472,7 +19664,7 @@
             </p14:xfrm>
           </p:contentPart>
         </mc:Choice>
-        <mc:Fallback>
+        <mc:Fallback xmlns="">
           <p:pic>
             <p:nvPicPr>
               <p:cNvPr id="76" name="Ink 75">
@@ -18523,8 +19715,8 @@
             <a:chExt cx="1578240" cy="579960"/>
           </a:xfrm>
         </p:grpSpPr>
-        <mc:AlternateContent xmlns:mc="http://schemas.openxmlformats.org/markup-compatibility/2006">
-          <mc:Choice xmlns:p14="http://schemas.microsoft.com/office/powerpoint/2010/main" Requires="p14">
+        <mc:AlternateContent xmlns:mc="http://schemas.openxmlformats.org/markup-compatibility/2006" xmlns:p14="http://schemas.microsoft.com/office/powerpoint/2010/main">
+          <mc:Choice Requires="p14">
             <p:contentPart p14:bwMode="auto" r:id="rId112">
               <p14:nvContentPartPr>
                 <p14:cNvPr id="78" name="Ink 77">
@@ -18543,7 +19735,7 @@
               </p14:xfrm>
             </p:contentPart>
           </mc:Choice>
-          <mc:Fallback>
+          <mc:Fallback xmlns="">
             <p:pic>
               <p:nvPicPr>
                 <p:cNvPr id="78" name="Ink 77">
@@ -18574,8 +19766,8 @@
             </p:pic>
           </mc:Fallback>
         </mc:AlternateContent>
-        <mc:AlternateContent xmlns:mc="http://schemas.openxmlformats.org/markup-compatibility/2006">
-          <mc:Choice xmlns:p14="http://schemas.microsoft.com/office/powerpoint/2010/main" Requires="p14">
+        <mc:AlternateContent xmlns:mc="http://schemas.openxmlformats.org/markup-compatibility/2006" xmlns:p14="http://schemas.microsoft.com/office/powerpoint/2010/main">
+          <mc:Choice Requires="p14">
             <p:contentPart p14:bwMode="auto" r:id="rId114">
               <p14:nvContentPartPr>
                 <p14:cNvPr id="79" name="Ink 78">
@@ -18594,7 +19786,7 @@
               </p14:xfrm>
             </p:contentPart>
           </mc:Choice>
-          <mc:Fallback>
+          <mc:Fallback xmlns="">
             <p:pic>
               <p:nvPicPr>
                 <p:cNvPr id="79" name="Ink 78">
@@ -18625,8 +19817,8 @@
             </p:pic>
           </mc:Fallback>
         </mc:AlternateContent>
-        <mc:AlternateContent xmlns:mc="http://schemas.openxmlformats.org/markup-compatibility/2006">
-          <mc:Choice xmlns:p14="http://schemas.microsoft.com/office/powerpoint/2010/main" Requires="p14">
+        <mc:AlternateContent xmlns:mc="http://schemas.openxmlformats.org/markup-compatibility/2006" xmlns:p14="http://schemas.microsoft.com/office/powerpoint/2010/main">
+          <mc:Choice Requires="p14">
             <p:contentPart p14:bwMode="auto" r:id="rId116">
               <p14:nvContentPartPr>
                 <p14:cNvPr id="80" name="Ink 79">
@@ -18645,7 +19837,7 @@
               </p14:xfrm>
             </p:contentPart>
           </mc:Choice>
-          <mc:Fallback>
+          <mc:Fallback xmlns="">
             <p:pic>
               <p:nvPicPr>
                 <p:cNvPr id="80" name="Ink 79">
@@ -18676,8 +19868,8 @@
             </p:pic>
           </mc:Fallback>
         </mc:AlternateContent>
-        <mc:AlternateContent xmlns:mc="http://schemas.openxmlformats.org/markup-compatibility/2006">
-          <mc:Choice xmlns:p14="http://schemas.microsoft.com/office/powerpoint/2010/main" Requires="p14">
+        <mc:AlternateContent xmlns:mc="http://schemas.openxmlformats.org/markup-compatibility/2006" xmlns:p14="http://schemas.microsoft.com/office/powerpoint/2010/main">
+          <mc:Choice Requires="p14">
             <p:contentPart p14:bwMode="auto" r:id="rId118">
               <p14:nvContentPartPr>
                 <p14:cNvPr id="81" name="Ink 80">
@@ -18696,7 +19888,7 @@
               </p14:xfrm>
             </p:contentPart>
           </mc:Choice>
-          <mc:Fallback>
+          <mc:Fallback xmlns="">
             <p:pic>
               <p:nvPicPr>
                 <p:cNvPr id="81" name="Ink 80">
@@ -18748,8 +19940,8 @@
             <a:chExt cx="2059560" cy="1547640"/>
           </a:xfrm>
         </p:grpSpPr>
-        <mc:AlternateContent xmlns:mc="http://schemas.openxmlformats.org/markup-compatibility/2006">
-          <mc:Choice xmlns:p14="http://schemas.microsoft.com/office/powerpoint/2010/main" Requires="p14">
+        <mc:AlternateContent xmlns:mc="http://schemas.openxmlformats.org/markup-compatibility/2006" xmlns:p14="http://schemas.microsoft.com/office/powerpoint/2010/main">
+          <mc:Choice Requires="p14">
             <p:contentPart p14:bwMode="auto" r:id="rId120">
               <p14:nvContentPartPr>
                 <p14:cNvPr id="68" name="Ink 67">
@@ -18768,7 +19960,7 @@
               </p14:xfrm>
             </p:contentPart>
           </mc:Choice>
-          <mc:Fallback>
+          <mc:Fallback xmlns="">
             <p:pic>
               <p:nvPicPr>
                 <p:cNvPr id="68" name="Ink 67">
@@ -18799,8 +19991,8 @@
             </p:pic>
           </mc:Fallback>
         </mc:AlternateContent>
-        <mc:AlternateContent xmlns:mc="http://schemas.openxmlformats.org/markup-compatibility/2006">
-          <mc:Choice xmlns:p14="http://schemas.microsoft.com/office/powerpoint/2010/main" Requires="p14">
+        <mc:AlternateContent xmlns:mc="http://schemas.openxmlformats.org/markup-compatibility/2006" xmlns:p14="http://schemas.microsoft.com/office/powerpoint/2010/main">
+          <mc:Choice Requires="p14">
             <p:contentPart p14:bwMode="auto" r:id="rId122">
               <p14:nvContentPartPr>
                 <p14:cNvPr id="69" name="Ink 68">
@@ -18819,7 +20011,7 @@
               </p14:xfrm>
             </p:contentPart>
           </mc:Choice>
-          <mc:Fallback>
+          <mc:Fallback xmlns="">
             <p:pic>
               <p:nvPicPr>
                 <p:cNvPr id="69" name="Ink 68">
@@ -18850,8 +20042,8 @@
             </p:pic>
           </mc:Fallback>
         </mc:AlternateContent>
-        <mc:AlternateContent xmlns:mc="http://schemas.openxmlformats.org/markup-compatibility/2006">
-          <mc:Choice xmlns:p14="http://schemas.microsoft.com/office/powerpoint/2010/main" Requires="p14">
+        <mc:AlternateContent xmlns:mc="http://schemas.openxmlformats.org/markup-compatibility/2006" xmlns:p14="http://schemas.microsoft.com/office/powerpoint/2010/main">
+          <mc:Choice Requires="p14">
             <p:contentPart p14:bwMode="auto" r:id="rId124">
               <p14:nvContentPartPr>
                 <p14:cNvPr id="83" name="Ink 82">
@@ -18870,7 +20062,7 @@
               </p14:xfrm>
             </p:contentPart>
           </mc:Choice>
-          <mc:Fallback>
+          <mc:Fallback xmlns="">
             <p:pic>
               <p:nvPicPr>
                 <p:cNvPr id="83" name="Ink 82">
@@ -18901,8 +20093,8 @@
             </p:pic>
           </mc:Fallback>
         </mc:AlternateContent>
-        <mc:AlternateContent xmlns:mc="http://schemas.openxmlformats.org/markup-compatibility/2006">
-          <mc:Choice xmlns:p14="http://schemas.microsoft.com/office/powerpoint/2010/main" Requires="p14">
+        <mc:AlternateContent xmlns:mc="http://schemas.openxmlformats.org/markup-compatibility/2006" xmlns:p14="http://schemas.microsoft.com/office/powerpoint/2010/main">
+          <mc:Choice Requires="p14">
             <p:contentPart p14:bwMode="auto" r:id="rId126">
               <p14:nvContentPartPr>
                 <p14:cNvPr id="84" name="Ink 83">
@@ -18921,7 +20113,7 @@
               </p14:xfrm>
             </p:contentPart>
           </mc:Choice>
-          <mc:Fallback>
+          <mc:Fallback xmlns="">
             <p:pic>
               <p:nvPicPr>
                 <p:cNvPr id="84" name="Ink 83">
@@ -18952,8 +20144,8 @@
             </p:pic>
           </mc:Fallback>
         </mc:AlternateContent>
-        <mc:AlternateContent xmlns:mc="http://schemas.openxmlformats.org/markup-compatibility/2006">
-          <mc:Choice xmlns:p14="http://schemas.microsoft.com/office/powerpoint/2010/main" Requires="p14">
+        <mc:AlternateContent xmlns:mc="http://schemas.openxmlformats.org/markup-compatibility/2006" xmlns:p14="http://schemas.microsoft.com/office/powerpoint/2010/main">
+          <mc:Choice Requires="p14">
             <p:contentPart p14:bwMode="auto" r:id="rId128">
               <p14:nvContentPartPr>
                 <p14:cNvPr id="86" name="Ink 85">
@@ -18972,7 +20164,7 @@
               </p14:xfrm>
             </p:contentPart>
           </mc:Choice>
-          <mc:Fallback>
+          <mc:Fallback xmlns="">
             <p:pic>
               <p:nvPicPr>
                 <p:cNvPr id="86" name="Ink 85">
@@ -19003,8 +20195,8 @@
             </p:pic>
           </mc:Fallback>
         </mc:AlternateContent>
-        <mc:AlternateContent xmlns:mc="http://schemas.openxmlformats.org/markup-compatibility/2006">
-          <mc:Choice xmlns:p14="http://schemas.microsoft.com/office/powerpoint/2010/main" Requires="p14">
+        <mc:AlternateContent xmlns:mc="http://schemas.openxmlformats.org/markup-compatibility/2006" xmlns:p14="http://schemas.microsoft.com/office/powerpoint/2010/main">
+          <mc:Choice Requires="p14">
             <p:contentPart p14:bwMode="auto" r:id="rId130">
               <p14:nvContentPartPr>
                 <p14:cNvPr id="87" name="Ink 86">
@@ -19023,7 +20215,7 @@
               </p14:xfrm>
             </p:contentPart>
           </mc:Choice>
-          <mc:Fallback>
+          <mc:Fallback xmlns="">
             <p:pic>
               <p:nvPicPr>
                 <p:cNvPr id="87" name="Ink 86">
@@ -19054,8 +20246,8 @@
             </p:pic>
           </mc:Fallback>
         </mc:AlternateContent>
-        <mc:AlternateContent xmlns:mc="http://schemas.openxmlformats.org/markup-compatibility/2006">
-          <mc:Choice xmlns:p14="http://schemas.microsoft.com/office/powerpoint/2010/main" Requires="p14">
+        <mc:AlternateContent xmlns:mc="http://schemas.openxmlformats.org/markup-compatibility/2006" xmlns:p14="http://schemas.microsoft.com/office/powerpoint/2010/main">
+          <mc:Choice Requires="p14">
             <p:contentPart p14:bwMode="auto" r:id="rId132">
               <p14:nvContentPartPr>
                 <p14:cNvPr id="88" name="Ink 87">
@@ -19074,7 +20266,7 @@
               </p14:xfrm>
             </p:contentPart>
           </mc:Choice>
-          <mc:Fallback>
+          <mc:Fallback xmlns="">
             <p:pic>
               <p:nvPicPr>
                 <p:cNvPr id="88" name="Ink 87">
@@ -19105,8 +20297,8 @@
             </p:pic>
           </mc:Fallback>
         </mc:AlternateContent>
-        <mc:AlternateContent xmlns:mc="http://schemas.openxmlformats.org/markup-compatibility/2006">
-          <mc:Choice xmlns:p14="http://schemas.microsoft.com/office/powerpoint/2010/main" Requires="p14">
+        <mc:AlternateContent xmlns:mc="http://schemas.openxmlformats.org/markup-compatibility/2006" xmlns:p14="http://schemas.microsoft.com/office/powerpoint/2010/main">
+          <mc:Choice Requires="p14">
             <p:contentPart p14:bwMode="auto" r:id="rId134">
               <p14:nvContentPartPr>
                 <p14:cNvPr id="89" name="Ink 88">
@@ -19125,7 +20317,7 @@
               </p14:xfrm>
             </p:contentPart>
           </mc:Choice>
-          <mc:Fallback>
+          <mc:Fallback xmlns="">
             <p:pic>
               <p:nvPicPr>
                 <p:cNvPr id="89" name="Ink 88">
@@ -19156,8 +20348,8 @@
             </p:pic>
           </mc:Fallback>
         </mc:AlternateContent>
-        <mc:AlternateContent xmlns:mc="http://schemas.openxmlformats.org/markup-compatibility/2006">
-          <mc:Choice xmlns:p14="http://schemas.microsoft.com/office/powerpoint/2010/main" Requires="p14">
+        <mc:AlternateContent xmlns:mc="http://schemas.openxmlformats.org/markup-compatibility/2006" xmlns:p14="http://schemas.microsoft.com/office/powerpoint/2010/main">
+          <mc:Choice Requires="p14">
             <p:contentPart p14:bwMode="auto" r:id="rId136">
               <p14:nvContentPartPr>
                 <p14:cNvPr id="90" name="Ink 89">
@@ -19176,7 +20368,7 @@
               </p14:xfrm>
             </p:contentPart>
           </mc:Choice>
-          <mc:Fallback>
+          <mc:Fallback xmlns="">
             <p:pic>
               <p:nvPicPr>
                 <p:cNvPr id="90" name="Ink 89">
@@ -19207,8 +20399,8 @@
             </p:pic>
           </mc:Fallback>
         </mc:AlternateContent>
-        <mc:AlternateContent xmlns:mc="http://schemas.openxmlformats.org/markup-compatibility/2006">
-          <mc:Choice xmlns:p14="http://schemas.microsoft.com/office/powerpoint/2010/main" Requires="p14">
+        <mc:AlternateContent xmlns:mc="http://schemas.openxmlformats.org/markup-compatibility/2006" xmlns:p14="http://schemas.microsoft.com/office/powerpoint/2010/main">
+          <mc:Choice Requires="p14">
             <p:contentPart p14:bwMode="auto" r:id="rId138">
               <p14:nvContentPartPr>
                 <p14:cNvPr id="92" name="Ink 91">
@@ -19227,7 +20419,7 @@
               </p14:xfrm>
             </p:contentPart>
           </mc:Choice>
-          <mc:Fallback>
+          <mc:Fallback xmlns="">
             <p:pic>
               <p:nvPicPr>
                 <p:cNvPr id="92" name="Ink 91">
@@ -19258,8 +20450,8 @@
             </p:pic>
           </mc:Fallback>
         </mc:AlternateContent>
-        <mc:AlternateContent xmlns:mc="http://schemas.openxmlformats.org/markup-compatibility/2006">
-          <mc:Choice xmlns:p14="http://schemas.microsoft.com/office/powerpoint/2010/main" Requires="p14">
+        <mc:AlternateContent xmlns:mc="http://schemas.openxmlformats.org/markup-compatibility/2006" xmlns:p14="http://schemas.microsoft.com/office/powerpoint/2010/main">
+          <mc:Choice Requires="p14">
             <p:contentPart p14:bwMode="auto" r:id="rId140">
               <p14:nvContentPartPr>
                 <p14:cNvPr id="93" name="Ink 92">
@@ -19278,7 +20470,7 @@
               </p14:xfrm>
             </p:contentPart>
           </mc:Choice>
-          <mc:Fallback>
+          <mc:Fallback xmlns="">
             <p:pic>
               <p:nvPicPr>
                 <p:cNvPr id="93" name="Ink 92">
@@ -19310,8 +20502,8 @@
           </mc:Fallback>
         </mc:AlternateContent>
       </p:grpSp>
-      <mc:AlternateContent xmlns:mc="http://schemas.openxmlformats.org/markup-compatibility/2006">
-        <mc:Choice xmlns:p14="http://schemas.microsoft.com/office/powerpoint/2010/main" xmlns:aink="http://schemas.microsoft.com/office/drawing/2016/ink" Requires="p14 aink">
+      <mc:AlternateContent xmlns:mc="http://schemas.openxmlformats.org/markup-compatibility/2006" xmlns:p14="http://schemas.microsoft.com/office/powerpoint/2010/main" xmlns:aink="http://schemas.microsoft.com/office/drawing/2016/ink">
+        <mc:Choice Requires="p14 aink">
           <p:contentPart p14:bwMode="auto" r:id="rId142">
             <p14:nvContentPartPr>
               <p14:cNvPr id="95" name="Ink 94">
@@ -19330,7 +20522,7 @@
             </p14:xfrm>
           </p:contentPart>
         </mc:Choice>
-        <mc:Fallback>
+        <mc:Fallback xmlns="">
           <p:pic>
             <p:nvPicPr>
               <p:cNvPr id="95" name="Ink 94">
@@ -19361,8 +20553,8 @@
           </p:pic>
         </mc:Fallback>
       </mc:AlternateContent>
-      <mc:AlternateContent xmlns:mc="http://schemas.openxmlformats.org/markup-compatibility/2006">
-        <mc:Choice xmlns:p14="http://schemas.microsoft.com/office/powerpoint/2010/main" Requires="p14">
+      <mc:AlternateContent xmlns:mc="http://schemas.openxmlformats.org/markup-compatibility/2006" xmlns:p14="http://schemas.microsoft.com/office/powerpoint/2010/main">
+        <mc:Choice Requires="p14">
           <p:contentPart p14:bwMode="auto" r:id="rId144">
             <p14:nvContentPartPr>
               <p14:cNvPr id="96" name="Ink 95">
@@ -19381,7 +20573,7 @@
             </p14:xfrm>
           </p:contentPart>
         </mc:Choice>
-        <mc:Fallback>
+        <mc:Fallback xmlns="">
           <p:pic>
             <p:nvPicPr>
               <p:cNvPr id="96" name="Ink 95">
@@ -19412,8 +20604,8 @@
           </p:pic>
         </mc:Fallback>
       </mc:AlternateContent>
-      <mc:AlternateContent xmlns:mc="http://schemas.openxmlformats.org/markup-compatibility/2006">
-        <mc:Choice xmlns:p14="http://schemas.microsoft.com/office/powerpoint/2010/main" Requires="p14">
+      <mc:AlternateContent xmlns:mc="http://schemas.openxmlformats.org/markup-compatibility/2006" xmlns:p14="http://schemas.microsoft.com/office/powerpoint/2010/main">
+        <mc:Choice Requires="p14">
           <p:contentPart p14:bwMode="auto" r:id="rId146">
             <p14:nvContentPartPr>
               <p14:cNvPr id="97" name="Ink 96">
@@ -19432,7 +20624,7 @@
             </p14:xfrm>
           </p:contentPart>
         </mc:Choice>
-        <mc:Fallback>
+        <mc:Fallback xmlns="">
           <p:pic>
             <p:nvPicPr>
               <p:cNvPr id="97" name="Ink 96">
@@ -19463,8 +20655,8 @@
           </p:pic>
         </mc:Fallback>
       </mc:AlternateContent>
-      <mc:AlternateContent xmlns:mc="http://schemas.openxmlformats.org/markup-compatibility/2006">
-        <mc:Choice xmlns:p14="http://schemas.microsoft.com/office/powerpoint/2010/main" Requires="p14">
+      <mc:AlternateContent xmlns:mc="http://schemas.openxmlformats.org/markup-compatibility/2006" xmlns:p14="http://schemas.microsoft.com/office/powerpoint/2010/main">
+        <mc:Choice Requires="p14">
           <p:contentPart p14:bwMode="auto" r:id="rId148">
             <p14:nvContentPartPr>
               <p14:cNvPr id="98" name="Ink 97">
@@ -19483,7 +20675,7 @@
             </p14:xfrm>
           </p:contentPart>
         </mc:Choice>
-        <mc:Fallback>
+        <mc:Fallback xmlns="">
           <p:pic>
             <p:nvPicPr>
               <p:cNvPr id="98" name="Ink 97">
@@ -19514,8 +20706,8 @@
           </p:pic>
         </mc:Fallback>
       </mc:AlternateContent>
-      <mc:AlternateContent xmlns:mc="http://schemas.openxmlformats.org/markup-compatibility/2006">
-        <mc:Choice xmlns:p14="http://schemas.microsoft.com/office/powerpoint/2010/main" Requires="p14">
+      <mc:AlternateContent xmlns:mc="http://schemas.openxmlformats.org/markup-compatibility/2006" xmlns:p14="http://schemas.microsoft.com/office/powerpoint/2010/main">
+        <mc:Choice Requires="p14">
           <p:contentPart p14:bwMode="auto" r:id="rId150">
             <p14:nvContentPartPr>
               <p14:cNvPr id="99" name="Ink 98">
@@ -19534,7 +20726,7 @@
             </p14:xfrm>
           </p:contentPart>
         </mc:Choice>
-        <mc:Fallback>
+        <mc:Fallback xmlns="">
           <p:pic>
             <p:nvPicPr>
               <p:cNvPr id="99" name="Ink 98">
@@ -19585,8 +20777,8 @@
             <a:chExt cx="2881440" cy="499680"/>
           </a:xfrm>
         </p:grpSpPr>
-        <mc:AlternateContent xmlns:mc="http://schemas.openxmlformats.org/markup-compatibility/2006">
-          <mc:Choice xmlns:p14="http://schemas.microsoft.com/office/powerpoint/2010/main" Requires="p14">
+        <mc:AlternateContent xmlns:mc="http://schemas.openxmlformats.org/markup-compatibility/2006" xmlns:p14="http://schemas.microsoft.com/office/powerpoint/2010/main">
+          <mc:Choice Requires="p14">
             <p:contentPart p14:bwMode="auto" r:id="rId152">
               <p14:nvContentPartPr>
                 <p14:cNvPr id="100" name="Ink 99">
@@ -19605,7 +20797,7 @@
               </p14:xfrm>
             </p:contentPart>
           </mc:Choice>
-          <mc:Fallback>
+          <mc:Fallback xmlns="">
             <p:pic>
               <p:nvPicPr>
                 <p:cNvPr id="100" name="Ink 99">
@@ -19636,8 +20828,8 @@
             </p:pic>
           </mc:Fallback>
         </mc:AlternateContent>
-        <mc:AlternateContent xmlns:mc="http://schemas.openxmlformats.org/markup-compatibility/2006">
-          <mc:Choice xmlns:p14="http://schemas.microsoft.com/office/powerpoint/2010/main" Requires="p14">
+        <mc:AlternateContent xmlns:mc="http://schemas.openxmlformats.org/markup-compatibility/2006" xmlns:p14="http://schemas.microsoft.com/office/powerpoint/2010/main">
+          <mc:Choice Requires="p14">
             <p:contentPart p14:bwMode="auto" r:id="rId154">
               <p14:nvContentPartPr>
                 <p14:cNvPr id="101" name="Ink 100">
@@ -19656,7 +20848,7 @@
               </p14:xfrm>
             </p:contentPart>
           </mc:Choice>
-          <mc:Fallback>
+          <mc:Fallback xmlns="">
             <p:pic>
               <p:nvPicPr>
                 <p:cNvPr id="101" name="Ink 100">
@@ -19687,8 +20879,8 @@
             </p:pic>
           </mc:Fallback>
         </mc:AlternateContent>
-        <mc:AlternateContent xmlns:mc="http://schemas.openxmlformats.org/markup-compatibility/2006">
-          <mc:Choice xmlns:p14="http://schemas.microsoft.com/office/powerpoint/2010/main" Requires="p14">
+        <mc:AlternateContent xmlns:mc="http://schemas.openxmlformats.org/markup-compatibility/2006" xmlns:p14="http://schemas.microsoft.com/office/powerpoint/2010/main">
+          <mc:Choice Requires="p14">
             <p:contentPart p14:bwMode="auto" r:id="rId156">
               <p14:nvContentPartPr>
                 <p14:cNvPr id="102" name="Ink 101">
@@ -19707,7 +20899,7 @@
               </p14:xfrm>
             </p:contentPart>
           </mc:Choice>
-          <mc:Fallback>
+          <mc:Fallback xmlns="">
             <p:pic>
               <p:nvPicPr>
                 <p:cNvPr id="102" name="Ink 101">
@@ -19738,8 +20930,8 @@
             </p:pic>
           </mc:Fallback>
         </mc:AlternateContent>
-        <mc:AlternateContent xmlns:mc="http://schemas.openxmlformats.org/markup-compatibility/2006">
-          <mc:Choice xmlns:p14="http://schemas.microsoft.com/office/powerpoint/2010/main" Requires="p14">
+        <mc:AlternateContent xmlns:mc="http://schemas.openxmlformats.org/markup-compatibility/2006" xmlns:p14="http://schemas.microsoft.com/office/powerpoint/2010/main">
+          <mc:Choice Requires="p14">
             <p:contentPart p14:bwMode="auto" r:id="rId158">
               <p14:nvContentPartPr>
                 <p14:cNvPr id="103" name="Ink 102">
@@ -19758,7 +20950,7 @@
               </p14:xfrm>
             </p:contentPart>
           </mc:Choice>
-          <mc:Fallback>
+          <mc:Fallback xmlns="">
             <p:pic>
               <p:nvPicPr>
                 <p:cNvPr id="103" name="Ink 102">
@@ -19789,8 +20981,8 @@
             </p:pic>
           </mc:Fallback>
         </mc:AlternateContent>
-        <mc:AlternateContent xmlns:mc="http://schemas.openxmlformats.org/markup-compatibility/2006">
-          <mc:Choice xmlns:p14="http://schemas.microsoft.com/office/powerpoint/2010/main" Requires="p14">
+        <mc:AlternateContent xmlns:mc="http://schemas.openxmlformats.org/markup-compatibility/2006" xmlns:p14="http://schemas.microsoft.com/office/powerpoint/2010/main">
+          <mc:Choice Requires="p14">
             <p:contentPart p14:bwMode="auto" r:id="rId160">
               <p14:nvContentPartPr>
                 <p14:cNvPr id="104" name="Ink 103">
@@ -19809,7 +21001,7 @@
               </p14:xfrm>
             </p:contentPart>
           </mc:Choice>
-          <mc:Fallback>
+          <mc:Fallback xmlns="">
             <p:pic>
               <p:nvPicPr>
                 <p:cNvPr id="104" name="Ink 103">
@@ -19840,8 +21032,8 @@
             </p:pic>
           </mc:Fallback>
         </mc:AlternateContent>
-        <mc:AlternateContent xmlns:mc="http://schemas.openxmlformats.org/markup-compatibility/2006">
-          <mc:Choice xmlns:p14="http://schemas.microsoft.com/office/powerpoint/2010/main" Requires="p14">
+        <mc:AlternateContent xmlns:mc="http://schemas.openxmlformats.org/markup-compatibility/2006" xmlns:p14="http://schemas.microsoft.com/office/powerpoint/2010/main">
+          <mc:Choice Requires="p14">
             <p:contentPart p14:bwMode="auto" r:id="rId162">
               <p14:nvContentPartPr>
                 <p14:cNvPr id="105" name="Ink 104">
@@ -19860,7 +21052,7 @@
               </p14:xfrm>
             </p:contentPart>
           </mc:Choice>
-          <mc:Fallback>
+          <mc:Fallback xmlns="">
             <p:pic>
               <p:nvPicPr>
                 <p:cNvPr id="105" name="Ink 104">
@@ -19891,8 +21083,8 @@
             </p:pic>
           </mc:Fallback>
         </mc:AlternateContent>
-        <mc:AlternateContent xmlns:mc="http://schemas.openxmlformats.org/markup-compatibility/2006">
-          <mc:Choice xmlns:p14="http://schemas.microsoft.com/office/powerpoint/2010/main" Requires="p14">
+        <mc:AlternateContent xmlns:mc="http://schemas.openxmlformats.org/markup-compatibility/2006" xmlns:p14="http://schemas.microsoft.com/office/powerpoint/2010/main">
+          <mc:Choice Requires="p14">
             <p:contentPart p14:bwMode="auto" r:id="rId164">
               <p14:nvContentPartPr>
                 <p14:cNvPr id="107" name="Ink 106">
@@ -19911,7 +21103,7 @@
               </p14:xfrm>
             </p:contentPart>
           </mc:Choice>
-          <mc:Fallback>
+          <mc:Fallback xmlns="">
             <p:pic>
               <p:nvPicPr>
                 <p:cNvPr id="107" name="Ink 106">
@@ -19942,8 +21134,8 @@
             </p:pic>
           </mc:Fallback>
         </mc:AlternateContent>
-        <mc:AlternateContent xmlns:mc="http://schemas.openxmlformats.org/markup-compatibility/2006">
-          <mc:Choice xmlns:p14="http://schemas.microsoft.com/office/powerpoint/2010/main" Requires="p14">
+        <mc:AlternateContent xmlns:mc="http://schemas.openxmlformats.org/markup-compatibility/2006" xmlns:p14="http://schemas.microsoft.com/office/powerpoint/2010/main">
+          <mc:Choice Requires="p14">
             <p:contentPart p14:bwMode="auto" r:id="rId166">
               <p14:nvContentPartPr>
                 <p14:cNvPr id="108" name="Ink 107">
@@ -19962,7 +21154,7 @@
               </p14:xfrm>
             </p:contentPart>
           </mc:Choice>
-          <mc:Fallback>
+          <mc:Fallback xmlns="">
             <p:pic>
               <p:nvPicPr>
                 <p:cNvPr id="108" name="Ink 107">
@@ -19993,8 +21185,8 @@
             </p:pic>
           </mc:Fallback>
         </mc:AlternateContent>
-        <mc:AlternateContent xmlns:mc="http://schemas.openxmlformats.org/markup-compatibility/2006">
-          <mc:Choice xmlns:p14="http://schemas.microsoft.com/office/powerpoint/2010/main" Requires="p14">
+        <mc:AlternateContent xmlns:mc="http://schemas.openxmlformats.org/markup-compatibility/2006" xmlns:p14="http://schemas.microsoft.com/office/powerpoint/2010/main">
+          <mc:Choice Requires="p14">
             <p:contentPart p14:bwMode="auto" r:id="rId168">
               <p14:nvContentPartPr>
                 <p14:cNvPr id="110" name="Ink 109">
@@ -20013,7 +21205,7 @@
               </p14:xfrm>
             </p:contentPart>
           </mc:Choice>
-          <mc:Fallback>
+          <mc:Fallback xmlns="">
             <p:pic>
               <p:nvPicPr>
                 <p:cNvPr id="110" name="Ink 109">
@@ -20044,8 +21236,8 @@
             </p:pic>
           </mc:Fallback>
         </mc:AlternateContent>
-        <mc:AlternateContent xmlns:mc="http://schemas.openxmlformats.org/markup-compatibility/2006">
-          <mc:Choice xmlns:p14="http://schemas.microsoft.com/office/powerpoint/2010/main" Requires="p14">
+        <mc:AlternateContent xmlns:mc="http://schemas.openxmlformats.org/markup-compatibility/2006" xmlns:p14="http://schemas.microsoft.com/office/powerpoint/2010/main">
+          <mc:Choice Requires="p14">
             <p:contentPart p14:bwMode="auto" r:id="rId170">
               <p14:nvContentPartPr>
                 <p14:cNvPr id="111" name="Ink 110">
@@ -20064,7 +21256,7 @@
               </p14:xfrm>
             </p:contentPart>
           </mc:Choice>
-          <mc:Fallback>
+          <mc:Fallback xmlns="">
             <p:pic>
               <p:nvPicPr>
                 <p:cNvPr id="111" name="Ink 110">
@@ -20095,8 +21287,8 @@
             </p:pic>
           </mc:Fallback>
         </mc:AlternateContent>
-        <mc:AlternateContent xmlns:mc="http://schemas.openxmlformats.org/markup-compatibility/2006">
-          <mc:Choice xmlns:p14="http://schemas.microsoft.com/office/powerpoint/2010/main" Requires="p14">
+        <mc:AlternateContent xmlns:mc="http://schemas.openxmlformats.org/markup-compatibility/2006" xmlns:p14="http://schemas.microsoft.com/office/powerpoint/2010/main">
+          <mc:Choice Requires="p14">
             <p:contentPart p14:bwMode="auto" r:id="rId172">
               <p14:nvContentPartPr>
                 <p14:cNvPr id="113" name="Ink 112">
@@ -20115,7 +21307,7 @@
               </p14:xfrm>
             </p:contentPart>
           </mc:Choice>
-          <mc:Fallback>
+          <mc:Fallback xmlns="">
             <p:pic>
               <p:nvPicPr>
                 <p:cNvPr id="113" name="Ink 112">
@@ -20146,8 +21338,8 @@
             </p:pic>
           </mc:Fallback>
         </mc:AlternateContent>
-        <mc:AlternateContent xmlns:mc="http://schemas.openxmlformats.org/markup-compatibility/2006">
-          <mc:Choice xmlns:p14="http://schemas.microsoft.com/office/powerpoint/2010/main" Requires="p14">
+        <mc:AlternateContent xmlns:mc="http://schemas.openxmlformats.org/markup-compatibility/2006" xmlns:p14="http://schemas.microsoft.com/office/powerpoint/2010/main">
+          <mc:Choice Requires="p14">
             <p:contentPart p14:bwMode="auto" r:id="rId174">
               <p14:nvContentPartPr>
                 <p14:cNvPr id="114" name="Ink 113">
@@ -20166,7 +21358,7 @@
               </p14:xfrm>
             </p:contentPart>
           </mc:Choice>
-          <mc:Fallback>
+          <mc:Fallback xmlns="">
             <p:pic>
               <p:nvPicPr>
                 <p:cNvPr id="114" name="Ink 113">
@@ -20197,8 +21389,8 @@
             </p:pic>
           </mc:Fallback>
         </mc:AlternateContent>
-        <mc:AlternateContent xmlns:mc="http://schemas.openxmlformats.org/markup-compatibility/2006">
-          <mc:Choice xmlns:p14="http://schemas.microsoft.com/office/powerpoint/2010/main" Requires="p14">
+        <mc:AlternateContent xmlns:mc="http://schemas.openxmlformats.org/markup-compatibility/2006" xmlns:p14="http://schemas.microsoft.com/office/powerpoint/2010/main">
+          <mc:Choice Requires="p14">
             <p:contentPart p14:bwMode="auto" r:id="rId176">
               <p14:nvContentPartPr>
                 <p14:cNvPr id="115" name="Ink 114">
@@ -20217,7 +21409,7 @@
               </p14:xfrm>
             </p:contentPart>
           </mc:Choice>
-          <mc:Fallback>
+          <mc:Fallback xmlns="">
             <p:pic>
               <p:nvPicPr>
                 <p:cNvPr id="115" name="Ink 114">
@@ -20269,8 +21461,8 @@
             <a:chExt cx="1506240" cy="876600"/>
           </a:xfrm>
         </p:grpSpPr>
-        <mc:AlternateContent xmlns:mc="http://schemas.openxmlformats.org/markup-compatibility/2006">
-          <mc:Choice xmlns:p14="http://schemas.microsoft.com/office/powerpoint/2010/main" Requires="p14">
+        <mc:AlternateContent xmlns:mc="http://schemas.openxmlformats.org/markup-compatibility/2006" xmlns:p14="http://schemas.microsoft.com/office/powerpoint/2010/main">
+          <mc:Choice Requires="p14">
             <p:contentPart p14:bwMode="auto" r:id="rId178">
               <p14:nvContentPartPr>
                 <p14:cNvPr id="117" name="Ink 116">
@@ -20289,7 +21481,7 @@
               </p14:xfrm>
             </p:contentPart>
           </mc:Choice>
-          <mc:Fallback>
+          <mc:Fallback xmlns="">
             <p:pic>
               <p:nvPicPr>
                 <p:cNvPr id="117" name="Ink 116">
@@ -20320,8 +21512,8 @@
             </p:pic>
           </mc:Fallback>
         </mc:AlternateContent>
-        <mc:AlternateContent xmlns:mc="http://schemas.openxmlformats.org/markup-compatibility/2006">
-          <mc:Choice xmlns:p14="http://schemas.microsoft.com/office/powerpoint/2010/main" Requires="p14">
+        <mc:AlternateContent xmlns:mc="http://schemas.openxmlformats.org/markup-compatibility/2006" xmlns:p14="http://schemas.microsoft.com/office/powerpoint/2010/main">
+          <mc:Choice Requires="p14">
             <p:contentPart p14:bwMode="auto" r:id="rId180">
               <p14:nvContentPartPr>
                 <p14:cNvPr id="118" name="Ink 117">
@@ -20340,7 +21532,7 @@
               </p14:xfrm>
             </p:contentPart>
           </mc:Choice>
-          <mc:Fallback>
+          <mc:Fallback xmlns="">
             <p:pic>
               <p:nvPicPr>
                 <p:cNvPr id="118" name="Ink 117">
@@ -20371,8 +21563,8 @@
             </p:pic>
           </mc:Fallback>
         </mc:AlternateContent>
-        <mc:AlternateContent xmlns:mc="http://schemas.openxmlformats.org/markup-compatibility/2006">
-          <mc:Choice xmlns:p14="http://schemas.microsoft.com/office/powerpoint/2010/main" Requires="p14">
+        <mc:AlternateContent xmlns:mc="http://schemas.openxmlformats.org/markup-compatibility/2006" xmlns:p14="http://schemas.microsoft.com/office/powerpoint/2010/main">
+          <mc:Choice Requires="p14">
             <p:contentPart p14:bwMode="auto" r:id="rId182">
               <p14:nvContentPartPr>
                 <p14:cNvPr id="119" name="Ink 118">
@@ -20391,7 +21583,7 @@
               </p14:xfrm>
             </p:contentPart>
           </mc:Choice>
-          <mc:Fallback>
+          <mc:Fallback xmlns="">
             <p:pic>
               <p:nvPicPr>
                 <p:cNvPr id="119" name="Ink 118">
@@ -20422,8 +21614,8 @@
             </p:pic>
           </mc:Fallback>
         </mc:AlternateContent>
-        <mc:AlternateContent xmlns:mc="http://schemas.openxmlformats.org/markup-compatibility/2006">
-          <mc:Choice xmlns:p14="http://schemas.microsoft.com/office/powerpoint/2010/main" Requires="p14">
+        <mc:AlternateContent xmlns:mc="http://schemas.openxmlformats.org/markup-compatibility/2006" xmlns:p14="http://schemas.microsoft.com/office/powerpoint/2010/main">
+          <mc:Choice Requires="p14">
             <p:contentPart p14:bwMode="auto" r:id="rId184">
               <p14:nvContentPartPr>
                 <p14:cNvPr id="120" name="Ink 119">
@@ -20442,7 +21634,7 @@
               </p14:xfrm>
             </p:contentPart>
           </mc:Choice>
-          <mc:Fallback>
+          <mc:Fallback xmlns="">
             <p:pic>
               <p:nvPicPr>
                 <p:cNvPr id="120" name="Ink 119">
@@ -20473,8 +21665,8 @@
             </p:pic>
           </mc:Fallback>
         </mc:AlternateContent>
-        <mc:AlternateContent xmlns:mc="http://schemas.openxmlformats.org/markup-compatibility/2006">
-          <mc:Choice xmlns:p14="http://schemas.microsoft.com/office/powerpoint/2010/main" Requires="p14">
+        <mc:AlternateContent xmlns:mc="http://schemas.openxmlformats.org/markup-compatibility/2006" xmlns:p14="http://schemas.microsoft.com/office/powerpoint/2010/main">
+          <mc:Choice Requires="p14">
             <p:contentPart p14:bwMode="auto" r:id="rId186">
               <p14:nvContentPartPr>
                 <p14:cNvPr id="121" name="Ink 120">
@@ -20493,7 +21685,7 @@
               </p14:xfrm>
             </p:contentPart>
           </mc:Choice>
-          <mc:Fallback>
+          <mc:Fallback xmlns="">
             <p:pic>
               <p:nvPicPr>
                 <p:cNvPr id="121" name="Ink 120">
@@ -20524,8 +21716,8 @@
             </p:pic>
           </mc:Fallback>
         </mc:AlternateContent>
-        <mc:AlternateContent xmlns:mc="http://schemas.openxmlformats.org/markup-compatibility/2006">
-          <mc:Choice xmlns:p14="http://schemas.microsoft.com/office/powerpoint/2010/main" Requires="p14">
+        <mc:AlternateContent xmlns:mc="http://schemas.openxmlformats.org/markup-compatibility/2006" xmlns:p14="http://schemas.microsoft.com/office/powerpoint/2010/main">
+          <mc:Choice Requires="p14">
             <p:contentPart p14:bwMode="auto" r:id="rId188">
               <p14:nvContentPartPr>
                 <p14:cNvPr id="122" name="Ink 121">
@@ -20544,7 +21736,7 @@
               </p14:xfrm>
             </p:contentPart>
           </mc:Choice>
-          <mc:Fallback>
+          <mc:Fallback xmlns="">
             <p:pic>
               <p:nvPicPr>
                 <p:cNvPr id="122" name="Ink 121">
@@ -20575,8 +21767,8 @@
             </p:pic>
           </mc:Fallback>
         </mc:AlternateContent>
-        <mc:AlternateContent xmlns:mc="http://schemas.openxmlformats.org/markup-compatibility/2006">
-          <mc:Choice xmlns:p14="http://schemas.microsoft.com/office/powerpoint/2010/main" Requires="p14">
+        <mc:AlternateContent xmlns:mc="http://schemas.openxmlformats.org/markup-compatibility/2006" xmlns:p14="http://schemas.microsoft.com/office/powerpoint/2010/main">
+          <mc:Choice Requires="p14">
             <p:contentPart p14:bwMode="auto" r:id="rId190">
               <p14:nvContentPartPr>
                 <p14:cNvPr id="123" name="Ink 122">
@@ -20595,7 +21787,7 @@
               </p14:xfrm>
             </p:contentPart>
           </mc:Choice>
-          <mc:Fallback>
+          <mc:Fallback xmlns="">
             <p:pic>
               <p:nvPicPr>
                 <p:cNvPr id="123" name="Ink 122">
@@ -20626,8 +21818,8 @@
             </p:pic>
           </mc:Fallback>
         </mc:AlternateContent>
-        <mc:AlternateContent xmlns:mc="http://schemas.openxmlformats.org/markup-compatibility/2006">
-          <mc:Choice xmlns:p14="http://schemas.microsoft.com/office/powerpoint/2010/main" Requires="p14">
+        <mc:AlternateContent xmlns:mc="http://schemas.openxmlformats.org/markup-compatibility/2006" xmlns:p14="http://schemas.microsoft.com/office/powerpoint/2010/main">
+          <mc:Choice Requires="p14">
             <p:contentPart p14:bwMode="auto" r:id="rId192">
               <p14:nvContentPartPr>
                 <p14:cNvPr id="125" name="Ink 124">
@@ -20646,7 +21838,7 @@
               </p14:xfrm>
             </p:contentPart>
           </mc:Choice>
-          <mc:Fallback>
+          <mc:Fallback xmlns="">
             <p:pic>
               <p:nvPicPr>
                 <p:cNvPr id="125" name="Ink 124">
@@ -20677,8 +21869,8 @@
             </p:pic>
           </mc:Fallback>
         </mc:AlternateContent>
-        <mc:AlternateContent xmlns:mc="http://schemas.openxmlformats.org/markup-compatibility/2006">
-          <mc:Choice xmlns:p14="http://schemas.microsoft.com/office/powerpoint/2010/main" Requires="p14">
+        <mc:AlternateContent xmlns:mc="http://schemas.openxmlformats.org/markup-compatibility/2006" xmlns:p14="http://schemas.microsoft.com/office/powerpoint/2010/main">
+          <mc:Choice Requires="p14">
             <p:contentPart p14:bwMode="auto" r:id="rId194">
               <p14:nvContentPartPr>
                 <p14:cNvPr id="126" name="Ink 125">
@@ -20697,7 +21889,7 @@
               </p14:xfrm>
             </p:contentPart>
           </mc:Choice>
-          <mc:Fallback>
+          <mc:Fallback xmlns="">
             <p:pic>
               <p:nvPicPr>
                 <p:cNvPr id="126" name="Ink 125">
@@ -20728,8 +21920,8 @@
             </p:pic>
           </mc:Fallback>
         </mc:AlternateContent>
-        <mc:AlternateContent xmlns:mc="http://schemas.openxmlformats.org/markup-compatibility/2006">
-          <mc:Choice xmlns:p14="http://schemas.microsoft.com/office/powerpoint/2010/main" Requires="p14">
+        <mc:AlternateContent xmlns:mc="http://schemas.openxmlformats.org/markup-compatibility/2006" xmlns:p14="http://schemas.microsoft.com/office/powerpoint/2010/main">
+          <mc:Choice Requires="p14">
             <p:contentPart p14:bwMode="auto" r:id="rId196">
               <p14:nvContentPartPr>
                 <p14:cNvPr id="127" name="Ink 126">
@@ -20748,7 +21940,7 @@
               </p14:xfrm>
             </p:contentPart>
           </mc:Choice>
-          <mc:Fallback>
+          <mc:Fallback xmlns="">
             <p:pic>
               <p:nvPicPr>
                 <p:cNvPr id="127" name="Ink 126">
@@ -20779,8 +21971,8 @@
             </p:pic>
           </mc:Fallback>
         </mc:AlternateContent>
-        <mc:AlternateContent xmlns:mc="http://schemas.openxmlformats.org/markup-compatibility/2006">
-          <mc:Choice xmlns:p14="http://schemas.microsoft.com/office/powerpoint/2010/main" Requires="p14">
+        <mc:AlternateContent xmlns:mc="http://schemas.openxmlformats.org/markup-compatibility/2006" xmlns:p14="http://schemas.microsoft.com/office/powerpoint/2010/main">
+          <mc:Choice Requires="p14">
             <p:contentPart p14:bwMode="auto" r:id="rId198">
               <p14:nvContentPartPr>
                 <p14:cNvPr id="128" name="Ink 127">
@@ -20799,7 +21991,7 @@
               </p14:xfrm>
             </p:contentPart>
           </mc:Choice>
-          <mc:Fallback>
+          <mc:Fallback xmlns="">
             <p:pic>
               <p:nvPicPr>
                 <p:cNvPr id="128" name="Ink 127">

</xml_diff>